<commit_message>
Fuck it, this is finished
</commit_message>
<xml_diff>
--- a/poster/poster.pptx
+++ b/poster/poster.pptx
@@ -2992,14 +2992,14 @@
           <a:effectLst/>
           <a:extLst>
             <a:ext uri="{909E8E84-426E-40dd-AFC4-6F175D3DCCD1}">
-              <a14:hiddenFill xmlns:a14="http://schemas.microsoft.com/office/drawing/2010/main" xmlns="">
+              <a14:hiddenFill xmlns="" xmlns:a14="http://schemas.microsoft.com/office/drawing/2010/main">
                 <a:solidFill>
                   <a:schemeClr val="accent1"/>
                 </a:solidFill>
               </a14:hiddenFill>
             </a:ext>
             <a:ext uri="{91240B29-F687-4f45-9708-019B960494DF}">
-              <a14:hiddenLine xmlns:a14="http://schemas.microsoft.com/office/drawing/2010/main" xmlns="" w="9525">
+              <a14:hiddenLine xmlns="" xmlns:a14="http://schemas.microsoft.com/office/drawing/2010/main" w="9525">
                 <a:solidFill>
                   <a:schemeClr val="tx1"/>
                 </a:solidFill>
@@ -3009,7 +3009,7 @@
               </a14:hiddenLine>
             </a:ext>
             <a:ext uri="{AF507438-7753-43e0-B8FC-AC1667EBCBE1}">
-              <a14:hiddenEffects xmlns:a14="http://schemas.microsoft.com/office/drawing/2010/main" xmlns="">
+              <a14:hiddenEffects xmlns="" xmlns:a14="http://schemas.microsoft.com/office/drawing/2010/main">
                 <a:effectLst>
                   <a:outerShdw blurRad="63500" dist="38099" dir="2700000" algn="ctr" rotWithShape="0">
                     <a:schemeClr val="bg2">
@@ -3020,7 +3020,7 @@
               </a14:hiddenEffects>
             </a:ext>
             <a:ext uri="{FAA26D3D-D897-4be2-8F04-BA451C77F1D7}">
-              <ma14:placeholderFlag xmlns:ma14="http://schemas.microsoft.com/office/mac/drawingml/2011/main" xmlns="" val="1"/>
+              <ma14:placeholderFlag xmlns="" xmlns:ma14="http://schemas.microsoft.com/office/mac/drawingml/2011/main" val="1"/>
             </a:ext>
           </a:extLst>
         </p:spPr>
@@ -3071,14 +3071,14 @@
           <a:effectLst/>
           <a:extLst>
             <a:ext uri="{909E8E84-426E-40dd-AFC4-6F175D3DCCD1}">
-              <a14:hiddenFill xmlns:a14="http://schemas.microsoft.com/office/drawing/2010/main" xmlns="">
+              <a14:hiddenFill xmlns="" xmlns:a14="http://schemas.microsoft.com/office/drawing/2010/main">
                 <a:solidFill>
                   <a:schemeClr val="accent1"/>
                 </a:solidFill>
               </a14:hiddenFill>
             </a:ext>
             <a:ext uri="{91240B29-F687-4f45-9708-019B960494DF}">
-              <a14:hiddenLine xmlns:a14="http://schemas.microsoft.com/office/drawing/2010/main" xmlns="" w="9525">
+              <a14:hiddenLine xmlns="" xmlns:a14="http://schemas.microsoft.com/office/drawing/2010/main" w="9525">
                 <a:solidFill>
                   <a:schemeClr val="tx1"/>
                 </a:solidFill>
@@ -3088,7 +3088,7 @@
               </a14:hiddenLine>
             </a:ext>
             <a:ext uri="{AF507438-7753-43e0-B8FC-AC1667EBCBE1}">
-              <a14:hiddenEffects xmlns:a14="http://schemas.microsoft.com/office/drawing/2010/main" xmlns="">
+              <a14:hiddenEffects xmlns="" xmlns:a14="http://schemas.microsoft.com/office/drawing/2010/main">
                 <a:effectLst>
                   <a:outerShdw blurRad="63500" dist="38099" dir="2700000" algn="ctr" rotWithShape="0">
                     <a:schemeClr val="bg2">
@@ -3099,7 +3099,7 @@
               </a14:hiddenEffects>
             </a:ext>
             <a:ext uri="{FAA26D3D-D897-4be2-8F04-BA451C77F1D7}">
-              <ma14:placeholderFlag xmlns:ma14="http://schemas.microsoft.com/office/mac/drawingml/2011/main" xmlns="" val="1"/>
+              <ma14:placeholderFlag xmlns="" xmlns:ma14="http://schemas.microsoft.com/office/mac/drawingml/2011/main" val="1"/>
             </a:ext>
           </a:extLst>
         </p:spPr>
@@ -3178,14 +3178,14 @@
           <a:effectLst/>
           <a:extLst>
             <a:ext uri="{909E8E84-426E-40dd-AFC4-6F175D3DCCD1}">
-              <a14:hiddenFill xmlns:a14="http://schemas.microsoft.com/office/drawing/2010/main" xmlns="">
+              <a14:hiddenFill xmlns="" xmlns:a14="http://schemas.microsoft.com/office/drawing/2010/main">
                 <a:solidFill>
                   <a:schemeClr val="accent1"/>
                 </a:solidFill>
               </a14:hiddenFill>
             </a:ext>
             <a:ext uri="{91240B29-F687-4f45-9708-019B960494DF}">
-              <a14:hiddenLine xmlns:a14="http://schemas.microsoft.com/office/drawing/2010/main" xmlns="" w="9525">
+              <a14:hiddenLine xmlns="" xmlns:a14="http://schemas.microsoft.com/office/drawing/2010/main" w="9525">
                 <a:solidFill>
                   <a:schemeClr val="tx1"/>
                 </a:solidFill>
@@ -3195,7 +3195,7 @@
               </a14:hiddenLine>
             </a:ext>
             <a:ext uri="{AF507438-7753-43e0-B8FC-AC1667EBCBE1}">
-              <a14:hiddenEffects xmlns:a14="http://schemas.microsoft.com/office/drawing/2010/main" xmlns="">
+              <a14:hiddenEffects xmlns="" xmlns:a14="http://schemas.microsoft.com/office/drawing/2010/main">
                 <a:effectLst>
                   <a:outerShdw blurRad="63500" dist="38099" dir="2700000" algn="ctr" rotWithShape="0">
                     <a:schemeClr val="bg2">
@@ -3206,7 +3206,7 @@
               </a14:hiddenEffects>
             </a:ext>
             <a:ext uri="{FAA26D3D-D897-4be2-8F04-BA451C77F1D7}">
-              <ma14:placeholderFlag xmlns:ma14="http://schemas.microsoft.com/office/mac/drawingml/2011/main" xmlns="" val="1"/>
+              <ma14:placeholderFlag xmlns="" xmlns:ma14="http://schemas.microsoft.com/office/mac/drawingml/2011/main" val="1"/>
             </a:ext>
           </a:extLst>
         </p:spPr>
@@ -3263,14 +3263,14 @@
           <a:effectLst/>
           <a:extLst>
             <a:ext uri="{909E8E84-426E-40dd-AFC4-6F175D3DCCD1}">
-              <a14:hiddenFill xmlns:a14="http://schemas.microsoft.com/office/drawing/2010/main" xmlns="">
+              <a14:hiddenFill xmlns="" xmlns:a14="http://schemas.microsoft.com/office/drawing/2010/main">
                 <a:solidFill>
                   <a:schemeClr val="accent1"/>
                 </a:solidFill>
               </a14:hiddenFill>
             </a:ext>
             <a:ext uri="{91240B29-F687-4f45-9708-019B960494DF}">
-              <a14:hiddenLine xmlns:a14="http://schemas.microsoft.com/office/drawing/2010/main" xmlns="" w="9525">
+              <a14:hiddenLine xmlns="" xmlns:a14="http://schemas.microsoft.com/office/drawing/2010/main" w="9525">
                 <a:solidFill>
                   <a:schemeClr val="tx1"/>
                 </a:solidFill>
@@ -3280,7 +3280,7 @@
               </a14:hiddenLine>
             </a:ext>
             <a:ext uri="{AF507438-7753-43e0-B8FC-AC1667EBCBE1}">
-              <a14:hiddenEffects xmlns:a14="http://schemas.microsoft.com/office/drawing/2010/main" xmlns="">
+              <a14:hiddenEffects xmlns="" xmlns:a14="http://schemas.microsoft.com/office/drawing/2010/main">
                 <a:effectLst>
                   <a:outerShdw blurRad="63500" dist="38099" dir="2700000" algn="ctr" rotWithShape="0">
                     <a:schemeClr val="bg2">
@@ -3291,7 +3291,7 @@
               </a14:hiddenEffects>
             </a:ext>
             <a:ext uri="{FAA26D3D-D897-4be2-8F04-BA451C77F1D7}">
-              <ma14:placeholderFlag xmlns:ma14="http://schemas.microsoft.com/office/mac/drawingml/2011/main" xmlns="" val="1"/>
+              <ma14:placeholderFlag xmlns="" xmlns:ma14="http://schemas.microsoft.com/office/mac/drawingml/2011/main" val="1"/>
             </a:ext>
           </a:extLst>
         </p:spPr>
@@ -3348,14 +3348,14 @@
           <a:effectLst/>
           <a:extLst>
             <a:ext uri="{909E8E84-426E-40dd-AFC4-6F175D3DCCD1}">
-              <a14:hiddenFill xmlns:a14="http://schemas.microsoft.com/office/drawing/2010/main" xmlns="">
+              <a14:hiddenFill xmlns="" xmlns:a14="http://schemas.microsoft.com/office/drawing/2010/main">
                 <a:solidFill>
                   <a:schemeClr val="accent1"/>
                 </a:solidFill>
               </a14:hiddenFill>
             </a:ext>
             <a:ext uri="{91240B29-F687-4f45-9708-019B960494DF}">
-              <a14:hiddenLine xmlns:a14="http://schemas.microsoft.com/office/drawing/2010/main" xmlns="" w="9525">
+              <a14:hiddenLine xmlns="" xmlns:a14="http://schemas.microsoft.com/office/drawing/2010/main" w="9525">
                 <a:solidFill>
                   <a:schemeClr val="tx1"/>
                 </a:solidFill>
@@ -3365,7 +3365,7 @@
               </a14:hiddenLine>
             </a:ext>
             <a:ext uri="{AF507438-7753-43e0-B8FC-AC1667EBCBE1}">
-              <a14:hiddenEffects xmlns:a14="http://schemas.microsoft.com/office/drawing/2010/main" xmlns="">
+              <a14:hiddenEffects xmlns="" xmlns:a14="http://schemas.microsoft.com/office/drawing/2010/main">
                 <a:effectLst>
                   <a:outerShdw blurRad="63500" dist="38099" dir="2700000" algn="ctr" rotWithShape="0">
                     <a:schemeClr val="bg2">
@@ -3376,7 +3376,7 @@
               </a14:hiddenEffects>
             </a:ext>
             <a:ext uri="{FAA26D3D-D897-4be2-8F04-BA451C77F1D7}">
-              <ma14:placeholderFlag xmlns:ma14="http://schemas.microsoft.com/office/mac/drawingml/2011/main" xmlns="" val="1"/>
+              <ma14:placeholderFlag xmlns="" xmlns:ma14="http://schemas.microsoft.com/office/mac/drawingml/2011/main" val="1"/>
             </a:ext>
           </a:extLst>
         </p:spPr>
@@ -3836,7 +3836,7 @@
         <p:spPr bwMode="auto">
           <a:xfrm>
             <a:off x="1025525" y="720725"/>
-            <a:ext cx="40763825" cy="4652963"/>
+            <a:ext cx="40763825" cy="5985981"/>
           </a:xfrm>
           <a:prstGeom prst="rect">
             <a:avLst/>
@@ -3853,14 +3853,14 @@
           <a:effectLst/>
           <a:extLst>
             <a:ext uri="{909E8E84-426E-40dd-AFC4-6F175D3DCCD1}">
-              <a14:hiddenFill xmlns:a14="http://schemas.microsoft.com/office/drawing/2010/main" xmlns="">
+              <a14:hiddenFill xmlns="" xmlns:a14="http://schemas.microsoft.com/office/drawing/2010/main">
                 <a:solidFill>
                   <a:srgbClr val="FFCC66"/>
                 </a:solidFill>
               </a14:hiddenFill>
             </a:ext>
             <a:ext uri="{AF507438-7753-43e0-B8FC-AC1667EBCBE1}">
-              <a14:hiddenEffects xmlns:a14="http://schemas.microsoft.com/office/drawing/2010/main" xmlns="">
+              <a14:hiddenEffects xmlns="" xmlns:a14="http://schemas.microsoft.com/office/drawing/2010/main">
                 <a:effectLst>
                   <a:outerShdw blurRad="63500" dist="38099" dir="2700000" algn="ctr" rotWithShape="0">
                     <a:schemeClr val="bg2">
@@ -3902,8 +3902,8 @@
         </p:nvSpPr>
         <p:spPr bwMode="auto">
           <a:xfrm>
-            <a:off x="1019175" y="5948363"/>
-            <a:ext cx="8855075" cy="23190200"/>
+            <a:off x="1025525" y="10258372"/>
+            <a:ext cx="8890373" cy="19218286"/>
           </a:xfrm>
           <a:prstGeom prst="rect">
             <a:avLst/>
@@ -3920,14 +3920,14 @@
           <a:effectLst/>
           <a:extLst>
             <a:ext uri="{909E8E84-426E-40dd-AFC4-6F175D3DCCD1}">
-              <a14:hiddenFill xmlns:a14="http://schemas.microsoft.com/office/drawing/2010/main" xmlns="">
+              <a14:hiddenFill xmlns="" xmlns:a14="http://schemas.microsoft.com/office/drawing/2010/main">
                 <a:solidFill>
                   <a:schemeClr val="accent1"/>
                 </a:solidFill>
               </a14:hiddenFill>
             </a:ext>
             <a:ext uri="{AF507438-7753-43e0-B8FC-AC1667EBCBE1}">
-              <a14:hiddenEffects xmlns:a14="http://schemas.microsoft.com/office/drawing/2010/main" xmlns="">
+              <a14:hiddenEffects xmlns="" xmlns:a14="http://schemas.microsoft.com/office/drawing/2010/main">
                 <a:effectLst>
                   <a:outerShdw blurRad="63500" dist="38099" dir="2700000" algn="ctr" rotWithShape="0">
                     <a:schemeClr val="bg2">
@@ -3969,8 +3969,8 @@
         </p:nvSpPr>
         <p:spPr bwMode="auto">
           <a:xfrm>
-            <a:off x="10891838" y="5930900"/>
-            <a:ext cx="11807825" cy="8348663"/>
+            <a:off x="10853316" y="23829952"/>
+            <a:ext cx="11807825" cy="5646706"/>
           </a:xfrm>
           <a:prstGeom prst="rect">
             <a:avLst/>
@@ -3987,14 +3987,14 @@
           <a:effectLst/>
           <a:extLst>
             <a:ext uri="{909E8E84-426E-40dd-AFC4-6F175D3DCCD1}">
-              <a14:hiddenFill xmlns:a14="http://schemas.microsoft.com/office/drawing/2010/main" xmlns="">
+              <a14:hiddenFill xmlns="" xmlns:a14="http://schemas.microsoft.com/office/drawing/2010/main">
                 <a:solidFill>
                   <a:schemeClr val="accent1"/>
                 </a:solidFill>
               </a14:hiddenFill>
             </a:ext>
             <a:ext uri="{AF507438-7753-43e0-B8FC-AC1667EBCBE1}">
-              <a14:hiddenEffects xmlns:a14="http://schemas.microsoft.com/office/drawing/2010/main" xmlns="">
+              <a14:hiddenEffects xmlns="" xmlns:a14="http://schemas.microsoft.com/office/drawing/2010/main">
                 <a:effectLst>
                   <a:outerShdw blurRad="63500" dist="38099" dir="2700000" algn="ctr" rotWithShape="0">
                     <a:schemeClr val="bg2">
@@ -4036,8 +4036,8 @@
         </p:nvSpPr>
         <p:spPr bwMode="auto">
           <a:xfrm>
-            <a:off x="1530350" y="6575425"/>
-            <a:ext cx="3184525" cy="1003300"/>
+            <a:off x="1498974" y="10766963"/>
+            <a:ext cx="3257550" cy="1003300"/>
           </a:xfrm>
           <a:prstGeom prst="rect">
             <a:avLst/>
@@ -4049,14 +4049,14 @@
           <a:effectLst/>
           <a:extLst>
             <a:ext uri="{909E8E84-426E-40dd-AFC4-6F175D3DCCD1}">
-              <a14:hiddenFill xmlns:a14="http://schemas.microsoft.com/office/drawing/2010/main" xmlns="">
+              <a14:hiddenFill xmlns="" xmlns:a14="http://schemas.microsoft.com/office/drawing/2010/main">
                 <a:solidFill>
                   <a:schemeClr val="accent1"/>
                 </a:solidFill>
               </a14:hiddenFill>
             </a:ext>
             <a:ext uri="{91240B29-F687-4f45-9708-019B960494DF}">
-              <a14:hiddenLine xmlns:a14="http://schemas.microsoft.com/office/drawing/2010/main" xmlns="" w="9525">
+              <a14:hiddenLine xmlns="" xmlns:a14="http://schemas.microsoft.com/office/drawing/2010/main" w="9525">
                 <a:solidFill>
                   <a:schemeClr val="tx1"/>
                 </a:solidFill>
@@ -4066,7 +4066,7 @@
               </a14:hiddenLine>
             </a:ext>
             <a:ext uri="{AF507438-7753-43e0-B8FC-AC1667EBCBE1}">
-              <a14:hiddenEffects xmlns:a14="http://schemas.microsoft.com/office/drawing/2010/main" xmlns="">
+              <a14:hiddenEffects xmlns="" xmlns:a14="http://schemas.microsoft.com/office/drawing/2010/main">
                 <a:effectLst>
                   <a:outerShdw blurRad="63500" dist="38099" dir="2700000" algn="ctr" rotWithShape="0">
                     <a:schemeClr val="bg2">
@@ -4079,7 +4079,7 @@
           </a:extLst>
         </p:spPr>
         <p:txBody>
-          <a:bodyPr wrap="none" lIns="88562" tIns="44281" rIns="88562" bIns="44281">
+          <a:bodyPr wrap="square" lIns="88562" tIns="44281" rIns="88562" bIns="44281">
             <a:spAutoFit/>
           </a:bodyPr>
           <a:lstStyle>
@@ -4191,7 +4191,7 @@
           </a:lstStyle>
           <a:p>
             <a:r>
-              <a:rPr lang="pt-PT" altLang="en-US" sz="6000" b="1">
+              <a:rPr lang="pt-PT" altLang="en-US" sz="6000" b="1" dirty="0">
                 <a:effectLst>
                   <a:outerShdw blurRad="38100" dist="38100" dir="2700000" algn="tl">
                     <a:srgbClr val="C0C0C0"/>
@@ -4219,8 +4219,8 @@
         </p:nvSpPr>
         <p:spPr bwMode="auto">
           <a:xfrm>
-            <a:off x="6178550" y="879475"/>
-            <a:ext cx="34018538" cy="2365375"/>
+            <a:off x="4394993" y="803317"/>
+            <a:ext cx="34018538" cy="3097448"/>
           </a:xfrm>
           <a:prstGeom prst="rect">
             <a:avLst/>
@@ -4232,14 +4232,14 @@
           <a:effectLst/>
           <a:extLst>
             <a:ext uri="{909E8E84-426E-40dd-AFC4-6F175D3DCCD1}">
-              <a14:hiddenFill xmlns:a14="http://schemas.microsoft.com/office/drawing/2010/main" xmlns="">
+              <a14:hiddenFill xmlns="" xmlns:a14="http://schemas.microsoft.com/office/drawing/2010/main">
                 <a:solidFill>
                   <a:schemeClr val="accent1"/>
                 </a:solidFill>
               </a14:hiddenFill>
             </a:ext>
             <a:ext uri="{91240B29-F687-4f45-9708-019B960494DF}">
-              <a14:hiddenLine xmlns:a14="http://schemas.microsoft.com/office/drawing/2010/main" xmlns="" w="9525">
+              <a14:hiddenLine xmlns="" xmlns:a14="http://schemas.microsoft.com/office/drawing/2010/main" w="9525">
                 <a:solidFill>
                   <a:schemeClr val="tx1"/>
                 </a:solidFill>
@@ -4249,7 +4249,7 @@
               </a14:hiddenLine>
             </a:ext>
             <a:ext uri="{AF507438-7753-43e0-B8FC-AC1667EBCBE1}">
-              <a14:hiddenEffects xmlns:a14="http://schemas.microsoft.com/office/drawing/2010/main" xmlns="">
+              <a14:hiddenEffects xmlns="" xmlns:a14="http://schemas.microsoft.com/office/drawing/2010/main">
                 <a:effectLst>
                   <a:outerShdw blurRad="63500" dist="38099" dir="2700000" algn="ctr" rotWithShape="0">
                     <a:schemeClr val="bg2">
@@ -4416,8 +4416,8 @@
         </p:nvSpPr>
         <p:spPr bwMode="auto">
           <a:xfrm>
-            <a:off x="7835900" y="3521075"/>
-            <a:ext cx="31851600" cy="1560513"/>
+            <a:off x="5478462" y="4275523"/>
+            <a:ext cx="31851600" cy="2276306"/>
           </a:xfrm>
           <a:prstGeom prst="rect">
             <a:avLst/>
@@ -4429,14 +4429,14 @@
           <a:effectLst/>
           <a:extLst>
             <a:ext uri="{909E8E84-426E-40dd-AFC4-6F175D3DCCD1}">
-              <a14:hiddenFill xmlns:a14="http://schemas.microsoft.com/office/drawing/2010/main" xmlns="">
+              <a14:hiddenFill xmlns="" xmlns:a14="http://schemas.microsoft.com/office/drawing/2010/main">
                 <a:solidFill>
                   <a:schemeClr val="accent1"/>
                 </a:solidFill>
               </a14:hiddenFill>
             </a:ext>
             <a:ext uri="{91240B29-F687-4f45-9708-019B960494DF}">
-              <a14:hiddenLine xmlns:a14="http://schemas.microsoft.com/office/drawing/2010/main" xmlns="" w="9525">
+              <a14:hiddenLine xmlns="" xmlns:a14="http://schemas.microsoft.com/office/drawing/2010/main" w="9525">
                 <a:solidFill>
                   <a:schemeClr val="tx1"/>
                 </a:solidFill>
@@ -4446,7 +4446,7 @@
               </a14:hiddenLine>
             </a:ext>
             <a:ext uri="{AF507438-7753-43e0-B8FC-AC1667EBCBE1}">
-              <a14:hiddenEffects xmlns:a14="http://schemas.microsoft.com/office/drawing/2010/main" xmlns="">
+              <a14:hiddenEffects xmlns="" xmlns:a14="http://schemas.microsoft.com/office/drawing/2010/main">
                 <a:effectLst>
                   <a:outerShdw blurRad="63500" dist="38099" dir="2700000" algn="ctr" rotWithShape="0">
                     <a:schemeClr val="bg2">
@@ -4628,8 +4628,8 @@
         </p:nvSpPr>
         <p:spPr bwMode="auto">
           <a:xfrm>
-            <a:off x="1310482" y="18867239"/>
-            <a:ext cx="4144962" cy="1019175"/>
+            <a:off x="11387469" y="24412051"/>
+            <a:ext cx="5415772" cy="1029525"/>
           </a:xfrm>
           <a:prstGeom prst="rect">
             <a:avLst/>
@@ -4641,14 +4641,14 @@
           <a:effectLst/>
           <a:extLst>
             <a:ext uri="{909E8E84-426E-40dd-AFC4-6F175D3DCCD1}">
-              <a14:hiddenFill xmlns:a14="http://schemas.microsoft.com/office/drawing/2010/main" xmlns="">
+              <a14:hiddenFill xmlns="" xmlns:a14="http://schemas.microsoft.com/office/drawing/2010/main">
                 <a:solidFill>
                   <a:schemeClr val="accent1"/>
                 </a:solidFill>
               </a14:hiddenFill>
             </a:ext>
             <a:ext uri="{91240B29-F687-4f45-9708-019B960494DF}">
-              <a14:hiddenLine xmlns:a14="http://schemas.microsoft.com/office/drawing/2010/main" xmlns="" w="9525">
+              <a14:hiddenLine xmlns="" xmlns:a14="http://schemas.microsoft.com/office/drawing/2010/main" w="9525">
                 <a:solidFill>
                   <a:schemeClr val="tx1"/>
                 </a:solidFill>
@@ -4658,7 +4658,7 @@
               </a14:hiddenLine>
             </a:ext>
             <a:ext uri="{AF507438-7753-43e0-B8FC-AC1667EBCBE1}">
-              <a14:hiddenEffects xmlns:a14="http://schemas.microsoft.com/office/drawing/2010/main" xmlns="">
+              <a14:hiddenEffects xmlns="" xmlns:a14="http://schemas.microsoft.com/office/drawing/2010/main">
                 <a:effectLst>
                   <a:outerShdw blurRad="63500" dist="38099" dir="2700000" algn="ctr" rotWithShape="0">
                     <a:schemeClr val="bg2">
@@ -4671,7 +4671,7 @@
           </a:extLst>
         </p:spPr>
         <p:txBody>
-          <a:bodyPr wrap="none" lIns="105168" tIns="52584" rIns="105168" bIns="52584">
+          <a:bodyPr wrap="square" lIns="105168" tIns="52584" rIns="105168" bIns="52584">
             <a:spAutoFit/>
           </a:bodyPr>
           <a:lstStyle>
@@ -4792,454 +4792,6 @@
               </a:rPr>
               <a:t>Introdução</a:t>
             </a:r>
-          </a:p>
-        </p:txBody>
-      </p:sp>
-      <p:sp>
-        <p:nvSpPr>
-          <p:cNvPr id="3081" name="Text Box 9">
-            <a:extLst>
-              <a:ext uri="{FF2B5EF4-FFF2-40B4-BE49-F238E27FC236}">
-                <a16:creationId xmlns:a16="http://schemas.microsoft.com/office/drawing/2014/main" id="{3CFBBD01-E48C-E361-3187-BFB2B1D26A05}"/>
-              </a:ext>
-            </a:extLst>
-          </p:cNvPr>
-          <p:cNvSpPr txBox="1">
-            <a:spLocks noChangeArrowheads="1"/>
-          </p:cNvSpPr>
-          <p:nvPr/>
-        </p:nvSpPr>
-        <p:spPr bwMode="auto">
-          <a:xfrm>
-            <a:off x="11464925" y="22751718"/>
-            <a:ext cx="2417762" cy="989013"/>
-          </a:xfrm>
-          <a:prstGeom prst="rect">
-            <a:avLst/>
-          </a:prstGeom>
-          <a:noFill/>
-          <a:ln>
-            <a:noFill/>
-          </a:ln>
-          <a:effectLst/>
-          <a:extLst>
-            <a:ext uri="{909E8E84-426E-40dd-AFC4-6F175D3DCCD1}">
-              <a14:hiddenFill xmlns:a14="http://schemas.microsoft.com/office/drawing/2010/main" xmlns="">
-                <a:solidFill>
-                  <a:schemeClr val="accent1"/>
-                </a:solidFill>
-              </a14:hiddenFill>
-            </a:ext>
-            <a:ext uri="{91240B29-F687-4f45-9708-019B960494DF}">
-              <a14:hiddenLine xmlns:a14="http://schemas.microsoft.com/office/drawing/2010/main" xmlns="" w="9525">
-                <a:solidFill>
-                  <a:schemeClr val="tx1"/>
-                </a:solidFill>
-                <a:miter lim="800000"/>
-                <a:headEnd/>
-                <a:tailEnd/>
-              </a14:hiddenLine>
-            </a:ext>
-            <a:ext uri="{AF507438-7753-43e0-B8FC-AC1667EBCBE1}">
-              <a14:hiddenEffects xmlns:a14="http://schemas.microsoft.com/office/drawing/2010/main" xmlns="">
-                <a:effectLst>
-                  <a:outerShdw blurRad="63500" dist="38099" dir="2700000" algn="ctr" rotWithShape="0">
-                    <a:schemeClr val="bg2">
-                      <a:alpha val="74998"/>
-                    </a:schemeClr>
-                  </a:outerShdw>
-                </a:effectLst>
-              </a14:hiddenEffects>
-            </a:ext>
-          </a:extLst>
-        </p:spPr>
-        <p:txBody>
-          <a:bodyPr wrap="none" lIns="105168" tIns="52584" rIns="105168" bIns="52584">
-            <a:spAutoFit/>
-          </a:bodyPr>
-          <a:lstStyle>
-            <a:lvl1pPr defTabSz="885825" eaLnBrk="0" hangingPunct="0">
-              <a:defRPr sz="8200">
-                <a:solidFill>
-                  <a:schemeClr val="tx1"/>
-                </a:solidFill>
-                <a:latin typeface="Arial" panose="020B0604020202020204" pitchFamily="34" charset="0"/>
-                <a:ea typeface="MS PGothic" panose="020B0600070205080204" pitchFamily="34" charset="-128"/>
-              </a:defRPr>
-            </a:lvl1pPr>
-            <a:lvl2pPr marL="742950" indent="-285750" defTabSz="885825" eaLnBrk="0" hangingPunct="0">
-              <a:defRPr sz="8200">
-                <a:solidFill>
-                  <a:schemeClr val="tx1"/>
-                </a:solidFill>
-                <a:latin typeface="Arial" panose="020B0604020202020204" pitchFamily="34" charset="0"/>
-                <a:ea typeface="MS PGothic" panose="020B0600070205080204" pitchFamily="34" charset="-128"/>
-              </a:defRPr>
-            </a:lvl2pPr>
-            <a:lvl3pPr marL="1143000" indent="-228600" defTabSz="885825" eaLnBrk="0" hangingPunct="0">
-              <a:defRPr sz="8200">
-                <a:solidFill>
-                  <a:schemeClr val="tx1"/>
-                </a:solidFill>
-                <a:latin typeface="Arial" panose="020B0604020202020204" pitchFamily="34" charset="0"/>
-                <a:ea typeface="MS PGothic" panose="020B0600070205080204" pitchFamily="34" charset="-128"/>
-              </a:defRPr>
-            </a:lvl3pPr>
-            <a:lvl4pPr marL="1600200" indent="-228600" defTabSz="885825" eaLnBrk="0" hangingPunct="0">
-              <a:defRPr sz="8200">
-                <a:solidFill>
-                  <a:schemeClr val="tx1"/>
-                </a:solidFill>
-                <a:latin typeface="Arial" panose="020B0604020202020204" pitchFamily="34" charset="0"/>
-                <a:ea typeface="MS PGothic" panose="020B0600070205080204" pitchFamily="34" charset="-128"/>
-              </a:defRPr>
-            </a:lvl4pPr>
-            <a:lvl5pPr marL="2057400" indent="-228600" defTabSz="885825" eaLnBrk="0" hangingPunct="0">
-              <a:defRPr sz="8200">
-                <a:solidFill>
-                  <a:schemeClr val="tx1"/>
-                </a:solidFill>
-                <a:latin typeface="Arial" panose="020B0604020202020204" pitchFamily="34" charset="0"/>
-                <a:ea typeface="MS PGothic" panose="020B0600070205080204" pitchFamily="34" charset="-128"/>
-              </a:defRPr>
-            </a:lvl5pPr>
-            <a:lvl6pPr marL="2514600" indent="-228600" defTabSz="885825" eaLnBrk="0" fontAlgn="base" hangingPunct="0">
-              <a:spcBef>
-                <a:spcPct val="0"/>
-              </a:spcBef>
-              <a:spcAft>
-                <a:spcPct val="0"/>
-              </a:spcAft>
-              <a:defRPr sz="8200">
-                <a:solidFill>
-                  <a:schemeClr val="tx1"/>
-                </a:solidFill>
-                <a:latin typeface="Arial" panose="020B0604020202020204" pitchFamily="34" charset="0"/>
-                <a:ea typeface="MS PGothic" panose="020B0600070205080204" pitchFamily="34" charset="-128"/>
-              </a:defRPr>
-            </a:lvl6pPr>
-            <a:lvl7pPr marL="2971800" indent="-228600" defTabSz="885825" eaLnBrk="0" fontAlgn="base" hangingPunct="0">
-              <a:spcBef>
-                <a:spcPct val="0"/>
-              </a:spcBef>
-              <a:spcAft>
-                <a:spcPct val="0"/>
-              </a:spcAft>
-              <a:defRPr sz="8200">
-                <a:solidFill>
-                  <a:schemeClr val="tx1"/>
-                </a:solidFill>
-                <a:latin typeface="Arial" panose="020B0604020202020204" pitchFamily="34" charset="0"/>
-                <a:ea typeface="MS PGothic" panose="020B0600070205080204" pitchFamily="34" charset="-128"/>
-              </a:defRPr>
-            </a:lvl7pPr>
-            <a:lvl8pPr marL="3429000" indent="-228600" defTabSz="885825" eaLnBrk="0" fontAlgn="base" hangingPunct="0">
-              <a:spcBef>
-                <a:spcPct val="0"/>
-              </a:spcBef>
-              <a:spcAft>
-                <a:spcPct val="0"/>
-              </a:spcAft>
-              <a:defRPr sz="8200">
-                <a:solidFill>
-                  <a:schemeClr val="tx1"/>
-                </a:solidFill>
-                <a:latin typeface="Arial" panose="020B0604020202020204" pitchFamily="34" charset="0"/>
-                <a:ea typeface="MS PGothic" panose="020B0600070205080204" pitchFamily="34" charset="-128"/>
-              </a:defRPr>
-            </a:lvl8pPr>
-            <a:lvl9pPr marL="3886200" indent="-228600" defTabSz="885825" eaLnBrk="0" fontAlgn="base" hangingPunct="0">
-              <a:spcBef>
-                <a:spcPct val="0"/>
-              </a:spcBef>
-              <a:spcAft>
-                <a:spcPct val="0"/>
-              </a:spcAft>
-              <a:defRPr sz="8200">
-                <a:solidFill>
-                  <a:schemeClr val="tx1"/>
-                </a:solidFill>
-                <a:latin typeface="Arial" panose="020B0604020202020204" pitchFamily="34" charset="0"/>
-                <a:ea typeface="MS PGothic" panose="020B0600070205080204" pitchFamily="34" charset="-128"/>
-              </a:defRPr>
-            </a:lvl9pPr>
-          </a:lstStyle>
-          <a:p>
-            <a:pPr>
-              <a:spcAft>
-                <a:spcPct val="30000"/>
-              </a:spcAft>
-            </a:pPr>
-            <a:r>
-              <a:rPr lang="pt-PT" altLang="en-US" sz="5800" b="1">
-                <a:effectLst>
-                  <a:outerShdw blurRad="38100" dist="38100" dir="2700000" algn="tl">
-                    <a:srgbClr val="C0C0C0"/>
-                  </a:outerShdw>
-                </a:effectLst>
-              </a:rPr>
-              <a:t>Título </a:t>
-            </a:r>
-          </a:p>
-        </p:txBody>
-      </p:sp>
-      <p:sp>
-        <p:nvSpPr>
-          <p:cNvPr id="3084" name="Text Box 12">
-            <a:extLst>
-              <a:ext uri="{FF2B5EF4-FFF2-40B4-BE49-F238E27FC236}">
-                <a16:creationId xmlns:a16="http://schemas.microsoft.com/office/drawing/2014/main" id="{353715EB-4CA4-52BC-0BC6-315640396A63}"/>
-              </a:ext>
-            </a:extLst>
-          </p:cNvPr>
-          <p:cNvSpPr txBox="1">
-            <a:spLocks noChangeArrowheads="1"/>
-          </p:cNvSpPr>
-          <p:nvPr/>
-        </p:nvSpPr>
-        <p:spPr bwMode="auto">
-          <a:xfrm>
-            <a:off x="11464925" y="8042275"/>
-            <a:ext cx="10660063" cy="4835525"/>
-          </a:xfrm>
-          <a:prstGeom prst="rect">
-            <a:avLst/>
-          </a:prstGeom>
-          <a:noFill/>
-          <a:ln>
-            <a:noFill/>
-          </a:ln>
-          <a:effectLst/>
-          <a:extLst>
-            <a:ext uri="{909E8E84-426E-40dd-AFC4-6F175D3DCCD1}">
-              <a14:hiddenFill xmlns:a14="http://schemas.microsoft.com/office/drawing/2010/main" xmlns="">
-                <a:solidFill>
-                  <a:schemeClr val="accent1"/>
-                </a:solidFill>
-              </a14:hiddenFill>
-            </a:ext>
-            <a:ext uri="{91240B29-F687-4f45-9708-019B960494DF}">
-              <a14:hiddenLine xmlns:a14="http://schemas.microsoft.com/office/drawing/2010/main" xmlns="" w="9525">
-                <a:solidFill>
-                  <a:schemeClr val="tx1"/>
-                </a:solidFill>
-                <a:miter lim="800000"/>
-                <a:headEnd/>
-                <a:tailEnd/>
-              </a14:hiddenLine>
-            </a:ext>
-            <a:ext uri="{AF507438-7753-43e0-B8FC-AC1667EBCBE1}">
-              <a14:hiddenEffects xmlns:a14="http://schemas.microsoft.com/office/drawing/2010/main" xmlns="">
-                <a:effectLst>
-                  <a:outerShdw blurRad="63500" dist="38099" dir="2700000" algn="ctr" rotWithShape="0">
-                    <a:schemeClr val="bg2">
-                      <a:alpha val="74998"/>
-                    </a:schemeClr>
-                  </a:outerShdw>
-                </a:effectLst>
-              </a14:hiddenEffects>
-            </a:ext>
-          </a:extLst>
-        </p:spPr>
-        <p:txBody>
-          <a:bodyPr lIns="88562" tIns="44281" rIns="88562" bIns="44281">
-            <a:spAutoFit/>
-          </a:bodyPr>
-          <a:lstStyle>
-            <a:lvl1pPr defTabSz="885825" eaLnBrk="0" hangingPunct="0">
-              <a:defRPr sz="8200">
-                <a:solidFill>
-                  <a:schemeClr val="tx1"/>
-                </a:solidFill>
-                <a:latin typeface="Arial" panose="020B0604020202020204" pitchFamily="34" charset="0"/>
-                <a:ea typeface="MS PGothic" panose="020B0600070205080204" pitchFamily="34" charset="-128"/>
-              </a:defRPr>
-            </a:lvl1pPr>
-            <a:lvl2pPr marL="742950" indent="-285750" defTabSz="885825" eaLnBrk="0" hangingPunct="0">
-              <a:defRPr sz="8200">
-                <a:solidFill>
-                  <a:schemeClr val="tx1"/>
-                </a:solidFill>
-                <a:latin typeface="Arial" panose="020B0604020202020204" pitchFamily="34" charset="0"/>
-                <a:ea typeface="MS PGothic" panose="020B0600070205080204" pitchFamily="34" charset="-128"/>
-              </a:defRPr>
-            </a:lvl2pPr>
-            <a:lvl3pPr marL="1143000" indent="-228600" defTabSz="885825" eaLnBrk="0" hangingPunct="0">
-              <a:defRPr sz="8200">
-                <a:solidFill>
-                  <a:schemeClr val="tx1"/>
-                </a:solidFill>
-                <a:latin typeface="Arial" panose="020B0604020202020204" pitchFamily="34" charset="0"/>
-                <a:ea typeface="MS PGothic" panose="020B0600070205080204" pitchFamily="34" charset="-128"/>
-              </a:defRPr>
-            </a:lvl3pPr>
-            <a:lvl4pPr marL="1600200" indent="-228600" defTabSz="885825" eaLnBrk="0" hangingPunct="0">
-              <a:defRPr sz="8200">
-                <a:solidFill>
-                  <a:schemeClr val="tx1"/>
-                </a:solidFill>
-                <a:latin typeface="Arial" panose="020B0604020202020204" pitchFamily="34" charset="0"/>
-                <a:ea typeface="MS PGothic" panose="020B0600070205080204" pitchFamily="34" charset="-128"/>
-              </a:defRPr>
-            </a:lvl4pPr>
-            <a:lvl5pPr marL="2057400" indent="-228600" defTabSz="885825" eaLnBrk="0" hangingPunct="0">
-              <a:defRPr sz="8200">
-                <a:solidFill>
-                  <a:schemeClr val="tx1"/>
-                </a:solidFill>
-                <a:latin typeface="Arial" panose="020B0604020202020204" pitchFamily="34" charset="0"/>
-                <a:ea typeface="MS PGothic" panose="020B0600070205080204" pitchFamily="34" charset="-128"/>
-              </a:defRPr>
-            </a:lvl5pPr>
-            <a:lvl6pPr marL="2514600" indent="-228600" defTabSz="885825" eaLnBrk="0" fontAlgn="base" hangingPunct="0">
-              <a:spcBef>
-                <a:spcPct val="0"/>
-              </a:spcBef>
-              <a:spcAft>
-                <a:spcPct val="0"/>
-              </a:spcAft>
-              <a:defRPr sz="8200">
-                <a:solidFill>
-                  <a:schemeClr val="tx1"/>
-                </a:solidFill>
-                <a:latin typeface="Arial" panose="020B0604020202020204" pitchFamily="34" charset="0"/>
-                <a:ea typeface="MS PGothic" panose="020B0600070205080204" pitchFamily="34" charset="-128"/>
-              </a:defRPr>
-            </a:lvl6pPr>
-            <a:lvl7pPr marL="2971800" indent="-228600" defTabSz="885825" eaLnBrk="0" fontAlgn="base" hangingPunct="0">
-              <a:spcBef>
-                <a:spcPct val="0"/>
-              </a:spcBef>
-              <a:spcAft>
-                <a:spcPct val="0"/>
-              </a:spcAft>
-              <a:defRPr sz="8200">
-                <a:solidFill>
-                  <a:schemeClr val="tx1"/>
-                </a:solidFill>
-                <a:latin typeface="Arial" panose="020B0604020202020204" pitchFamily="34" charset="0"/>
-                <a:ea typeface="MS PGothic" panose="020B0600070205080204" pitchFamily="34" charset="-128"/>
-              </a:defRPr>
-            </a:lvl7pPr>
-            <a:lvl8pPr marL="3429000" indent="-228600" defTabSz="885825" eaLnBrk="0" fontAlgn="base" hangingPunct="0">
-              <a:spcBef>
-                <a:spcPct val="0"/>
-              </a:spcBef>
-              <a:spcAft>
-                <a:spcPct val="0"/>
-              </a:spcAft>
-              <a:defRPr sz="8200">
-                <a:solidFill>
-                  <a:schemeClr val="tx1"/>
-                </a:solidFill>
-                <a:latin typeface="Arial" panose="020B0604020202020204" pitchFamily="34" charset="0"/>
-                <a:ea typeface="MS PGothic" panose="020B0600070205080204" pitchFamily="34" charset="-128"/>
-              </a:defRPr>
-            </a:lvl8pPr>
-            <a:lvl9pPr marL="3886200" indent="-228600" defTabSz="885825" eaLnBrk="0" fontAlgn="base" hangingPunct="0">
-              <a:spcBef>
-                <a:spcPct val="0"/>
-              </a:spcBef>
-              <a:spcAft>
-                <a:spcPct val="0"/>
-              </a:spcAft>
-              <a:defRPr sz="8200">
-                <a:solidFill>
-                  <a:schemeClr val="tx1"/>
-                </a:solidFill>
-                <a:latin typeface="Arial" panose="020B0604020202020204" pitchFamily="34" charset="0"/>
-                <a:ea typeface="MS PGothic" panose="020B0600070205080204" pitchFamily="34" charset="-128"/>
-              </a:defRPr>
-            </a:lvl9pPr>
-          </a:lstStyle>
-          <a:p>
-            <a:pPr algn="just">
-              <a:spcAft>
-                <a:spcPct val="30000"/>
-              </a:spcAft>
-              <a:buClr>
-                <a:srgbClr val="FF0000"/>
-              </a:buClr>
-              <a:buFont typeface="Symbol" panose="05050102010706020507" pitchFamily="18" charset="2"/>
-              <a:buNone/>
-            </a:pPr>
-            <a:r>
-              <a:rPr lang="pt-PT" altLang="en-US" sz="2400">
-                <a:effectLst>
-                  <a:outerShdw blurRad="38100" dist="38100" dir="2700000" algn="tl">
-                    <a:srgbClr val="C0C0C0"/>
-                  </a:outerShdw>
-                </a:effectLst>
-              </a:rPr>
-              <a:t>Texto ou imagens Texto ou imagens Texto ou imagens Texto ou imagens Texto ou imagens Texto ou imagens Texto ou imagens Texto ou imagens Texto ou imagens Texto ou imagens Texto ou imagens Texto ou imagens Texto ou imagens Texto ou imagens Texto ou imagens Texto ou imagens Texto ou imagens Texto ou imagens Texto ou imagens Texto ou imagens Texto ou imagens Texto ou imagens Texto ou imagens Texto ou imagens Texto ou imagens Texto ou imagens Texto ou imagens Texto ou imagens Texto ou imagens Texto ou imagens Texto ou imagens Texto ou imagens Texto ou imagens Texto ou imagens Texto ou imagens Texto ou imagens Texto ou imagens Texto ou imagens Texto ou imagens Texto ou imagens Texto ou imagens Texto ou imagens Texto ou imagens Texto ou imagens Texto ou imagens Texto ou imagens Texto ou imagens Texto ou imagens Texto ou imagens Texto ou imagens Texto ou imagens Texto ou imagens </a:t>
-            </a:r>
-          </a:p>
-        </p:txBody>
-      </p:sp>
-      <p:sp>
-        <p:nvSpPr>
-          <p:cNvPr id="3085" name="Rectangle 13">
-            <a:extLst>
-              <a:ext uri="{FF2B5EF4-FFF2-40B4-BE49-F238E27FC236}">
-                <a16:creationId xmlns:a16="http://schemas.microsoft.com/office/drawing/2014/main" id="{D0CCD14F-8C1E-5998-405C-A0B195C89864}"/>
-              </a:ext>
-            </a:extLst>
-          </p:cNvPr>
-          <p:cNvSpPr>
-            <a:spLocks noChangeArrowheads="1"/>
-          </p:cNvSpPr>
-          <p:nvPr/>
-        </p:nvSpPr>
-        <p:spPr bwMode="auto">
-          <a:xfrm>
-            <a:off x="10891838" y="14779625"/>
-            <a:ext cx="11761787" cy="14254163"/>
-          </a:xfrm>
-          <a:prstGeom prst="rect">
-            <a:avLst/>
-          </a:prstGeom>
-          <a:noFill/>
-          <a:ln w="76200">
-            <a:solidFill>
-              <a:srgbClr val="326598"/>
-            </a:solidFill>
-            <a:miter lim="800000"/>
-            <a:headEnd/>
-            <a:tailEnd/>
-          </a:ln>
-          <a:effectLst/>
-          <a:extLst>
-            <a:ext uri="{909E8E84-426E-40dd-AFC4-6F175D3DCCD1}">
-              <a14:hiddenFill xmlns:a14="http://schemas.microsoft.com/office/drawing/2010/main" xmlns="">
-                <a:solidFill>
-                  <a:schemeClr val="accent1"/>
-                </a:solidFill>
-              </a14:hiddenFill>
-            </a:ext>
-            <a:ext uri="{AF507438-7753-43e0-B8FC-AC1667EBCBE1}">
-              <a14:hiddenEffects xmlns:a14="http://schemas.microsoft.com/office/drawing/2010/main" xmlns="">
-                <a:effectLst>
-                  <a:outerShdw blurRad="63500" dist="38099" dir="2700000" algn="ctr" rotWithShape="0">
-                    <a:schemeClr val="bg2">
-                      <a:alpha val="74998"/>
-                    </a:schemeClr>
-                  </a:outerShdw>
-                </a:effectLst>
-              </a14:hiddenEffects>
-            </a:ext>
-          </a:extLst>
-        </p:spPr>
-        <p:txBody>
-          <a:bodyPr wrap="none" anchor="ctr"/>
-          <a:lstStyle/>
-          <a:p>
-            <a:pPr>
-              <a:defRPr/>
-            </a:pPr>
-            <a:endParaRPr lang="en-US">
-              <a:latin typeface="Arial" charset="0"/>
-              <a:ea typeface="ＭＳ Ｐゴシック" charset="0"/>
-            </a:endParaRPr>
           </a:p>
         </p:txBody>
       </p:sp>
@@ -5259,8 +4811,8 @@
         </p:nvSpPr>
         <p:spPr bwMode="auto">
           <a:xfrm>
-            <a:off x="1482725" y="7673975"/>
-            <a:ext cx="7945438" cy="11607602"/>
+            <a:off x="1498973" y="11865512"/>
+            <a:ext cx="7970838" cy="13576063"/>
           </a:xfrm>
           <a:prstGeom prst="rect">
             <a:avLst/>
@@ -5272,14 +4824,14 @@
           <a:effectLst/>
           <a:extLst>
             <a:ext uri="{909E8E84-426E-40dd-AFC4-6F175D3DCCD1}">
-              <a14:hiddenFill xmlns:a14="http://schemas.microsoft.com/office/drawing/2010/main" xmlns="">
+              <a14:hiddenFill xmlns="" xmlns:a14="http://schemas.microsoft.com/office/drawing/2010/main">
                 <a:solidFill>
                   <a:schemeClr val="accent1"/>
                 </a:solidFill>
               </a14:hiddenFill>
             </a:ext>
             <a:ext uri="{91240B29-F687-4f45-9708-019B960494DF}">
-              <a14:hiddenLine xmlns:a14="http://schemas.microsoft.com/office/drawing/2010/main" xmlns="" w="9525">
+              <a14:hiddenLine xmlns="" xmlns:a14="http://schemas.microsoft.com/office/drawing/2010/main" w="9525">
                 <a:solidFill>
                   <a:schemeClr val="tx1"/>
                 </a:solidFill>
@@ -5289,7 +4841,7 @@
               </a14:hiddenLine>
             </a:ext>
             <a:ext uri="{AF507438-7753-43e0-B8FC-AC1667EBCBE1}">
-              <a14:hiddenEffects xmlns:a14="http://schemas.microsoft.com/office/drawing/2010/main" xmlns="">
+              <a14:hiddenEffects xmlns="" xmlns:a14="http://schemas.microsoft.com/office/drawing/2010/main">
                 <a:effectLst>
                   <a:outerShdw blurRad="63500" dist="38099" dir="2700000" algn="ctr" rotWithShape="0">
                     <a:schemeClr val="bg2">
@@ -5414,7 +4966,62 @@
             <a:pPr algn="just"/>
             <a:r>
               <a:rPr lang="pt-BR" altLang="en-US" sz="2400" dirty="0"/>
-              <a:t>Este relatório consiste na representação e documentação do decorrer do Estágio Profissional, realizado como parte integrante e conclusiva da Licenciatura em Engenharia informática pela Escola Superior de Tecnologia e Gestão do Instituto Politécnico de Beja. O Estágio Profissional desenvolveu-se na Optiply, em Évora, no ano letivo de 2021/2022, tendo como objetivo favorecer a integração e consolidação, no contexto da pratica, os conhecimentos teóricos adquiridos durante o decorrer da Licenciatura. O objetivo primordial do estágio seria o de integração no mundo do trabalho. A ideia de se estagiar na Optiply veio no sentido de propiciar ao estudante um primeiro contacto com a área do desenvolvimento em Backend, e a possibilidade de se desenvolver pessoalmente num ambiente de trabalho que seja compatível com o que se pretende fazer. As atividades foram desenvolvidas tendo sempre em conta os objetivos inicialmente delineados e que se propôs atingir para a função do estagiário, que foram: treino inicial via cursos do Udemy, o desenvolvimento de um projeto, planificação e implementação do mesmo. Este referido projeto foi um projeto de desenvolvimento de Backend, que foi desenvolvido em Java, utilizando o framework Micronaut, ligado a uma base de dados Postgres, e que foi desenvolvido num ambiente de desenvolvimento local usando containers Docker. A aprendizagem durante o estágio foi efetiva e percetível, na medida em que se desenvolveram diversas atividades que proporcionaram a aquisição e o desenvolvimento de diferentes competências técnicas e organizacionais. </a:t>
+              <a:t>Este poster consiste na representação gráfica informativa do decorrer do meu Estágio Profissional, realizado como parte integrante e conclusiva da Licenciatura em Engenharia informática pela Escola Superior de Tecnologia e Gestão do Instituto Politécnico de Beja.</a:t>
+            </a:r>
+          </a:p>
+          <a:p>
+            <a:pPr algn="just"/>
+            <a:endParaRPr lang="pt-BR" altLang="en-US" sz="2400" dirty="0"/>
+          </a:p>
+          <a:p>
+            <a:pPr algn="just"/>
+            <a:r>
+              <a:rPr lang="pt-BR" altLang="en-US" sz="2400" dirty="0"/>
+              <a:t>O Estágio Profissional desenvolveu-se na Optiply, em Évora, no ano letivo de 2021/2022, tendo como objetivo favorecer a integração e consolidação, no contexto da pratica, os conhecimentos teóricos adquiridos durante o decorrer da Licenciatura. O objetivo primordial do estágio seria o de integração no mundo do trabalho.</a:t>
+            </a:r>
+          </a:p>
+          <a:p>
+            <a:pPr algn="just"/>
+            <a:endParaRPr lang="pt-BR" altLang="en-US" sz="2400" dirty="0"/>
+          </a:p>
+          <a:p>
+            <a:pPr algn="just"/>
+            <a:r>
+              <a:rPr lang="pt-BR" altLang="en-US" sz="2400" dirty="0"/>
+              <a:t>A ideia de se estagiar na Optiply veio no sentido de propiciar ao estudante um primeiro contacto com a área do desenvolvimento em Backend, e a possibilidade de se desenvolver pessoalmente num ambiente de trabalho que seja compatível com o que se pretende fazer.</a:t>
+            </a:r>
+          </a:p>
+          <a:p>
+            <a:pPr algn="just"/>
+            <a:endParaRPr lang="pt-BR" altLang="en-US" sz="2400" dirty="0"/>
+          </a:p>
+          <a:p>
+            <a:pPr algn="just"/>
+            <a:r>
+              <a:rPr lang="pt-BR" altLang="en-US" sz="2400" dirty="0"/>
+              <a:t>As atividades foram desenvolvidas tendo sempre em conta os objetivos inicialmente delineados e que se propôs atingir para a função do estagiário, que foram: treino inicial via cursos do Udemy, o desenvolvimento de um projeto, planificação e implementação do mesmo.</a:t>
+            </a:r>
+          </a:p>
+          <a:p>
+            <a:pPr algn="just"/>
+            <a:endParaRPr lang="pt-BR" altLang="en-US" sz="2400" dirty="0"/>
+          </a:p>
+          <a:p>
+            <a:pPr algn="just"/>
+            <a:r>
+              <a:rPr lang="pt-BR" altLang="en-US" sz="2400" dirty="0"/>
+              <a:t>Este referido projeto foi um projeto de desenvolvimento de Backend, que foi desenvolvido em Java, utilizando o framework Micronaut, ligado a uma base de dados Postgres, e que foi desenvolvido num ambiente de desenvolvimento local usando containers Docker.</a:t>
+            </a:r>
+          </a:p>
+          <a:p>
+            <a:pPr algn="just"/>
+            <a:endParaRPr lang="pt-BR" altLang="en-US" sz="2400" dirty="0"/>
+          </a:p>
+          <a:p>
+            <a:pPr algn="just"/>
+            <a:r>
+              <a:rPr lang="pt-BR" altLang="en-US" sz="2400" dirty="0"/>
+              <a:t>A aprendizagem durante o estágio foi efetiva e percetível, na medida em que se desenvolveram diversas atividades que proporcionaram a aquisição e o desenvolvimento de diferentes competências técnicas e organizacionais. </a:t>
             </a:r>
             <a:endParaRPr lang="pt-PT" altLang="en-US" sz="2400" dirty="0"/>
           </a:p>
@@ -5436,8 +5043,8 @@
         </p:nvSpPr>
         <p:spPr bwMode="auto">
           <a:xfrm>
-            <a:off x="1353344" y="19972139"/>
-            <a:ext cx="8135938" cy="5127625"/>
+            <a:off x="11430330" y="25516951"/>
+            <a:ext cx="10630347" cy="3594419"/>
           </a:xfrm>
           <a:prstGeom prst="rect">
             <a:avLst/>
@@ -5449,14 +5056,14 @@
           <a:effectLst/>
           <a:extLst>
             <a:ext uri="{909E8E84-426E-40dd-AFC4-6F175D3DCCD1}">
-              <a14:hiddenFill xmlns:a14="http://schemas.microsoft.com/office/drawing/2010/main" xmlns="">
+              <a14:hiddenFill xmlns="" xmlns:a14="http://schemas.microsoft.com/office/drawing/2010/main">
                 <a:solidFill>
                   <a:schemeClr val="accent1"/>
                 </a:solidFill>
               </a14:hiddenFill>
             </a:ext>
             <a:ext uri="{91240B29-F687-4f45-9708-019B960494DF}">
-              <a14:hiddenLine xmlns:a14="http://schemas.microsoft.com/office/drawing/2010/main" xmlns="" w="9525">
+              <a14:hiddenLine xmlns="" xmlns:a14="http://schemas.microsoft.com/office/drawing/2010/main" w="9525">
                 <a:solidFill>
                   <a:schemeClr val="tx1"/>
                 </a:solidFill>
@@ -5466,7 +5073,7 @@
               </a14:hiddenLine>
             </a:ext>
             <a:ext uri="{AF507438-7753-43e0-B8FC-AC1667EBCBE1}">
-              <a14:hiddenEffects xmlns:a14="http://schemas.microsoft.com/office/drawing/2010/main" xmlns="">
+              <a14:hiddenEffects xmlns="" xmlns:a14="http://schemas.microsoft.com/office/drawing/2010/main">
                 <a:effectLst>
                   <a:outerShdw blurRad="63500" dist="38099" dir="2700000" algn="ctr" rotWithShape="0">
                     <a:schemeClr val="bg2">
@@ -5599,13 +5206,7 @@
               <a:buNone/>
             </a:pPr>
             <a:r>
-              <a:rPr lang="pt-BR" altLang="en-US" sz="2400" dirty="0">
-                <a:effectLst>
-                  <a:outerShdw blurRad="38100" dist="38100" dir="2700000" algn="tl">
-                    <a:srgbClr val="C0C0C0"/>
-                  </a:outerShdw>
-                </a:effectLst>
-              </a:rPr>
+              <a:rPr lang="pt-BR" altLang="en-US" sz="2400" dirty="0"/>
               <a:t>O meu papel como estagiário foi um de treino para desenvolvimento em backend com um pequeno projeto, um microserviço que realiza a gestão de especificações de lojas online. Este projeto envolveu variadas tecnologias e paradigmas de trabalho e de programação, os quais passam por diversas etapas de desenvolvimento, testes e documentação, mas no que toca à gestão e organização de projeto foi de escolha livre, ou seja, eu geria o meu tempo e o projeto à minha vontade sem vigilância ou controlo. O qual, admitindo a verdade, não geri o meu tempo de qualquer forma, apenas os objetivos de projeto em sí, num estilo primitivo de Kanban.</a:t>
             </a:r>
             <a:endParaRPr lang="pt-PT" altLang="en-US" sz="2400" dirty="0"/>
@@ -5628,8 +5229,8 @@
         </p:nvSpPr>
         <p:spPr bwMode="auto">
           <a:xfrm>
-            <a:off x="23666450" y="23636288"/>
-            <a:ext cx="18116550" cy="5365750"/>
+            <a:off x="23708098" y="23829952"/>
+            <a:ext cx="18116550" cy="5646706"/>
           </a:xfrm>
           <a:prstGeom prst="rect">
             <a:avLst/>
@@ -5646,14 +5247,14 @@
           <a:effectLst/>
           <a:extLst>
             <a:ext uri="{909E8E84-426E-40dd-AFC4-6F175D3DCCD1}">
-              <a14:hiddenFill xmlns:a14="http://schemas.microsoft.com/office/drawing/2010/main" xmlns="">
+              <a14:hiddenFill xmlns="" xmlns:a14="http://schemas.microsoft.com/office/drawing/2010/main">
                 <a:solidFill>
                   <a:schemeClr val="accent1"/>
                 </a:solidFill>
               </a14:hiddenFill>
             </a:ext>
             <a:ext uri="{AF507438-7753-43e0-B8FC-AC1667EBCBE1}">
-              <a14:hiddenEffects xmlns:a14="http://schemas.microsoft.com/office/drawing/2010/main" xmlns="">
+              <a14:hiddenEffects xmlns="" xmlns:a14="http://schemas.microsoft.com/office/drawing/2010/main">
                 <a:effectLst>
                   <a:outerShdw blurRad="63500" dist="38099" dir="2700000" algn="ctr" rotWithShape="0">
                     <a:schemeClr val="bg2">
@@ -5695,7 +5296,7 @@
         </p:nvSpPr>
         <p:spPr bwMode="auto">
           <a:xfrm>
-            <a:off x="23996650" y="23852188"/>
+            <a:off x="24033536" y="24412051"/>
             <a:ext cx="4103688" cy="1019175"/>
           </a:xfrm>
           <a:prstGeom prst="rect">
@@ -5708,14 +5309,14 @@
           <a:effectLst/>
           <a:extLst>
             <a:ext uri="{909E8E84-426E-40dd-AFC4-6F175D3DCCD1}">
-              <a14:hiddenFill xmlns:a14="http://schemas.microsoft.com/office/drawing/2010/main" xmlns="">
+              <a14:hiddenFill xmlns="" xmlns:a14="http://schemas.microsoft.com/office/drawing/2010/main">
                 <a:solidFill>
                   <a:schemeClr val="accent1"/>
                 </a:solidFill>
               </a14:hiddenFill>
             </a:ext>
             <a:ext uri="{91240B29-F687-4f45-9708-019B960494DF}">
-              <a14:hiddenLine xmlns:a14="http://schemas.microsoft.com/office/drawing/2010/main" xmlns="" w="9525">
+              <a14:hiddenLine xmlns="" xmlns:a14="http://schemas.microsoft.com/office/drawing/2010/main" w="9525">
                 <a:solidFill>
                   <a:schemeClr val="tx1"/>
                 </a:solidFill>
@@ -5725,7 +5326,7 @@
               </a14:hiddenLine>
             </a:ext>
             <a:ext uri="{AF507438-7753-43e0-B8FC-AC1667EBCBE1}">
-              <a14:hiddenEffects xmlns:a14="http://schemas.microsoft.com/office/drawing/2010/main" xmlns="">
+              <a14:hiddenEffects xmlns="" xmlns:a14="http://schemas.microsoft.com/office/drawing/2010/main">
                 <a:effectLst>
                   <a:outerShdw blurRad="63500" dist="38099" dir="2700000" algn="ctr" rotWithShape="0">
                     <a:schemeClr val="bg2">
@@ -5850,7 +5451,7 @@
           </a:lstStyle>
           <a:p>
             <a:r>
-              <a:rPr lang="pt-PT" altLang="en-US" sz="6000" b="1">
+              <a:rPr lang="pt-PT" altLang="en-US" sz="6000" b="1" dirty="0">
                 <a:effectLst>
                   <a:outerShdw blurRad="38100" dist="38100" dir="2700000" algn="tl">
                     <a:srgbClr val="C0C0C0"/>
@@ -5878,8 +5479,8 @@
         </p:nvSpPr>
         <p:spPr bwMode="auto">
           <a:xfrm>
-            <a:off x="23985538" y="24933275"/>
-            <a:ext cx="17262475" cy="3724275"/>
+            <a:off x="24022424" y="25493138"/>
+            <a:ext cx="17262475" cy="3399293"/>
           </a:xfrm>
           <a:prstGeom prst="rect">
             <a:avLst/>
@@ -5891,14 +5492,14 @@
           <a:effectLst/>
           <a:extLst>
             <a:ext uri="{909E8E84-426E-40dd-AFC4-6F175D3DCCD1}">
-              <a14:hiddenFill xmlns:a14="http://schemas.microsoft.com/office/drawing/2010/main" xmlns="">
+              <a14:hiddenFill xmlns="" xmlns:a14="http://schemas.microsoft.com/office/drawing/2010/main">
                 <a:solidFill>
                   <a:schemeClr val="accent1"/>
                 </a:solidFill>
               </a14:hiddenFill>
             </a:ext>
             <a:ext uri="{91240B29-F687-4f45-9708-019B960494DF}">
-              <a14:hiddenLine xmlns:a14="http://schemas.microsoft.com/office/drawing/2010/main" xmlns="" w="9525">
+              <a14:hiddenLine xmlns="" xmlns:a14="http://schemas.microsoft.com/office/drawing/2010/main" w="9525">
                 <a:solidFill>
                   <a:schemeClr val="tx1"/>
                 </a:solidFill>
@@ -5908,7 +5509,7 @@
               </a14:hiddenLine>
             </a:ext>
             <a:ext uri="{AF507438-7753-43e0-B8FC-AC1667EBCBE1}">
-              <a14:hiddenEffects xmlns:a14="http://schemas.microsoft.com/office/drawing/2010/main" xmlns="">
+              <a14:hiddenEffects xmlns="" xmlns:a14="http://schemas.microsoft.com/office/drawing/2010/main">
                 <a:effectLst>
                   <a:outerShdw blurRad="63500" dist="38099" dir="2700000" algn="ctr" rotWithShape="0">
                     <a:schemeClr val="bg2">
@@ -6034,196 +5635,32 @@
           <a:p>
             <a:pPr algn="just"/>
             <a:r>
-              <a:rPr lang="pt-PT" altLang="en-US" sz="2400"/>
-              <a:t>Texto ou imagens Texto ou imagens Texto ou imagens Texto ou imagens Texto ou imagens Texto ou imagens Texto ou imagens Texto ou imagens Texto ou imagens Texto ou imagens Texto ou imagens Texto ou imagens Texto ou imagens Texto ou imagens Texto ou imagens Texto ou imagens Texto ou imagens Texto ou imagens Texto ou imagens Texto ou imagens Texto ou imagens Texto ou imagens Texto ou imagens Texto ou imagens Texto ou imagens Texto ou imagens Texto ou imagens Texto ou imagens Texto ou imagens Texto ou imagens Texto ou imagens Texto ou imagens Texto ou imagens Texto ou imagens Texto ou imagens Texto ou imagens Texto ou imagens Texto ou imagens Texto ou imagens Texto ou imagens Texto ou imagens Texto ou imagens Texto ou imagens Texto ou imagens Texto ou imagens Texto ou imagens Texto ou imagens Texto ou imagens Texto ou imagens Texto ou imagens Texto ou imagens Texto ou imagens </a:t>
+              <a:rPr lang="pt-BR" altLang="en-US" sz="2400" dirty="0"/>
+              <a:t>Finalmente, chegamos à conclusão. Onde posso, com toda a confiança e autoridade, afirmar que este processo de desenvolvimento profissional e pessoal foi um sucesso.</a:t>
             </a:r>
           </a:p>
           <a:p>
             <a:pPr algn="just"/>
-            <a:r>
-              <a:rPr lang="pt-PT" altLang="en-US" sz="2400"/>
-              <a:t>Texto ou imagens Texto ou imagens Texto ou imagens Texto ou imagens Texto ou imagens Texto ou imagens Texto ou imagens</a:t>
-            </a:r>
-          </a:p>
-        </p:txBody>
-      </p:sp>
-      <p:sp>
-        <p:nvSpPr>
-          <p:cNvPr id="3211" name="Text Box 139">
-            <a:extLst>
-              <a:ext uri="{FF2B5EF4-FFF2-40B4-BE49-F238E27FC236}">
-                <a16:creationId xmlns:a16="http://schemas.microsoft.com/office/drawing/2014/main" id="{F2E66D91-CF70-50C9-ED03-B80283C0E09A}"/>
-              </a:ext>
-            </a:extLst>
-          </p:cNvPr>
-          <p:cNvSpPr txBox="1">
-            <a:spLocks noChangeArrowheads="1"/>
-          </p:cNvSpPr>
-          <p:nvPr/>
-        </p:nvSpPr>
-        <p:spPr bwMode="auto">
-          <a:xfrm>
-            <a:off x="11451779" y="21507407"/>
-            <a:ext cx="4408487" cy="383083"/>
-          </a:xfrm>
-          <a:prstGeom prst="rect">
-            <a:avLst/>
-          </a:prstGeom>
-          <a:noFill/>
-          <a:ln>
-            <a:noFill/>
-          </a:ln>
-          <a:effectLst/>
-          <a:extLst>
-            <a:ext uri="{909E8E84-426E-40dd-AFC4-6F175D3DCCD1}">
-              <a14:hiddenFill xmlns:a14="http://schemas.microsoft.com/office/drawing/2010/main" xmlns="">
-                <a:solidFill>
-                  <a:schemeClr val="accent1"/>
-                </a:solidFill>
-              </a14:hiddenFill>
-            </a:ext>
-            <a:ext uri="{91240B29-F687-4f45-9708-019B960494DF}">
-              <a14:hiddenLine xmlns:a14="http://schemas.microsoft.com/office/drawing/2010/main" xmlns="" w="9525">
-                <a:solidFill>
-                  <a:schemeClr val="tx1"/>
-                </a:solidFill>
-                <a:miter lim="800000"/>
-                <a:headEnd/>
-                <a:tailEnd/>
-              </a14:hiddenLine>
-            </a:ext>
-            <a:ext uri="{AF507438-7753-43e0-B8FC-AC1667EBCBE1}">
-              <a14:hiddenEffects xmlns:a14="http://schemas.microsoft.com/office/drawing/2010/main" xmlns="">
-                <a:effectLst>
-                  <a:outerShdw blurRad="63500" dist="38099" dir="2700000" algn="ctr" rotWithShape="0">
-                    <a:schemeClr val="bg2">
-                      <a:alpha val="74998"/>
-                    </a:schemeClr>
-                  </a:outerShdw>
-                </a:effectLst>
-              </a14:hiddenEffects>
-            </a:ext>
-          </a:extLst>
-        </p:spPr>
-        <p:txBody>
-          <a:bodyPr lIns="74578" tIns="37289" rIns="74578" bIns="37289">
-            <a:spAutoFit/>
-          </a:bodyPr>
-          <a:lstStyle>
-            <a:lvl1pPr defTabSz="746125">
-              <a:defRPr>
-                <a:solidFill>
-                  <a:schemeClr val="tx1"/>
-                </a:solidFill>
-                <a:latin typeface="Arial" charset="0"/>
-                <a:ea typeface="ＭＳ Ｐゴシック" charset="0"/>
-              </a:defRPr>
-            </a:lvl1pPr>
-            <a:lvl2pPr marL="373063" defTabSz="746125">
-              <a:defRPr>
-                <a:solidFill>
-                  <a:schemeClr val="tx1"/>
-                </a:solidFill>
-                <a:latin typeface="Arial" charset="0"/>
-                <a:ea typeface="ＭＳ Ｐゴシック" charset="0"/>
-              </a:defRPr>
-            </a:lvl2pPr>
-            <a:lvl3pPr marL="746125" defTabSz="746125">
-              <a:defRPr>
-                <a:solidFill>
-                  <a:schemeClr val="tx1"/>
-                </a:solidFill>
-                <a:latin typeface="Arial" charset="0"/>
-                <a:ea typeface="ＭＳ Ｐゴシック" charset="0"/>
-              </a:defRPr>
-            </a:lvl3pPr>
-            <a:lvl4pPr marL="1119188" defTabSz="746125">
-              <a:defRPr>
-                <a:solidFill>
-                  <a:schemeClr val="tx1"/>
-                </a:solidFill>
-                <a:latin typeface="Arial" charset="0"/>
-                <a:ea typeface="ＭＳ Ｐゴシック" charset="0"/>
-              </a:defRPr>
-            </a:lvl4pPr>
-            <a:lvl5pPr marL="1492250" defTabSz="746125">
-              <a:defRPr>
-                <a:solidFill>
-                  <a:schemeClr val="tx1"/>
-                </a:solidFill>
-                <a:latin typeface="Arial" charset="0"/>
-                <a:ea typeface="ＭＳ Ｐゴシック" charset="0"/>
-              </a:defRPr>
-            </a:lvl5pPr>
-            <a:lvl6pPr marL="1949450" defTabSz="746125" fontAlgn="base">
-              <a:spcBef>
-                <a:spcPct val="0"/>
-              </a:spcBef>
-              <a:spcAft>
-                <a:spcPct val="0"/>
-              </a:spcAft>
-              <a:defRPr>
-                <a:solidFill>
-                  <a:schemeClr val="tx1"/>
-                </a:solidFill>
-                <a:latin typeface="Arial" charset="0"/>
-                <a:ea typeface="ＭＳ Ｐゴシック" charset="0"/>
-              </a:defRPr>
-            </a:lvl6pPr>
-            <a:lvl7pPr marL="2406650" defTabSz="746125" fontAlgn="base">
-              <a:spcBef>
-                <a:spcPct val="0"/>
-              </a:spcBef>
-              <a:spcAft>
-                <a:spcPct val="0"/>
-              </a:spcAft>
-              <a:defRPr>
-                <a:solidFill>
-                  <a:schemeClr val="tx1"/>
-                </a:solidFill>
-                <a:latin typeface="Arial" charset="0"/>
-                <a:ea typeface="ＭＳ Ｐゴシック" charset="0"/>
-              </a:defRPr>
-            </a:lvl7pPr>
-            <a:lvl8pPr marL="2863850" defTabSz="746125" fontAlgn="base">
-              <a:spcBef>
-                <a:spcPct val="0"/>
-              </a:spcBef>
-              <a:spcAft>
-                <a:spcPct val="0"/>
-              </a:spcAft>
-              <a:defRPr>
-                <a:solidFill>
-                  <a:schemeClr val="tx1"/>
-                </a:solidFill>
-                <a:latin typeface="Arial" charset="0"/>
-                <a:ea typeface="ＭＳ Ｐゴシック" charset="0"/>
-              </a:defRPr>
-            </a:lvl8pPr>
-            <a:lvl9pPr marL="3321050" defTabSz="746125" fontAlgn="base">
-              <a:spcBef>
-                <a:spcPct val="0"/>
-              </a:spcBef>
-              <a:spcAft>
-                <a:spcPct val="0"/>
-              </a:spcAft>
-              <a:defRPr>
-                <a:solidFill>
-                  <a:schemeClr val="tx1"/>
-                </a:solidFill>
-                <a:latin typeface="Arial" charset="0"/>
-                <a:ea typeface="ＭＳ Ｐゴシック" charset="0"/>
-              </a:defRPr>
-            </a:lvl9pPr>
-          </a:lstStyle>
-          <a:p>
-            <a:pPr eaLnBrk="0" hangingPunct="0">
-              <a:defRPr/>
-            </a:pPr>
-            <a:r>
-              <a:rPr lang="pt-PT" sz="2000" dirty="0"/>
-              <a:t>Figura 2: Software usado no estágio</a:t>
-            </a:r>
+            <a:endParaRPr lang="pt-BR" altLang="en-US" sz="2400" dirty="0"/>
+          </a:p>
+          <a:p>
+            <a:pPr algn="just"/>
+            <a:r>
+              <a:rPr lang="pt-BR" altLang="en-US" sz="2400" dirty="0"/>
+              <a:t>Aqui apliquei os meus conhecimentos, aprendi novos conceitos adjacentes aos que trouxe do meu percurso académico e com eles desenvolvi um projeto prático que os demonstra.</a:t>
+            </a:r>
+          </a:p>
+          <a:p>
+            <a:pPr algn="just"/>
+            <a:endParaRPr lang="pt-BR" altLang="en-US" sz="2400" dirty="0"/>
+          </a:p>
+          <a:p>
+            <a:pPr algn="just"/>
+            <a:r>
+              <a:rPr lang="pt-BR" altLang="en-US" sz="2400" dirty="0"/>
+              <a:t>Em suma, foi um estágio principalmente remoto que consolidou o conhecimento cristalino adquirido academicamente de forma prática e livre porém guiada, num microserviço em Micronaut, Java, desenvolvimento reactivo e pesquisa (com muito “Google-Fu” envolvido).</a:t>
+            </a:r>
+            <a:endParaRPr lang="pt-PT" altLang="en-US" sz="2400" dirty="0"/>
           </a:p>
         </p:txBody>
       </p:sp>
@@ -6243,8 +5680,8 @@
         </p:nvSpPr>
         <p:spPr bwMode="auto">
           <a:xfrm>
-            <a:off x="23674388" y="5851525"/>
-            <a:ext cx="18108612" cy="17262475"/>
+            <a:off x="23708098" y="10258372"/>
+            <a:ext cx="18116550" cy="12878433"/>
           </a:xfrm>
           <a:prstGeom prst="rect">
             <a:avLst/>
@@ -6261,14 +5698,14 @@
           <a:effectLst/>
           <a:extLst>
             <a:ext uri="{909E8E84-426E-40dd-AFC4-6F175D3DCCD1}">
-              <a14:hiddenFill xmlns:a14="http://schemas.microsoft.com/office/drawing/2010/main" xmlns="">
+              <a14:hiddenFill xmlns="" xmlns:a14="http://schemas.microsoft.com/office/drawing/2010/main">
                 <a:solidFill>
                   <a:schemeClr val="accent1"/>
                 </a:solidFill>
               </a14:hiddenFill>
             </a:ext>
             <a:ext uri="{AF507438-7753-43e0-B8FC-AC1667EBCBE1}">
-              <a14:hiddenEffects xmlns:a14="http://schemas.microsoft.com/office/drawing/2010/main" xmlns="">
+              <a14:hiddenEffects xmlns="" xmlns:a14="http://schemas.microsoft.com/office/drawing/2010/main">
                 <a:effectLst>
                   <a:outerShdw blurRad="63500" dist="38099" dir="2700000" algn="ctr" rotWithShape="0">
                     <a:schemeClr val="bg2">
@@ -6310,8 +5747,8 @@
         </p:nvSpPr>
         <p:spPr bwMode="auto">
           <a:xfrm>
-            <a:off x="23991888" y="7794625"/>
-            <a:ext cx="17359312" cy="14746288"/>
+            <a:off x="24033536" y="11986163"/>
+            <a:ext cx="17359312" cy="6569503"/>
           </a:xfrm>
           <a:prstGeom prst="rect">
             <a:avLst/>
@@ -6323,14 +5760,14 @@
           <a:effectLst/>
           <a:extLst>
             <a:ext uri="{909E8E84-426E-40dd-AFC4-6F175D3DCCD1}">
-              <a14:hiddenFill xmlns:a14="http://schemas.microsoft.com/office/drawing/2010/main" xmlns="">
+              <a14:hiddenFill xmlns="" xmlns:a14="http://schemas.microsoft.com/office/drawing/2010/main">
                 <a:solidFill>
                   <a:schemeClr val="accent1"/>
                 </a:solidFill>
               </a14:hiddenFill>
             </a:ext>
             <a:ext uri="{91240B29-F687-4f45-9708-019B960494DF}">
-              <a14:hiddenLine xmlns:a14="http://schemas.microsoft.com/office/drawing/2010/main" xmlns="" w="9525">
+              <a14:hiddenLine xmlns="" xmlns:a14="http://schemas.microsoft.com/office/drawing/2010/main" w="9525">
                 <a:solidFill>
                   <a:schemeClr val="tx1"/>
                 </a:solidFill>
@@ -6340,7 +5777,7 @@
               </a14:hiddenLine>
             </a:ext>
             <a:ext uri="{AF507438-7753-43e0-B8FC-AC1667EBCBE1}">
-              <a14:hiddenEffects xmlns:a14="http://schemas.microsoft.com/office/drawing/2010/main" xmlns="">
+              <a14:hiddenEffects xmlns="" xmlns:a14="http://schemas.microsoft.com/office/drawing/2010/main">
                 <a:effectLst>
                   <a:outerShdw blurRad="63500" dist="38099" dir="2700000" algn="ctr" rotWithShape="0">
                     <a:schemeClr val="bg2">
@@ -6476,712 +5913,9 @@
               <a:buNone/>
             </a:pPr>
             <a:r>
-              <a:rPr lang="pt-PT" altLang="en-US" sz="2400">
-                <a:effectLst>
-                  <a:outerShdw blurRad="38100" dist="38100" dir="2700000" algn="tl">
-                    <a:srgbClr val="C0C0C0"/>
-                  </a:outerShdw>
-                </a:effectLst>
-              </a:rPr>
-              <a:t>Texto ou imagens Texto ou imagens</a:t>
-            </a:r>
-            <a:r>
-              <a:rPr lang="pt-PT" altLang="en-US" sz="2400"/>
-              <a:t> </a:t>
-            </a:r>
-            <a:r>
-              <a:rPr lang="pt-PT" altLang="en-US" sz="2400">
-                <a:effectLst>
-                  <a:outerShdw blurRad="38100" dist="38100" dir="2700000" algn="tl">
-                    <a:srgbClr val="C0C0C0"/>
-                  </a:outerShdw>
-                </a:effectLst>
-              </a:rPr>
-              <a:t>Texto ou imagens</a:t>
-            </a:r>
-            <a:r>
-              <a:rPr lang="pt-PT" altLang="en-US" sz="2400"/>
-              <a:t> </a:t>
-            </a:r>
-            <a:r>
-              <a:rPr lang="pt-PT" altLang="en-US" sz="2400">
-                <a:effectLst>
-                  <a:outerShdw blurRad="38100" dist="38100" dir="2700000" algn="tl">
-                    <a:srgbClr val="C0C0C0"/>
-                  </a:outerShdw>
-                </a:effectLst>
-              </a:rPr>
-              <a:t>Texto ou imagens</a:t>
-            </a:r>
-            <a:r>
-              <a:rPr lang="pt-PT" altLang="en-US" sz="2400"/>
-              <a:t> </a:t>
-            </a:r>
-            <a:r>
-              <a:rPr lang="pt-PT" altLang="en-US" sz="2400">
-                <a:effectLst>
-                  <a:outerShdw blurRad="38100" dist="38100" dir="2700000" algn="tl">
-                    <a:srgbClr val="C0C0C0"/>
-                  </a:outerShdw>
-                </a:effectLst>
-              </a:rPr>
-              <a:t>Texto ou imagens</a:t>
-            </a:r>
-            <a:r>
-              <a:rPr lang="pt-PT" altLang="en-US" sz="2400"/>
-              <a:t> </a:t>
-            </a:r>
-            <a:r>
-              <a:rPr lang="pt-PT" altLang="en-US" sz="2400">
-                <a:effectLst>
-                  <a:outerShdw blurRad="38100" dist="38100" dir="2700000" algn="tl">
-                    <a:srgbClr val="C0C0C0"/>
-                  </a:outerShdw>
-                </a:effectLst>
-              </a:rPr>
-              <a:t>Texto ou imagens</a:t>
-            </a:r>
-            <a:r>
-              <a:rPr lang="pt-PT" altLang="en-US" sz="2400"/>
-              <a:t> </a:t>
-            </a:r>
-            <a:r>
-              <a:rPr lang="pt-PT" altLang="en-US" sz="2400">
-                <a:effectLst>
-                  <a:outerShdw blurRad="38100" dist="38100" dir="2700000" algn="tl">
-                    <a:srgbClr val="C0C0C0"/>
-                  </a:outerShdw>
-                </a:effectLst>
-              </a:rPr>
-              <a:t>Texto ou imagens</a:t>
-            </a:r>
-            <a:r>
-              <a:rPr lang="pt-PT" altLang="en-US" sz="2400"/>
-              <a:t> </a:t>
-            </a:r>
-            <a:r>
-              <a:rPr lang="pt-PT" altLang="en-US" sz="2400">
-                <a:effectLst>
-                  <a:outerShdw blurRad="38100" dist="38100" dir="2700000" algn="tl">
-                    <a:srgbClr val="C0C0C0"/>
-                  </a:outerShdw>
-                </a:effectLst>
-              </a:rPr>
-              <a:t>Texto ou imagens</a:t>
-            </a:r>
-            <a:r>
-              <a:rPr lang="pt-PT" altLang="en-US" sz="2400"/>
-              <a:t> </a:t>
-            </a:r>
-            <a:r>
-              <a:rPr lang="pt-PT" altLang="en-US" sz="2400">
-                <a:effectLst>
-                  <a:outerShdw blurRad="38100" dist="38100" dir="2700000" algn="tl">
-                    <a:srgbClr val="C0C0C0"/>
-                  </a:outerShdw>
-                </a:effectLst>
-              </a:rPr>
-              <a:t>Texto ou imagens</a:t>
-            </a:r>
-            <a:r>
-              <a:rPr lang="pt-PT" altLang="en-US" sz="2400"/>
-              <a:t> </a:t>
-            </a:r>
-            <a:r>
-              <a:rPr lang="pt-PT" altLang="en-US" sz="2400">
-                <a:effectLst>
-                  <a:outerShdw blurRad="38100" dist="38100" dir="2700000" algn="tl">
-                    <a:srgbClr val="C0C0C0"/>
-                  </a:outerShdw>
-                </a:effectLst>
-              </a:rPr>
-              <a:t>Texto ou imagens</a:t>
-            </a:r>
-            <a:r>
-              <a:rPr lang="pt-PT" altLang="en-US" sz="2400"/>
-              <a:t> </a:t>
-            </a:r>
-            <a:r>
-              <a:rPr lang="pt-PT" altLang="en-US" sz="2400">
-                <a:effectLst>
-                  <a:outerShdw blurRad="38100" dist="38100" dir="2700000" algn="tl">
-                    <a:srgbClr val="C0C0C0"/>
-                  </a:outerShdw>
-                </a:effectLst>
-              </a:rPr>
-              <a:t>Texto ou imagens</a:t>
-            </a:r>
-            <a:r>
-              <a:rPr lang="pt-PT" altLang="en-US" sz="2400"/>
-              <a:t> </a:t>
-            </a:r>
-            <a:r>
-              <a:rPr lang="pt-PT" altLang="en-US" sz="2400">
-                <a:effectLst>
-                  <a:outerShdw blurRad="38100" dist="38100" dir="2700000" algn="tl">
-                    <a:srgbClr val="C0C0C0"/>
-                  </a:outerShdw>
-                </a:effectLst>
-              </a:rPr>
-              <a:t>Texto ou imagens</a:t>
-            </a:r>
-            <a:r>
-              <a:rPr lang="pt-PT" altLang="en-US" sz="2400"/>
-              <a:t> </a:t>
-            </a:r>
-            <a:r>
-              <a:rPr lang="pt-PT" altLang="en-US" sz="2400">
-                <a:effectLst>
-                  <a:outerShdw blurRad="38100" dist="38100" dir="2700000" algn="tl">
-                    <a:srgbClr val="C0C0C0"/>
-                  </a:outerShdw>
-                </a:effectLst>
-              </a:rPr>
-              <a:t>Texto ou imagens</a:t>
-            </a:r>
-            <a:r>
-              <a:rPr lang="pt-PT" altLang="en-US" sz="2400"/>
-              <a:t> </a:t>
-            </a:r>
-            <a:r>
-              <a:rPr lang="pt-PT" altLang="en-US" sz="2400">
-                <a:effectLst>
-                  <a:outerShdw blurRad="38100" dist="38100" dir="2700000" algn="tl">
-                    <a:srgbClr val="C0C0C0"/>
-                  </a:outerShdw>
-                </a:effectLst>
-              </a:rPr>
-              <a:t>Texto ou imagens</a:t>
-            </a:r>
-            <a:r>
-              <a:rPr lang="pt-PT" altLang="en-US" sz="2400"/>
-              <a:t> </a:t>
-            </a:r>
-            <a:r>
-              <a:rPr lang="pt-PT" altLang="en-US" sz="2400">
-                <a:effectLst>
-                  <a:outerShdw blurRad="38100" dist="38100" dir="2700000" algn="tl">
-                    <a:srgbClr val="C0C0C0"/>
-                  </a:outerShdw>
-                </a:effectLst>
-              </a:rPr>
-              <a:t>Texto ou imagens</a:t>
-            </a:r>
-            <a:r>
-              <a:rPr lang="pt-PT" altLang="en-US" sz="2400"/>
-              <a:t> </a:t>
-            </a:r>
-            <a:r>
-              <a:rPr lang="pt-PT" altLang="en-US" sz="2400">
-                <a:effectLst>
-                  <a:outerShdw blurRad="38100" dist="38100" dir="2700000" algn="tl">
-                    <a:srgbClr val="C0C0C0"/>
-                  </a:outerShdw>
-                </a:effectLst>
-              </a:rPr>
-              <a:t>Texto ou imagens</a:t>
-            </a:r>
-            <a:r>
-              <a:rPr lang="pt-PT" altLang="en-US" sz="2400"/>
-              <a:t> </a:t>
-            </a:r>
-            <a:r>
-              <a:rPr lang="pt-PT" altLang="en-US" sz="2400">
-                <a:effectLst>
-                  <a:outerShdw blurRad="38100" dist="38100" dir="2700000" algn="tl">
-                    <a:srgbClr val="C0C0C0"/>
-                  </a:outerShdw>
-                </a:effectLst>
-              </a:rPr>
-              <a:t>Texto ou imagens</a:t>
-            </a:r>
-            <a:r>
-              <a:rPr lang="pt-PT" altLang="en-US" sz="2400"/>
-              <a:t> </a:t>
-            </a:r>
-            <a:r>
-              <a:rPr lang="pt-PT" altLang="en-US" sz="2400">
-                <a:effectLst>
-                  <a:outerShdw blurRad="38100" dist="38100" dir="2700000" algn="tl">
-                    <a:srgbClr val="C0C0C0"/>
-                  </a:outerShdw>
-                </a:effectLst>
-              </a:rPr>
-              <a:t>Texto ou imagens</a:t>
-            </a:r>
-            <a:r>
-              <a:rPr lang="pt-PT" altLang="en-US" sz="2400"/>
-              <a:t> </a:t>
-            </a:r>
-            <a:r>
-              <a:rPr lang="pt-PT" altLang="en-US" sz="2400">
-                <a:effectLst>
-                  <a:outerShdw blurRad="38100" dist="38100" dir="2700000" algn="tl">
-                    <a:srgbClr val="C0C0C0"/>
-                  </a:outerShdw>
-                </a:effectLst>
-              </a:rPr>
-              <a:t>Texto ou imagens</a:t>
-            </a:r>
-            <a:r>
-              <a:rPr lang="pt-PT" altLang="en-US" sz="2400"/>
-              <a:t> </a:t>
-            </a:r>
-            <a:r>
-              <a:rPr lang="pt-PT" altLang="en-US" sz="2400">
-                <a:effectLst>
-                  <a:outerShdw blurRad="38100" dist="38100" dir="2700000" algn="tl">
-                    <a:srgbClr val="C0C0C0"/>
-                  </a:outerShdw>
-                </a:effectLst>
-              </a:rPr>
-              <a:t>Texto ou imagens</a:t>
-            </a:r>
-            <a:r>
-              <a:rPr lang="pt-PT" altLang="en-US" sz="2400"/>
-              <a:t> </a:t>
-            </a:r>
-            <a:r>
-              <a:rPr lang="pt-PT" altLang="en-US" sz="2400">
-                <a:effectLst>
-                  <a:outerShdw blurRad="38100" dist="38100" dir="2700000" algn="tl">
-                    <a:srgbClr val="C0C0C0"/>
-                  </a:outerShdw>
-                </a:effectLst>
-              </a:rPr>
-              <a:t>Texto ou imagens</a:t>
-            </a:r>
-            <a:r>
-              <a:rPr lang="pt-PT" altLang="en-US" sz="2400"/>
-              <a:t> </a:t>
-            </a:r>
-            <a:r>
-              <a:rPr lang="pt-PT" altLang="en-US" sz="2400">
-                <a:effectLst>
-                  <a:outerShdw blurRad="38100" dist="38100" dir="2700000" algn="tl">
-                    <a:srgbClr val="C0C0C0"/>
-                  </a:outerShdw>
-                </a:effectLst>
-              </a:rPr>
-              <a:t>Texto ou imagens</a:t>
-            </a:r>
-            <a:r>
-              <a:rPr lang="pt-PT" altLang="en-US" sz="2400"/>
-              <a:t> </a:t>
-            </a:r>
-            <a:r>
-              <a:rPr lang="pt-PT" altLang="en-US" sz="2400">
-                <a:effectLst>
-                  <a:outerShdw blurRad="38100" dist="38100" dir="2700000" algn="tl">
-                    <a:srgbClr val="C0C0C0"/>
-                  </a:outerShdw>
-                </a:effectLst>
-              </a:rPr>
-              <a:t>Texto ou imagens</a:t>
-            </a:r>
-            <a:r>
-              <a:rPr lang="pt-PT" altLang="en-US" sz="2400"/>
-              <a:t> </a:t>
-            </a:r>
-            <a:r>
-              <a:rPr lang="pt-PT" altLang="en-US" sz="2400">
-                <a:effectLst>
-                  <a:outerShdw blurRad="38100" dist="38100" dir="2700000" algn="tl">
-                    <a:srgbClr val="C0C0C0"/>
-                  </a:outerShdw>
-                </a:effectLst>
-              </a:rPr>
-              <a:t>Texto ou imagens</a:t>
-            </a:r>
-            <a:r>
-              <a:rPr lang="pt-PT" altLang="en-US" sz="2400"/>
-              <a:t> </a:t>
-            </a:r>
-            <a:r>
-              <a:rPr lang="pt-PT" altLang="en-US" sz="2400">
-                <a:effectLst>
-                  <a:outerShdw blurRad="38100" dist="38100" dir="2700000" algn="tl">
-                    <a:srgbClr val="C0C0C0"/>
-                  </a:outerShdw>
-                </a:effectLst>
-              </a:rPr>
-              <a:t>Texto ou imagens</a:t>
-            </a:r>
-            <a:r>
-              <a:rPr lang="pt-PT" altLang="en-US" sz="2400"/>
-              <a:t> </a:t>
-            </a:r>
-            <a:r>
-              <a:rPr lang="pt-PT" altLang="en-US" sz="2400">
-                <a:effectLst>
-                  <a:outerShdw blurRad="38100" dist="38100" dir="2700000" algn="tl">
-                    <a:srgbClr val="C0C0C0"/>
-                  </a:outerShdw>
-                </a:effectLst>
-              </a:rPr>
-              <a:t>Texto ou imagens</a:t>
-            </a:r>
-            <a:r>
-              <a:rPr lang="pt-PT" altLang="en-US" sz="2400"/>
-              <a:t> </a:t>
-            </a:r>
-            <a:r>
-              <a:rPr lang="pt-PT" altLang="en-US" sz="2400">
-                <a:effectLst>
-                  <a:outerShdw blurRad="38100" dist="38100" dir="2700000" algn="tl">
-                    <a:srgbClr val="C0C0C0"/>
-                  </a:outerShdw>
-                </a:effectLst>
-              </a:rPr>
-              <a:t>Texto ou imagens Texto ou imagens</a:t>
-            </a:r>
-            <a:r>
-              <a:rPr lang="pt-PT" altLang="en-US" sz="2400"/>
-              <a:t> </a:t>
-            </a:r>
-            <a:r>
-              <a:rPr lang="pt-PT" altLang="en-US" sz="2400">
-                <a:effectLst>
-                  <a:outerShdw blurRad="38100" dist="38100" dir="2700000" algn="tl">
-                    <a:srgbClr val="C0C0C0"/>
-                  </a:outerShdw>
-                </a:effectLst>
-              </a:rPr>
-              <a:t>Texto ou imagens</a:t>
-            </a:r>
-            <a:r>
-              <a:rPr lang="pt-PT" altLang="en-US" sz="2400"/>
-              <a:t> </a:t>
-            </a:r>
-            <a:r>
-              <a:rPr lang="pt-PT" altLang="en-US" sz="2400">
-                <a:effectLst>
-                  <a:outerShdw blurRad="38100" dist="38100" dir="2700000" algn="tl">
-                    <a:srgbClr val="C0C0C0"/>
-                  </a:outerShdw>
-                </a:effectLst>
-              </a:rPr>
-              <a:t>Texto ou imagens</a:t>
-            </a:r>
-            <a:r>
-              <a:rPr lang="pt-PT" altLang="en-US" sz="2400"/>
-              <a:t> </a:t>
-            </a:r>
-            <a:r>
-              <a:rPr lang="pt-PT" altLang="en-US" sz="2400">
-                <a:effectLst>
-                  <a:outerShdw blurRad="38100" dist="38100" dir="2700000" algn="tl">
-                    <a:srgbClr val="C0C0C0"/>
-                  </a:outerShdw>
-                </a:effectLst>
-              </a:rPr>
-              <a:t>Texto ou imagens</a:t>
-            </a:r>
-            <a:r>
-              <a:rPr lang="pt-PT" altLang="en-US" sz="2400"/>
-              <a:t> </a:t>
-            </a:r>
-            <a:r>
-              <a:rPr lang="pt-PT" altLang="en-US" sz="2400">
-                <a:effectLst>
-                  <a:outerShdw blurRad="38100" dist="38100" dir="2700000" algn="tl">
-                    <a:srgbClr val="C0C0C0"/>
-                  </a:outerShdw>
-                </a:effectLst>
-              </a:rPr>
-              <a:t>Texto ou imagens</a:t>
-            </a:r>
-            <a:r>
-              <a:rPr lang="pt-PT" altLang="en-US" sz="2400"/>
-              <a:t> </a:t>
-            </a:r>
-            <a:r>
-              <a:rPr lang="pt-PT" altLang="en-US" sz="2400">
-                <a:effectLst>
-                  <a:outerShdw blurRad="38100" dist="38100" dir="2700000" algn="tl">
-                    <a:srgbClr val="C0C0C0"/>
-                  </a:outerShdw>
-                </a:effectLst>
-              </a:rPr>
-              <a:t>Texto ou imagens</a:t>
-            </a:r>
-            <a:r>
-              <a:rPr lang="pt-PT" altLang="en-US" sz="2400"/>
-              <a:t> </a:t>
-            </a:r>
-            <a:r>
-              <a:rPr lang="pt-PT" altLang="en-US" sz="2400">
-                <a:effectLst>
-                  <a:outerShdw blurRad="38100" dist="38100" dir="2700000" algn="tl">
-                    <a:srgbClr val="C0C0C0"/>
-                  </a:outerShdw>
-                </a:effectLst>
-              </a:rPr>
-              <a:t>Texto ou imagens</a:t>
-            </a:r>
-            <a:r>
-              <a:rPr lang="pt-PT" altLang="en-US" sz="2400"/>
-              <a:t> </a:t>
-            </a:r>
-            <a:r>
-              <a:rPr lang="pt-PT" altLang="en-US" sz="2400">
-                <a:effectLst>
-                  <a:outerShdw blurRad="38100" dist="38100" dir="2700000" algn="tl">
-                    <a:srgbClr val="C0C0C0"/>
-                  </a:outerShdw>
-                </a:effectLst>
-              </a:rPr>
-              <a:t>Texto ou imagens</a:t>
-            </a:r>
-            <a:r>
-              <a:rPr lang="pt-PT" altLang="en-US" sz="2400"/>
-              <a:t> </a:t>
-            </a:r>
-            <a:r>
-              <a:rPr lang="pt-PT" altLang="en-US" sz="2400">
-                <a:effectLst>
-                  <a:outerShdw blurRad="38100" dist="38100" dir="2700000" algn="tl">
-                    <a:srgbClr val="C0C0C0"/>
-                  </a:outerShdw>
-                </a:effectLst>
-              </a:rPr>
-              <a:t>Texto ou imagens</a:t>
-            </a:r>
-            <a:r>
-              <a:rPr lang="pt-PT" altLang="en-US" sz="2400"/>
-              <a:t> </a:t>
-            </a:r>
-            <a:r>
-              <a:rPr lang="pt-PT" altLang="en-US" sz="2400">
-                <a:effectLst>
-                  <a:outerShdw blurRad="38100" dist="38100" dir="2700000" algn="tl">
-                    <a:srgbClr val="C0C0C0"/>
-                  </a:outerShdw>
-                </a:effectLst>
-              </a:rPr>
-              <a:t>Texto ou imagens</a:t>
-            </a:r>
-            <a:r>
-              <a:rPr lang="pt-PT" altLang="en-US" sz="2400"/>
-              <a:t> </a:t>
-            </a:r>
-            <a:r>
-              <a:rPr lang="pt-PT" altLang="en-US" sz="2400">
-                <a:effectLst>
-                  <a:outerShdw blurRad="38100" dist="38100" dir="2700000" algn="tl">
-                    <a:srgbClr val="C0C0C0"/>
-                  </a:outerShdw>
-                </a:effectLst>
-              </a:rPr>
-              <a:t>Texto ou imagens</a:t>
-            </a:r>
-            <a:r>
-              <a:rPr lang="pt-PT" altLang="en-US" sz="2400"/>
-              <a:t> </a:t>
-            </a:r>
-            <a:r>
-              <a:rPr lang="pt-PT" altLang="en-US" sz="2400">
-                <a:effectLst>
-                  <a:outerShdw blurRad="38100" dist="38100" dir="2700000" algn="tl">
-                    <a:srgbClr val="C0C0C0"/>
-                  </a:outerShdw>
-                </a:effectLst>
-              </a:rPr>
-              <a:t>Texto ou imagens</a:t>
-            </a:r>
-            <a:r>
-              <a:rPr lang="pt-PT" altLang="en-US" sz="2400"/>
-              <a:t> </a:t>
-            </a:r>
-            <a:r>
-              <a:rPr lang="pt-PT" altLang="en-US" sz="2400">
-                <a:effectLst>
-                  <a:outerShdw blurRad="38100" dist="38100" dir="2700000" algn="tl">
-                    <a:srgbClr val="C0C0C0"/>
-                  </a:outerShdw>
-                </a:effectLst>
-              </a:rPr>
-              <a:t>Texto ou imagens</a:t>
-            </a:r>
-            <a:r>
-              <a:rPr lang="pt-PT" altLang="en-US" sz="2400"/>
-              <a:t> </a:t>
-            </a:r>
-            <a:r>
-              <a:rPr lang="pt-PT" altLang="en-US" sz="2400">
-                <a:effectLst>
-                  <a:outerShdw blurRad="38100" dist="38100" dir="2700000" algn="tl">
-                    <a:srgbClr val="C0C0C0"/>
-                  </a:outerShdw>
-                </a:effectLst>
-              </a:rPr>
-              <a:t>Texto ou imagens</a:t>
-            </a:r>
-            <a:r>
-              <a:rPr lang="pt-PT" altLang="en-US" sz="2400"/>
-              <a:t> </a:t>
-            </a:r>
-            <a:r>
-              <a:rPr lang="pt-PT" altLang="en-US" sz="2400">
-                <a:effectLst>
-                  <a:outerShdw blurRad="38100" dist="38100" dir="2700000" algn="tl">
-                    <a:srgbClr val="C0C0C0"/>
-                  </a:outerShdw>
-                </a:effectLst>
-              </a:rPr>
-              <a:t>Texto ou imagens</a:t>
-            </a:r>
-            <a:r>
-              <a:rPr lang="pt-PT" altLang="en-US" sz="2400"/>
-              <a:t> </a:t>
-            </a:r>
-            <a:r>
-              <a:rPr lang="pt-PT" altLang="en-US" sz="2400">
-                <a:effectLst>
-                  <a:outerShdw blurRad="38100" dist="38100" dir="2700000" algn="tl">
-                    <a:srgbClr val="C0C0C0"/>
-                  </a:outerShdw>
-                </a:effectLst>
-              </a:rPr>
-              <a:t>Texto ou imagens</a:t>
-            </a:r>
-            <a:r>
-              <a:rPr lang="pt-PT" altLang="en-US" sz="2400"/>
-              <a:t> </a:t>
-            </a:r>
-            <a:r>
-              <a:rPr lang="pt-PT" altLang="en-US" sz="2400">
-                <a:effectLst>
-                  <a:outerShdw blurRad="38100" dist="38100" dir="2700000" algn="tl">
-                    <a:srgbClr val="C0C0C0"/>
-                  </a:outerShdw>
-                </a:effectLst>
-              </a:rPr>
-              <a:t>Texto ou imagens</a:t>
-            </a:r>
-            <a:r>
-              <a:rPr lang="pt-PT" altLang="en-US" sz="2400"/>
-              <a:t> </a:t>
-            </a:r>
-            <a:r>
-              <a:rPr lang="pt-PT" altLang="en-US" sz="2400">
-                <a:effectLst>
-                  <a:outerShdw blurRad="38100" dist="38100" dir="2700000" algn="tl">
-                    <a:srgbClr val="C0C0C0"/>
-                  </a:outerShdw>
-                </a:effectLst>
-              </a:rPr>
-              <a:t>Texto ou imagens</a:t>
-            </a:r>
-            <a:r>
-              <a:rPr lang="pt-PT" altLang="en-US" sz="2400"/>
-              <a:t> </a:t>
-            </a:r>
-            <a:r>
-              <a:rPr lang="pt-PT" altLang="en-US" sz="2400">
-                <a:effectLst>
-                  <a:outerShdw blurRad="38100" dist="38100" dir="2700000" algn="tl">
-                    <a:srgbClr val="C0C0C0"/>
-                  </a:outerShdw>
-                </a:effectLst>
-              </a:rPr>
-              <a:t>Texto ou imagens</a:t>
-            </a:r>
-            <a:r>
-              <a:rPr lang="pt-PT" altLang="en-US" sz="2400"/>
-              <a:t> </a:t>
-            </a:r>
-            <a:r>
-              <a:rPr lang="pt-PT" altLang="en-US" sz="2400">
-                <a:effectLst>
-                  <a:outerShdw blurRad="38100" dist="38100" dir="2700000" algn="tl">
-                    <a:srgbClr val="C0C0C0"/>
-                  </a:outerShdw>
-                </a:effectLst>
-              </a:rPr>
-              <a:t>Texto ou imagens</a:t>
-            </a:r>
-            <a:r>
-              <a:rPr lang="pt-PT" altLang="en-US" sz="2400"/>
-              <a:t> </a:t>
-            </a:r>
-            <a:r>
-              <a:rPr lang="pt-PT" altLang="en-US" sz="2400">
-                <a:effectLst>
-                  <a:outerShdw blurRad="38100" dist="38100" dir="2700000" algn="tl">
-                    <a:srgbClr val="C0C0C0"/>
-                  </a:outerShdw>
-                </a:effectLst>
-              </a:rPr>
-              <a:t>Texto ou imagens</a:t>
-            </a:r>
-            <a:r>
-              <a:rPr lang="pt-PT" altLang="en-US" sz="2400"/>
-              <a:t> </a:t>
-            </a:r>
-            <a:r>
-              <a:rPr lang="pt-PT" altLang="en-US" sz="2400">
-                <a:effectLst>
-                  <a:outerShdw blurRad="38100" dist="38100" dir="2700000" algn="tl">
-                    <a:srgbClr val="C0C0C0"/>
-                  </a:outerShdw>
-                </a:effectLst>
-              </a:rPr>
-              <a:t>Texto ou imagens</a:t>
-            </a:r>
-            <a:r>
-              <a:rPr lang="pt-PT" altLang="en-US" sz="2400"/>
-              <a:t> </a:t>
-            </a:r>
-            <a:r>
-              <a:rPr lang="pt-PT" altLang="en-US" sz="2400">
-                <a:effectLst>
-                  <a:outerShdw blurRad="38100" dist="38100" dir="2700000" algn="tl">
-                    <a:srgbClr val="C0C0C0"/>
-                  </a:outerShdw>
-                </a:effectLst>
-              </a:rPr>
-              <a:t>Texto ou imagens</a:t>
-            </a:r>
-            <a:r>
-              <a:rPr lang="pt-PT" altLang="en-US" sz="2400"/>
-              <a:t> </a:t>
-            </a:r>
-            <a:r>
-              <a:rPr lang="pt-PT" altLang="en-US" sz="2400">
-                <a:effectLst>
-                  <a:outerShdw blurRad="38100" dist="38100" dir="2700000" algn="tl">
-                    <a:srgbClr val="C0C0C0"/>
-                  </a:outerShdw>
-                </a:effectLst>
-              </a:rPr>
-              <a:t>Texto ou imagens</a:t>
-            </a:r>
-            <a:r>
-              <a:rPr lang="pt-PT" altLang="en-US" sz="2400"/>
-              <a:t> </a:t>
-            </a:r>
-            <a:r>
-              <a:rPr lang="pt-PT" altLang="en-US" sz="2400">
-                <a:effectLst>
-                  <a:outerShdw blurRad="38100" dist="38100" dir="2700000" algn="tl">
-                    <a:srgbClr val="C0C0C0"/>
-                  </a:outerShdw>
-                </a:effectLst>
-              </a:rPr>
-              <a:t>Texto ou imagens</a:t>
-            </a:r>
-            <a:r>
-              <a:rPr lang="pt-PT" altLang="en-US" sz="2400"/>
-              <a:t> </a:t>
-            </a:r>
-            <a:endParaRPr lang="pt-PT" altLang="en-US" sz="2400">
-              <a:effectLst>
-                <a:outerShdw blurRad="38100" dist="38100" dir="2700000" algn="tl">
-                  <a:srgbClr val="C0C0C0"/>
-                </a:outerShdw>
-              </a:effectLst>
-            </a:endParaRPr>
+              <a:rPr lang="pt-BR" altLang="en-US" sz="2400" dirty="0"/>
+              <a:t>O Webshop Service Specification é uma RESTful API reactiva, que consiste em gerir as especificações de Webshops, ou seja um microserviço reactivo. Este microserviço recebe pedidos HTTP e retorna uma resposta JSON com o resultado, nomeadamente uma Webshop ou uma caraterística da mesma.</a:t>
+            </a:r>
           </a:p>
           <a:p>
             <a:pPr algn="just">
@@ -7195,363 +5929,7 @@
               <a:buFont typeface="Symbol" panose="05050102010706020507" pitchFamily="18" charset="2"/>
               <a:buNone/>
             </a:pPr>
-            <a:r>
-              <a:rPr lang="pt-PT" altLang="en-US" sz="2400">
-                <a:effectLst>
-                  <a:outerShdw blurRad="38100" dist="38100" dir="2700000" algn="tl">
-                    <a:srgbClr val="C0C0C0"/>
-                  </a:outerShdw>
-                </a:effectLst>
-              </a:rPr>
-              <a:t>Texto ou imagens Texto ou imagens</a:t>
-            </a:r>
-            <a:r>
-              <a:rPr lang="pt-PT" altLang="en-US" sz="2400"/>
-              <a:t> </a:t>
-            </a:r>
-            <a:r>
-              <a:rPr lang="pt-PT" altLang="en-US" sz="2400">
-                <a:effectLst>
-                  <a:outerShdw blurRad="38100" dist="38100" dir="2700000" algn="tl">
-                    <a:srgbClr val="C0C0C0"/>
-                  </a:outerShdw>
-                </a:effectLst>
-              </a:rPr>
-              <a:t>Texto ou imagens</a:t>
-            </a:r>
-            <a:r>
-              <a:rPr lang="pt-PT" altLang="en-US" sz="2400"/>
-              <a:t> </a:t>
-            </a:r>
-            <a:r>
-              <a:rPr lang="pt-PT" altLang="en-US" sz="2400">
-                <a:effectLst>
-                  <a:outerShdw blurRad="38100" dist="38100" dir="2700000" algn="tl">
-                    <a:srgbClr val="C0C0C0"/>
-                  </a:outerShdw>
-                </a:effectLst>
-              </a:rPr>
-              <a:t>Texto ou imagens</a:t>
-            </a:r>
-            <a:r>
-              <a:rPr lang="pt-PT" altLang="en-US" sz="2400"/>
-              <a:t> </a:t>
-            </a:r>
-            <a:r>
-              <a:rPr lang="pt-PT" altLang="en-US" sz="2400">
-                <a:effectLst>
-                  <a:outerShdw blurRad="38100" dist="38100" dir="2700000" algn="tl">
-                    <a:srgbClr val="C0C0C0"/>
-                  </a:outerShdw>
-                </a:effectLst>
-              </a:rPr>
-              <a:t>Texto ou imagens</a:t>
-            </a:r>
-            <a:r>
-              <a:rPr lang="pt-PT" altLang="en-US" sz="2400"/>
-              <a:t> </a:t>
-            </a:r>
-            <a:r>
-              <a:rPr lang="pt-PT" altLang="en-US" sz="2400">
-                <a:effectLst>
-                  <a:outerShdw blurRad="38100" dist="38100" dir="2700000" algn="tl">
-                    <a:srgbClr val="C0C0C0"/>
-                  </a:outerShdw>
-                </a:effectLst>
-              </a:rPr>
-              <a:t>Texto ou imagens</a:t>
-            </a:r>
-            <a:r>
-              <a:rPr lang="pt-PT" altLang="en-US" sz="2400"/>
-              <a:t> </a:t>
-            </a:r>
-            <a:r>
-              <a:rPr lang="pt-PT" altLang="en-US" sz="2400">
-                <a:effectLst>
-                  <a:outerShdw blurRad="38100" dist="38100" dir="2700000" algn="tl">
-                    <a:srgbClr val="C0C0C0"/>
-                  </a:outerShdw>
-                </a:effectLst>
-              </a:rPr>
-              <a:t>Texto ou imagens</a:t>
-            </a:r>
-            <a:r>
-              <a:rPr lang="pt-PT" altLang="en-US" sz="2400"/>
-              <a:t> </a:t>
-            </a:r>
-            <a:r>
-              <a:rPr lang="pt-PT" altLang="en-US" sz="2400">
-                <a:effectLst>
-                  <a:outerShdw blurRad="38100" dist="38100" dir="2700000" algn="tl">
-                    <a:srgbClr val="C0C0C0"/>
-                  </a:outerShdw>
-                </a:effectLst>
-              </a:rPr>
-              <a:t>Texto ou imagens</a:t>
-            </a:r>
-            <a:r>
-              <a:rPr lang="pt-PT" altLang="en-US" sz="2400"/>
-              <a:t> </a:t>
-            </a:r>
-            <a:r>
-              <a:rPr lang="pt-PT" altLang="en-US" sz="2400">
-                <a:effectLst>
-                  <a:outerShdw blurRad="38100" dist="38100" dir="2700000" algn="tl">
-                    <a:srgbClr val="C0C0C0"/>
-                  </a:outerShdw>
-                </a:effectLst>
-              </a:rPr>
-              <a:t>Texto ou imagens</a:t>
-            </a:r>
-            <a:r>
-              <a:rPr lang="pt-PT" altLang="en-US" sz="2400"/>
-              <a:t> </a:t>
-            </a:r>
-            <a:r>
-              <a:rPr lang="pt-PT" altLang="en-US" sz="2400">
-                <a:effectLst>
-                  <a:outerShdw blurRad="38100" dist="38100" dir="2700000" algn="tl">
-                    <a:srgbClr val="C0C0C0"/>
-                  </a:outerShdw>
-                </a:effectLst>
-              </a:rPr>
-              <a:t>Texto ou imagens</a:t>
-            </a:r>
-            <a:r>
-              <a:rPr lang="pt-PT" altLang="en-US" sz="2400"/>
-              <a:t> </a:t>
-            </a:r>
-            <a:r>
-              <a:rPr lang="pt-PT" altLang="en-US" sz="2400">
-                <a:effectLst>
-                  <a:outerShdw blurRad="38100" dist="38100" dir="2700000" algn="tl">
-                    <a:srgbClr val="C0C0C0"/>
-                  </a:outerShdw>
-                </a:effectLst>
-              </a:rPr>
-              <a:t>Texto ou imagens</a:t>
-            </a:r>
-            <a:r>
-              <a:rPr lang="pt-PT" altLang="en-US" sz="2400"/>
-              <a:t> </a:t>
-            </a:r>
-            <a:r>
-              <a:rPr lang="pt-PT" altLang="en-US" sz="2400">
-                <a:effectLst>
-                  <a:outerShdw blurRad="38100" dist="38100" dir="2700000" algn="tl">
-                    <a:srgbClr val="C0C0C0"/>
-                  </a:outerShdw>
-                </a:effectLst>
-              </a:rPr>
-              <a:t>Texto ou imagens</a:t>
-            </a:r>
-            <a:r>
-              <a:rPr lang="pt-PT" altLang="en-US" sz="2400"/>
-              <a:t> </a:t>
-            </a:r>
-            <a:r>
-              <a:rPr lang="pt-PT" altLang="en-US" sz="2400">
-                <a:effectLst>
-                  <a:outerShdw blurRad="38100" dist="38100" dir="2700000" algn="tl">
-                    <a:srgbClr val="C0C0C0"/>
-                  </a:outerShdw>
-                </a:effectLst>
-              </a:rPr>
-              <a:t>Texto ou imagens</a:t>
-            </a:r>
-            <a:r>
-              <a:rPr lang="pt-PT" altLang="en-US" sz="2400"/>
-              <a:t> </a:t>
-            </a:r>
-            <a:r>
-              <a:rPr lang="pt-PT" altLang="en-US" sz="2400">
-                <a:effectLst>
-                  <a:outerShdw blurRad="38100" dist="38100" dir="2700000" algn="tl">
-                    <a:srgbClr val="C0C0C0"/>
-                  </a:outerShdw>
-                </a:effectLst>
-              </a:rPr>
-              <a:t>Texto ou imagens</a:t>
-            </a:r>
-            <a:r>
-              <a:rPr lang="pt-PT" altLang="en-US" sz="2400"/>
-              <a:t> </a:t>
-            </a:r>
-            <a:r>
-              <a:rPr lang="pt-PT" altLang="en-US" sz="2400">
-                <a:effectLst>
-                  <a:outerShdw blurRad="38100" dist="38100" dir="2700000" algn="tl">
-                    <a:srgbClr val="C0C0C0"/>
-                  </a:outerShdw>
-                </a:effectLst>
-              </a:rPr>
-              <a:t>Texto ou imagens</a:t>
-            </a:r>
-            <a:r>
-              <a:rPr lang="pt-PT" altLang="en-US" sz="2400"/>
-              <a:t> </a:t>
-            </a:r>
-            <a:r>
-              <a:rPr lang="pt-PT" altLang="en-US" sz="2400">
-                <a:effectLst>
-                  <a:outerShdw blurRad="38100" dist="38100" dir="2700000" algn="tl">
-                    <a:srgbClr val="C0C0C0"/>
-                  </a:outerShdw>
-                </a:effectLst>
-              </a:rPr>
-              <a:t>Texto ou imagens</a:t>
-            </a:r>
-            <a:r>
-              <a:rPr lang="pt-PT" altLang="en-US" sz="2400"/>
-              <a:t> </a:t>
-            </a:r>
-            <a:r>
-              <a:rPr lang="pt-PT" altLang="en-US" sz="2400">
-                <a:effectLst>
-                  <a:outerShdw blurRad="38100" dist="38100" dir="2700000" algn="tl">
-                    <a:srgbClr val="C0C0C0"/>
-                  </a:outerShdw>
-                </a:effectLst>
-              </a:rPr>
-              <a:t>Texto ou imagens</a:t>
-            </a:r>
-            <a:r>
-              <a:rPr lang="pt-PT" altLang="en-US" sz="2400"/>
-              <a:t> </a:t>
-            </a:r>
-            <a:r>
-              <a:rPr lang="pt-PT" altLang="en-US" sz="2400">
-                <a:effectLst>
-                  <a:outerShdw blurRad="38100" dist="38100" dir="2700000" algn="tl">
-                    <a:srgbClr val="C0C0C0"/>
-                  </a:outerShdw>
-                </a:effectLst>
-              </a:rPr>
-              <a:t>Texto ou imagens</a:t>
-            </a:r>
-            <a:r>
-              <a:rPr lang="pt-PT" altLang="en-US" sz="2400"/>
-              <a:t> </a:t>
-            </a:r>
-            <a:r>
-              <a:rPr lang="pt-PT" altLang="en-US" sz="2400">
-                <a:effectLst>
-                  <a:outerShdw blurRad="38100" dist="38100" dir="2700000" algn="tl">
-                    <a:srgbClr val="C0C0C0"/>
-                  </a:outerShdw>
-                </a:effectLst>
-              </a:rPr>
-              <a:t>Texto ou imagens</a:t>
-            </a:r>
-            <a:r>
-              <a:rPr lang="pt-PT" altLang="en-US" sz="2400"/>
-              <a:t> </a:t>
-            </a:r>
-            <a:r>
-              <a:rPr lang="pt-PT" altLang="en-US" sz="2400">
-                <a:effectLst>
-                  <a:outerShdw blurRad="38100" dist="38100" dir="2700000" algn="tl">
-                    <a:srgbClr val="C0C0C0"/>
-                  </a:outerShdw>
-                </a:effectLst>
-              </a:rPr>
-              <a:t>Texto ou imagens</a:t>
-            </a:r>
-            <a:r>
-              <a:rPr lang="pt-PT" altLang="en-US" sz="2400"/>
-              <a:t> </a:t>
-            </a:r>
-            <a:r>
-              <a:rPr lang="pt-PT" altLang="en-US" sz="2400">
-                <a:effectLst>
-                  <a:outerShdw blurRad="38100" dist="38100" dir="2700000" algn="tl">
-                    <a:srgbClr val="C0C0C0"/>
-                  </a:outerShdw>
-                </a:effectLst>
-              </a:rPr>
-              <a:t>Texto ou imagens</a:t>
-            </a:r>
-            <a:r>
-              <a:rPr lang="pt-PT" altLang="en-US" sz="2400"/>
-              <a:t> </a:t>
-            </a:r>
-            <a:r>
-              <a:rPr lang="pt-PT" altLang="en-US" sz="2400">
-                <a:effectLst>
-                  <a:outerShdw blurRad="38100" dist="38100" dir="2700000" algn="tl">
-                    <a:srgbClr val="C0C0C0"/>
-                  </a:outerShdw>
-                </a:effectLst>
-              </a:rPr>
-              <a:t>Texto ou imagens</a:t>
-            </a:r>
-            <a:r>
-              <a:rPr lang="pt-PT" altLang="en-US" sz="2400"/>
-              <a:t> </a:t>
-            </a:r>
-            <a:r>
-              <a:rPr lang="pt-PT" altLang="en-US" sz="2400">
-                <a:effectLst>
-                  <a:outerShdw blurRad="38100" dist="38100" dir="2700000" algn="tl">
-                    <a:srgbClr val="C0C0C0"/>
-                  </a:outerShdw>
-                </a:effectLst>
-              </a:rPr>
-              <a:t>Texto ou imagens</a:t>
-            </a:r>
-            <a:r>
-              <a:rPr lang="pt-PT" altLang="en-US" sz="2400"/>
-              <a:t> </a:t>
-            </a:r>
-            <a:r>
-              <a:rPr lang="pt-PT" altLang="en-US" sz="2400">
-                <a:effectLst>
-                  <a:outerShdw blurRad="38100" dist="38100" dir="2700000" algn="tl">
-                    <a:srgbClr val="C0C0C0"/>
-                  </a:outerShdw>
-                </a:effectLst>
-              </a:rPr>
-              <a:t>Texto ou imagens</a:t>
-            </a:r>
-            <a:r>
-              <a:rPr lang="pt-PT" altLang="en-US" sz="2400"/>
-              <a:t> </a:t>
-            </a:r>
-            <a:r>
-              <a:rPr lang="pt-PT" altLang="en-US" sz="2400">
-                <a:effectLst>
-                  <a:outerShdw blurRad="38100" dist="38100" dir="2700000" algn="tl">
-                    <a:srgbClr val="C0C0C0"/>
-                  </a:outerShdw>
-                </a:effectLst>
-              </a:rPr>
-              <a:t>Texto ou imagens</a:t>
-            </a:r>
-            <a:r>
-              <a:rPr lang="pt-PT" altLang="en-US" sz="2400"/>
-              <a:t> </a:t>
-            </a:r>
-            <a:r>
-              <a:rPr lang="pt-PT" altLang="en-US" sz="2400">
-                <a:effectLst>
-                  <a:outerShdw blurRad="38100" dist="38100" dir="2700000" algn="tl">
-                    <a:srgbClr val="C0C0C0"/>
-                  </a:outerShdw>
-                </a:effectLst>
-              </a:rPr>
-              <a:t>Texto ou imagens</a:t>
-            </a:r>
-            <a:r>
-              <a:rPr lang="pt-PT" altLang="en-US" sz="2400"/>
-              <a:t> </a:t>
-            </a:r>
-            <a:endParaRPr lang="pt-PT" altLang="en-US" sz="2400">
-              <a:effectLst>
-                <a:outerShdw blurRad="38100" dist="38100" dir="2700000" algn="tl">
-                  <a:srgbClr val="C0C0C0"/>
-                </a:outerShdw>
-              </a:effectLst>
-            </a:endParaRPr>
+            <a:endParaRPr lang="pt-BR" altLang="en-US" sz="2400" dirty="0"/>
           </a:p>
           <a:p>
             <a:pPr algn="just">
@@ -7565,13 +5943,10 @@
               <a:buFont typeface="Symbol" panose="05050102010706020507" pitchFamily="18" charset="2"/>
               <a:buNone/>
             </a:pPr>
-            <a:endParaRPr lang="pt-PT" altLang="en-US" sz="2400">
-              <a:effectLst>
-                <a:outerShdw blurRad="38100" dist="38100" dir="2700000" algn="tl">
-                  <a:srgbClr val="C0C0C0"/>
-                </a:outerShdw>
-              </a:effectLst>
-            </a:endParaRPr>
+            <a:r>
+              <a:rPr lang="pt-BR" altLang="en-US" sz="2400" dirty="0"/>
+              <a:t>Sendo esta API reactiva, ela emprega o uso de threading (divisão de tarefas em subprocessos) para poder executar variados pedidos em simultâneo, o mais depressa possível. No entanto esses processos concorrentes e assíncronos requerem um outro nível de cuidado e atenção no que toca à integridade e idempotência dos dados requeridos.</a:t>
+            </a:r>
           </a:p>
           <a:p>
             <a:pPr algn="just">
@@ -7586,14 +5961,8 @@
               <a:buNone/>
             </a:pPr>
             <a:r>
-              <a:rPr lang="pt-PT" altLang="en-US" sz="2400">
-                <a:effectLst>
-                  <a:outerShdw blurRad="38100" dist="38100" dir="2700000" algn="tl">
-                    <a:srgbClr val="C0C0C0"/>
-                  </a:outerShdw>
-                </a:effectLst>
-              </a:rPr>
-              <a:t>Texto ou imagens Texto ou imagens Texto ou imagens Texto ou imagens Texto ou imagens Texto ou imagens Texto ou imagens Texto ou imagens Texto ou imagens Texto ou imagens Texto ou imagens Texto ou imagens Texto ou imagens Texto ou imagens Texto ou imagens Texto ou imagens Texto ou imagens Texto ou imagens Texto ou imagens Texto ou imagens Texto ou imagens Texto ou imagens Texto ou imagens Texto ou imagens Texto ou imagens Texto ou imagens Texto ou imagens Texto ou imagens Texto ou imagens Texto ou imagens Texto ou imagens Texto ou imagens Texto ou imagens Texto ou imagens Texto ou imagens Texto ou imagens Texto ou imagens Texto ou imagens Texto ou imagens Texto ou imagens Texto ou imagens Texto ou imagens Texto ou imagens Texto ou imagens Texto ou imagens Texto ou imagens Texto ou imagens Texto ou imagens Texto ou imagens Texto ou imagens Texto ou imagens Texto ou imagens </a:t>
+              <a:rPr lang="pt-BR" altLang="en-US" sz="2400" dirty="0"/>
+              <a:t>As relações empregues por uma aplicação reactiva são os padrões de Publisher/Subscriber, onde um pedido, ou uma transação, é uma mensagem enviada pela fonte desses dados, chamada de um Publisher} e a sua receção, ou seja onde os dados são consumidos, é encarregado pelo(s) Subscriber(s). Se um desses pedidos for uma mensagem com varias subscrições ao longo do tempo, devemos alterar o scheduling, que gere as filas de processos e acessos.</a:t>
             </a:r>
           </a:p>
           <a:p>
@@ -7608,16 +5977,7 @@
               <a:buFont typeface="Symbol" panose="05050102010706020507" pitchFamily="18" charset="2"/>
               <a:buNone/>
             </a:pPr>
-            <a:r>
-              <a:rPr lang="pt-PT" altLang="en-US" sz="2400">
-                <a:effectLst>
-                  <a:outerShdw blurRad="38100" dist="38100" dir="2700000" algn="tl">
-                    <a:srgbClr val="C0C0C0"/>
-                  </a:outerShdw>
-                </a:effectLst>
-              </a:rPr>
-              <a:t>Texto ou imagens Texto ou imagens Texto ou imagens Texto ou imagens Texto ou imagens Texto ou imagens Texto ou imagens Texto ou imagens Texto ou imagens Texto ou imagens Texto ou imagens Texto ou imagens Texto ou imagens Texto ou imagens Texto ou imagens Texto ou imagens Texto ou imagens Texto ou imagens Texto ou imagens Texto ou imagens Texto ou imagens Texto ou imagens Texto ou imagens Texto ou imagens Texto ou imagens Texto ou imagens </a:t>
-            </a:r>
+            <a:endParaRPr lang="pt-BR" altLang="en-US" sz="2400" dirty="0"/>
           </a:p>
           <a:p>
             <a:pPr algn="just">
@@ -7631,59 +5991,11 @@
               <a:buFont typeface="Symbol" panose="05050102010706020507" pitchFamily="18" charset="2"/>
               <a:buNone/>
             </a:pPr>
-            <a:endParaRPr lang="pt-PT" altLang="en-US" sz="2400">
-              <a:effectLst>
-                <a:outerShdw blurRad="38100" dist="38100" dir="2700000" algn="tl">
-                  <a:srgbClr val="C0C0C0"/>
-                </a:outerShdw>
-              </a:effectLst>
-            </a:endParaRPr>
-          </a:p>
-          <a:p>
-            <a:pPr algn="just">
-              <a:spcAft>
-                <a:spcPct val="30000"/>
-              </a:spcAft>
-              <a:buClr>
-                <a:srgbClr val="FF0000"/>
-              </a:buClr>
-              <a:buSzPct val="150000"/>
-              <a:buFont typeface="Symbol" panose="05050102010706020507" pitchFamily="18" charset="2"/>
-              <a:buNone/>
-            </a:pPr>
-            <a:r>
-              <a:rPr lang="pt-PT" altLang="en-US" sz="2400">
-                <a:effectLst>
-                  <a:outerShdw blurRad="38100" dist="38100" dir="2700000" algn="tl">
-                    <a:srgbClr val="C0C0C0"/>
-                  </a:outerShdw>
-                </a:effectLst>
-              </a:rPr>
-              <a:t>Texto ou imagens Texto ou imagens Texto ou imagens Texto ou imagens Texto ou imagens Texto ou imagens Texto ou imagens Texto ou imagens Texto ou imagens Texto ou imagens Texto ou imagens Texto ou imagens Texto ou imagens Texto ou imagens Texto ou imagens Texto ou imagens Texto ou imagens Texto ou imagens Texto ou imagens Texto ou imagens Texto ou imagens Texto ou imagens Texto ou imagens Texto ou imagens Texto ou imagens Texto ou imagens Texto ou imagens Texto ou imagens Texto ou imagens Texto ou imagens Texto ou imagens Texto ou imagens Texto ou imagens Texto ou imagens Texto ou imagens Texto ou imagens Texto ou imagens Texto ou imagens Texto ou imagens Texto ou imagens Texto ou imagens Texto ou imagens Texto ou imagens Texto ou imagens Texto ou imagens Texto ou imagens Texto ou imagens Texto ou imagens Texto ou imagens Texto ou imagens Texto ou imagens Texto ou imagens </a:t>
-            </a:r>
-          </a:p>
-          <a:p>
-            <a:pPr algn="just">
-              <a:spcAft>
-                <a:spcPct val="30000"/>
-              </a:spcAft>
-              <a:buClr>
-                <a:srgbClr val="FF0000"/>
-              </a:buClr>
-              <a:buSzPct val="150000"/>
-              <a:buFont typeface="Symbol" panose="05050102010706020507" pitchFamily="18" charset="2"/>
-              <a:buNone/>
-            </a:pPr>
-            <a:r>
-              <a:rPr lang="pt-PT" altLang="en-US" sz="2400">
-                <a:effectLst>
-                  <a:outerShdw blurRad="38100" dist="38100" dir="2700000" algn="tl">
-                    <a:srgbClr val="C0C0C0"/>
-                  </a:outerShdw>
-                </a:effectLst>
-              </a:rPr>
-              <a:t>Texto ou imagens Texto ou imagens Texto ou imagens Texto ou imagens Texto ou imagens Texto ou imagens Texto ou imagens Texto ou imagens Texto ou imagens Texto ou imagens Texto ou imagens Texto ou imagens Texto ou imagens Texto ou imagens Texto ou imagens Texto ou imagens Texto ou imagens Texto ou imagens Texto ou imagens Texto ou imagens Texto ou imagens Texto ou imagens Texto ou imagens Texto ou imagens Texto ou imagens Texto ou imagens </a:t>
-            </a:r>
+            <a:r>
+              <a:rPr lang="pt-BR" altLang="en-US" sz="2400" dirty="0"/>
+              <a:t>Com isto podemos dizer que os endpoints} desta API são Subscribers e o serviço transacional que comunica diretamente com os dados da base de dados é o nosso Publisher. Este tipo de acessos reactivos à base dados requer um outro tipo de mecanismo de processo de transações SQL, o qual deve ser também reactivo de modo a que a base de dados seja vista e funcione com um Publisher e seja configurável a sua propagação.</a:t>
+            </a:r>
+            <a:endParaRPr lang="pt-PT" altLang="en-US" sz="2400" dirty="0"/>
           </a:p>
         </p:txBody>
       </p:sp>
@@ -7703,8 +6015,8 @@
         </p:nvSpPr>
         <p:spPr bwMode="auto">
           <a:xfrm>
-            <a:off x="24212550" y="6283325"/>
-            <a:ext cx="2417763" cy="989013"/>
+            <a:off x="24254198" y="10474863"/>
+            <a:ext cx="7937262" cy="998747"/>
           </a:xfrm>
           <a:prstGeom prst="rect">
             <a:avLst/>
@@ -7716,14 +6028,14 @@
           <a:effectLst/>
           <a:extLst>
             <a:ext uri="{909E8E84-426E-40dd-AFC4-6F175D3DCCD1}">
-              <a14:hiddenFill xmlns:a14="http://schemas.microsoft.com/office/drawing/2010/main" xmlns="">
+              <a14:hiddenFill xmlns="" xmlns:a14="http://schemas.microsoft.com/office/drawing/2010/main">
                 <a:solidFill>
                   <a:schemeClr val="accent1"/>
                 </a:solidFill>
               </a14:hiddenFill>
             </a:ext>
             <a:ext uri="{91240B29-F687-4f45-9708-019B960494DF}">
-              <a14:hiddenLine xmlns:a14="http://schemas.microsoft.com/office/drawing/2010/main" xmlns="" w="9525">
+              <a14:hiddenLine xmlns="" xmlns:a14="http://schemas.microsoft.com/office/drawing/2010/main" w="9525">
                 <a:solidFill>
                   <a:schemeClr val="tx1"/>
                 </a:solidFill>
@@ -7733,7 +6045,7 @@
               </a14:hiddenLine>
             </a:ext>
             <a:ext uri="{AF507438-7753-43e0-B8FC-AC1667EBCBE1}">
-              <a14:hiddenEffects xmlns:a14="http://schemas.microsoft.com/office/drawing/2010/main" xmlns="">
+              <a14:hiddenEffects xmlns="" xmlns:a14="http://schemas.microsoft.com/office/drawing/2010/main">
                 <a:effectLst>
                   <a:outerShdw blurRad="63500" dist="38099" dir="2700000" algn="ctr" rotWithShape="0">
                     <a:schemeClr val="bg2">
@@ -7863,380 +6175,14 @@
               </a:spcAft>
             </a:pPr>
             <a:r>
-              <a:rPr lang="pt-PT" altLang="en-US" sz="5800" b="1">
+              <a:rPr lang="pt-PT" altLang="en-US" sz="5800" b="1" dirty="0">
                 <a:effectLst>
                   <a:outerShdw blurRad="38100" dist="38100" dir="2700000" algn="tl">
                     <a:srgbClr val="C0C0C0"/>
                   </a:outerShdw>
                 </a:effectLst>
               </a:rPr>
-              <a:t>Título </a:t>
-            </a:r>
-          </a:p>
-        </p:txBody>
-      </p:sp>
-      <p:sp>
-        <p:nvSpPr>
-          <p:cNvPr id="3495" name="Text Box 423">
-            <a:extLst>
-              <a:ext uri="{FF2B5EF4-FFF2-40B4-BE49-F238E27FC236}">
-                <a16:creationId xmlns:a16="http://schemas.microsoft.com/office/drawing/2014/main" id="{E41B393E-2D63-B8FC-E0CF-0031E9121177}"/>
-              </a:ext>
-            </a:extLst>
-          </p:cNvPr>
-          <p:cNvSpPr txBox="1">
-            <a:spLocks noChangeArrowheads="1"/>
-          </p:cNvSpPr>
-          <p:nvPr/>
-        </p:nvSpPr>
-        <p:spPr bwMode="auto">
-          <a:xfrm>
-            <a:off x="11464925" y="23932818"/>
-            <a:ext cx="10514012" cy="4089400"/>
-          </a:xfrm>
-          <a:prstGeom prst="rect">
-            <a:avLst/>
-          </a:prstGeom>
-          <a:noFill/>
-          <a:ln>
-            <a:noFill/>
-          </a:ln>
-          <a:effectLst/>
-          <a:extLst>
-            <a:ext uri="{909E8E84-426E-40dd-AFC4-6F175D3DCCD1}">
-              <a14:hiddenFill xmlns:a14="http://schemas.microsoft.com/office/drawing/2010/main" xmlns="">
-                <a:solidFill>
-                  <a:schemeClr val="accent1"/>
-                </a:solidFill>
-              </a14:hiddenFill>
-            </a:ext>
-            <a:ext uri="{91240B29-F687-4f45-9708-019B960494DF}">
-              <a14:hiddenLine xmlns:a14="http://schemas.microsoft.com/office/drawing/2010/main" xmlns="" w="9525">
-                <a:solidFill>
-                  <a:schemeClr val="tx1"/>
-                </a:solidFill>
-                <a:miter lim="800000"/>
-                <a:headEnd/>
-                <a:tailEnd/>
-              </a14:hiddenLine>
-            </a:ext>
-            <a:ext uri="{AF507438-7753-43e0-B8FC-AC1667EBCBE1}">
-              <a14:hiddenEffects xmlns:a14="http://schemas.microsoft.com/office/drawing/2010/main" xmlns="">
-                <a:effectLst>
-                  <a:outerShdw blurRad="63500" dist="38099" dir="2700000" algn="ctr" rotWithShape="0">
-                    <a:schemeClr val="bg2">
-                      <a:alpha val="74998"/>
-                    </a:schemeClr>
-                  </a:outerShdw>
-                </a:effectLst>
-              </a14:hiddenEffects>
-            </a:ext>
-          </a:extLst>
-        </p:spPr>
-        <p:txBody>
-          <a:bodyPr lIns="74578" tIns="37289" rIns="74578" bIns="37289">
-            <a:spAutoFit/>
-          </a:bodyPr>
-          <a:lstStyle>
-            <a:lvl1pPr defTabSz="746125" eaLnBrk="0" hangingPunct="0">
-              <a:defRPr sz="8200">
-                <a:solidFill>
-                  <a:schemeClr val="tx1"/>
-                </a:solidFill>
-                <a:latin typeface="Arial" panose="020B0604020202020204" pitchFamily="34" charset="0"/>
-                <a:ea typeface="MS PGothic" panose="020B0600070205080204" pitchFamily="34" charset="-128"/>
-              </a:defRPr>
-            </a:lvl1pPr>
-            <a:lvl2pPr marL="742950" indent="-285750" defTabSz="746125" eaLnBrk="0" hangingPunct="0">
-              <a:defRPr sz="8200">
-                <a:solidFill>
-                  <a:schemeClr val="tx1"/>
-                </a:solidFill>
-                <a:latin typeface="Arial" panose="020B0604020202020204" pitchFamily="34" charset="0"/>
-                <a:ea typeface="MS PGothic" panose="020B0600070205080204" pitchFamily="34" charset="-128"/>
-              </a:defRPr>
-            </a:lvl2pPr>
-            <a:lvl3pPr marL="1143000" indent="-228600" defTabSz="746125" eaLnBrk="0" hangingPunct="0">
-              <a:defRPr sz="8200">
-                <a:solidFill>
-                  <a:schemeClr val="tx1"/>
-                </a:solidFill>
-                <a:latin typeface="Arial" panose="020B0604020202020204" pitchFamily="34" charset="0"/>
-                <a:ea typeface="MS PGothic" panose="020B0600070205080204" pitchFamily="34" charset="-128"/>
-              </a:defRPr>
-            </a:lvl3pPr>
-            <a:lvl4pPr marL="1600200" indent="-228600" defTabSz="746125" eaLnBrk="0" hangingPunct="0">
-              <a:defRPr sz="8200">
-                <a:solidFill>
-                  <a:schemeClr val="tx1"/>
-                </a:solidFill>
-                <a:latin typeface="Arial" panose="020B0604020202020204" pitchFamily="34" charset="0"/>
-                <a:ea typeface="MS PGothic" panose="020B0600070205080204" pitchFamily="34" charset="-128"/>
-              </a:defRPr>
-            </a:lvl4pPr>
-            <a:lvl5pPr marL="2057400" indent="-228600" defTabSz="746125" eaLnBrk="0" hangingPunct="0">
-              <a:defRPr sz="8200">
-                <a:solidFill>
-                  <a:schemeClr val="tx1"/>
-                </a:solidFill>
-                <a:latin typeface="Arial" panose="020B0604020202020204" pitchFamily="34" charset="0"/>
-                <a:ea typeface="MS PGothic" panose="020B0600070205080204" pitchFamily="34" charset="-128"/>
-              </a:defRPr>
-            </a:lvl5pPr>
-            <a:lvl6pPr marL="2514600" indent="-228600" defTabSz="746125" eaLnBrk="0" fontAlgn="base" hangingPunct="0">
-              <a:spcBef>
-                <a:spcPct val="0"/>
-              </a:spcBef>
-              <a:spcAft>
-                <a:spcPct val="0"/>
-              </a:spcAft>
-              <a:defRPr sz="8200">
-                <a:solidFill>
-                  <a:schemeClr val="tx1"/>
-                </a:solidFill>
-                <a:latin typeface="Arial" panose="020B0604020202020204" pitchFamily="34" charset="0"/>
-                <a:ea typeface="MS PGothic" panose="020B0600070205080204" pitchFamily="34" charset="-128"/>
-              </a:defRPr>
-            </a:lvl6pPr>
-            <a:lvl7pPr marL="2971800" indent="-228600" defTabSz="746125" eaLnBrk="0" fontAlgn="base" hangingPunct="0">
-              <a:spcBef>
-                <a:spcPct val="0"/>
-              </a:spcBef>
-              <a:spcAft>
-                <a:spcPct val="0"/>
-              </a:spcAft>
-              <a:defRPr sz="8200">
-                <a:solidFill>
-                  <a:schemeClr val="tx1"/>
-                </a:solidFill>
-                <a:latin typeface="Arial" panose="020B0604020202020204" pitchFamily="34" charset="0"/>
-                <a:ea typeface="MS PGothic" panose="020B0600070205080204" pitchFamily="34" charset="-128"/>
-              </a:defRPr>
-            </a:lvl7pPr>
-            <a:lvl8pPr marL="3429000" indent="-228600" defTabSz="746125" eaLnBrk="0" fontAlgn="base" hangingPunct="0">
-              <a:spcBef>
-                <a:spcPct val="0"/>
-              </a:spcBef>
-              <a:spcAft>
-                <a:spcPct val="0"/>
-              </a:spcAft>
-              <a:defRPr sz="8200">
-                <a:solidFill>
-                  <a:schemeClr val="tx1"/>
-                </a:solidFill>
-                <a:latin typeface="Arial" panose="020B0604020202020204" pitchFamily="34" charset="0"/>
-                <a:ea typeface="MS PGothic" panose="020B0600070205080204" pitchFamily="34" charset="-128"/>
-              </a:defRPr>
-            </a:lvl8pPr>
-            <a:lvl9pPr marL="3886200" indent="-228600" defTabSz="746125" eaLnBrk="0" fontAlgn="base" hangingPunct="0">
-              <a:spcBef>
-                <a:spcPct val="0"/>
-              </a:spcBef>
-              <a:spcAft>
-                <a:spcPct val="0"/>
-              </a:spcAft>
-              <a:defRPr sz="8200">
-                <a:solidFill>
-                  <a:schemeClr val="tx1"/>
-                </a:solidFill>
-                <a:latin typeface="Arial" panose="020B0604020202020204" pitchFamily="34" charset="0"/>
-                <a:ea typeface="MS PGothic" panose="020B0600070205080204" pitchFamily="34" charset="-128"/>
-              </a:defRPr>
-            </a:lvl9pPr>
-          </a:lstStyle>
-          <a:p>
-            <a:pPr algn="just"/>
-            <a:r>
-              <a:rPr lang="pt-PT" altLang="en-US" sz="2400" dirty="0"/>
-              <a:t>Texto ou imagens Texto ou imagens Texto ou imagens Texto ou imagens Texto ou imagens Texto ou imagens Texto ou imagens Texto ou imagens Texto ou imagens Texto ou imagens Texto ou imagens Texto ou imagens Texto ou imagens Texto ou imagens Texto ou imagens Texto ou imagens Texto ou imagens Texto ou imagens Texto ou imagens Texto ou imagens Texto ou imagens Texto ou imagens Texto ou imagens Texto ou imagens Texto ou imagens Texto ou imagens Texto ou imagens Texto ou imagens Texto ou imagens Texto ou imagens Texto ou imagens Texto ou imagens Texto ou imagens Texto ou imagens Texto ou imagens Texto ou imagens Texto ou imagens Texto ou imagens Texto ou imagens Texto ou imagens Texto ou imagens Texto ou imagens Texto ou imagens Texto ou imagens</a:t>
-            </a:r>
-          </a:p>
-        </p:txBody>
-      </p:sp>
-      <p:sp>
-        <p:nvSpPr>
-          <p:cNvPr id="3496" name="Text Box 424">
-            <a:extLst>
-              <a:ext uri="{FF2B5EF4-FFF2-40B4-BE49-F238E27FC236}">
-                <a16:creationId xmlns:a16="http://schemas.microsoft.com/office/drawing/2014/main" id="{98775074-8231-AA41-03D6-EFD9C63F8F70}"/>
-              </a:ext>
-            </a:extLst>
-          </p:cNvPr>
-          <p:cNvSpPr txBox="1">
-            <a:spLocks noChangeArrowheads="1"/>
-          </p:cNvSpPr>
-          <p:nvPr/>
-        </p:nvSpPr>
-        <p:spPr bwMode="auto">
-          <a:xfrm>
-            <a:off x="11682413" y="6427788"/>
-            <a:ext cx="2417762" cy="989012"/>
-          </a:xfrm>
-          <a:prstGeom prst="rect">
-            <a:avLst/>
-          </a:prstGeom>
-          <a:noFill/>
-          <a:ln>
-            <a:noFill/>
-          </a:ln>
-          <a:effectLst/>
-          <a:extLst>
-            <a:ext uri="{909E8E84-426E-40dd-AFC4-6F175D3DCCD1}">
-              <a14:hiddenFill xmlns:a14="http://schemas.microsoft.com/office/drawing/2010/main" xmlns="">
-                <a:solidFill>
-                  <a:schemeClr val="accent1"/>
-                </a:solidFill>
-              </a14:hiddenFill>
-            </a:ext>
-            <a:ext uri="{91240B29-F687-4f45-9708-019B960494DF}">
-              <a14:hiddenLine xmlns:a14="http://schemas.microsoft.com/office/drawing/2010/main" xmlns="" w="9525">
-                <a:solidFill>
-                  <a:schemeClr val="tx1"/>
-                </a:solidFill>
-                <a:miter lim="800000"/>
-                <a:headEnd/>
-                <a:tailEnd/>
-              </a14:hiddenLine>
-            </a:ext>
-            <a:ext uri="{AF507438-7753-43e0-B8FC-AC1667EBCBE1}">
-              <a14:hiddenEffects xmlns:a14="http://schemas.microsoft.com/office/drawing/2010/main" xmlns="">
-                <a:effectLst>
-                  <a:outerShdw blurRad="63500" dist="38099" dir="2700000" algn="ctr" rotWithShape="0">
-                    <a:schemeClr val="bg2">
-                      <a:alpha val="74998"/>
-                    </a:schemeClr>
-                  </a:outerShdw>
-                </a:effectLst>
-              </a14:hiddenEffects>
-            </a:ext>
-          </a:extLst>
-        </p:spPr>
-        <p:txBody>
-          <a:bodyPr wrap="none" lIns="105168" tIns="52584" rIns="105168" bIns="52584">
-            <a:spAutoFit/>
-          </a:bodyPr>
-          <a:lstStyle>
-            <a:lvl1pPr defTabSz="885825" eaLnBrk="0" hangingPunct="0">
-              <a:defRPr sz="8200">
-                <a:solidFill>
-                  <a:schemeClr val="tx1"/>
-                </a:solidFill>
-                <a:latin typeface="Arial" panose="020B0604020202020204" pitchFamily="34" charset="0"/>
-                <a:ea typeface="MS PGothic" panose="020B0600070205080204" pitchFamily="34" charset="-128"/>
-              </a:defRPr>
-            </a:lvl1pPr>
-            <a:lvl2pPr marL="742950" indent="-285750" defTabSz="885825" eaLnBrk="0" hangingPunct="0">
-              <a:defRPr sz="8200">
-                <a:solidFill>
-                  <a:schemeClr val="tx1"/>
-                </a:solidFill>
-                <a:latin typeface="Arial" panose="020B0604020202020204" pitchFamily="34" charset="0"/>
-                <a:ea typeface="MS PGothic" panose="020B0600070205080204" pitchFamily="34" charset="-128"/>
-              </a:defRPr>
-            </a:lvl2pPr>
-            <a:lvl3pPr marL="1143000" indent="-228600" defTabSz="885825" eaLnBrk="0" hangingPunct="0">
-              <a:defRPr sz="8200">
-                <a:solidFill>
-                  <a:schemeClr val="tx1"/>
-                </a:solidFill>
-                <a:latin typeface="Arial" panose="020B0604020202020204" pitchFamily="34" charset="0"/>
-                <a:ea typeface="MS PGothic" panose="020B0600070205080204" pitchFamily="34" charset="-128"/>
-              </a:defRPr>
-            </a:lvl3pPr>
-            <a:lvl4pPr marL="1600200" indent="-228600" defTabSz="885825" eaLnBrk="0" hangingPunct="0">
-              <a:defRPr sz="8200">
-                <a:solidFill>
-                  <a:schemeClr val="tx1"/>
-                </a:solidFill>
-                <a:latin typeface="Arial" panose="020B0604020202020204" pitchFamily="34" charset="0"/>
-                <a:ea typeface="MS PGothic" panose="020B0600070205080204" pitchFamily="34" charset="-128"/>
-              </a:defRPr>
-            </a:lvl4pPr>
-            <a:lvl5pPr marL="2057400" indent="-228600" defTabSz="885825" eaLnBrk="0" hangingPunct="0">
-              <a:defRPr sz="8200">
-                <a:solidFill>
-                  <a:schemeClr val="tx1"/>
-                </a:solidFill>
-                <a:latin typeface="Arial" panose="020B0604020202020204" pitchFamily="34" charset="0"/>
-                <a:ea typeface="MS PGothic" panose="020B0600070205080204" pitchFamily="34" charset="-128"/>
-              </a:defRPr>
-            </a:lvl5pPr>
-            <a:lvl6pPr marL="2514600" indent="-228600" defTabSz="885825" eaLnBrk="0" fontAlgn="base" hangingPunct="0">
-              <a:spcBef>
-                <a:spcPct val="0"/>
-              </a:spcBef>
-              <a:spcAft>
-                <a:spcPct val="0"/>
-              </a:spcAft>
-              <a:defRPr sz="8200">
-                <a:solidFill>
-                  <a:schemeClr val="tx1"/>
-                </a:solidFill>
-                <a:latin typeface="Arial" panose="020B0604020202020204" pitchFamily="34" charset="0"/>
-                <a:ea typeface="MS PGothic" panose="020B0600070205080204" pitchFamily="34" charset="-128"/>
-              </a:defRPr>
-            </a:lvl6pPr>
-            <a:lvl7pPr marL="2971800" indent="-228600" defTabSz="885825" eaLnBrk="0" fontAlgn="base" hangingPunct="0">
-              <a:spcBef>
-                <a:spcPct val="0"/>
-              </a:spcBef>
-              <a:spcAft>
-                <a:spcPct val="0"/>
-              </a:spcAft>
-              <a:defRPr sz="8200">
-                <a:solidFill>
-                  <a:schemeClr val="tx1"/>
-                </a:solidFill>
-                <a:latin typeface="Arial" panose="020B0604020202020204" pitchFamily="34" charset="0"/>
-                <a:ea typeface="MS PGothic" panose="020B0600070205080204" pitchFamily="34" charset="-128"/>
-              </a:defRPr>
-            </a:lvl7pPr>
-            <a:lvl8pPr marL="3429000" indent="-228600" defTabSz="885825" eaLnBrk="0" fontAlgn="base" hangingPunct="0">
-              <a:spcBef>
-                <a:spcPct val="0"/>
-              </a:spcBef>
-              <a:spcAft>
-                <a:spcPct val="0"/>
-              </a:spcAft>
-              <a:defRPr sz="8200">
-                <a:solidFill>
-                  <a:schemeClr val="tx1"/>
-                </a:solidFill>
-                <a:latin typeface="Arial" panose="020B0604020202020204" pitchFamily="34" charset="0"/>
-                <a:ea typeface="MS PGothic" panose="020B0600070205080204" pitchFamily="34" charset="-128"/>
-              </a:defRPr>
-            </a:lvl8pPr>
-            <a:lvl9pPr marL="3886200" indent="-228600" defTabSz="885825" eaLnBrk="0" fontAlgn="base" hangingPunct="0">
-              <a:spcBef>
-                <a:spcPct val="0"/>
-              </a:spcBef>
-              <a:spcAft>
-                <a:spcPct val="0"/>
-              </a:spcAft>
-              <a:defRPr sz="8200">
-                <a:solidFill>
-                  <a:schemeClr val="tx1"/>
-                </a:solidFill>
-                <a:latin typeface="Arial" panose="020B0604020202020204" pitchFamily="34" charset="0"/>
-                <a:ea typeface="MS PGothic" panose="020B0600070205080204" pitchFamily="34" charset="-128"/>
-              </a:defRPr>
-            </a:lvl9pPr>
-          </a:lstStyle>
-          <a:p>
-            <a:pPr>
-              <a:spcAft>
-                <a:spcPct val="30000"/>
-              </a:spcAft>
-            </a:pPr>
-            <a:r>
-              <a:rPr lang="pt-PT" altLang="en-US" sz="5800" b="1">
-                <a:effectLst>
-                  <a:outerShdw blurRad="38100" dist="38100" dir="2700000" algn="tl">
-                    <a:srgbClr val="C0C0C0"/>
-                  </a:outerShdw>
-                </a:effectLst>
-              </a:rPr>
-              <a:t>Título </a:t>
+              <a:t>Projeto desenvolvido </a:t>
             </a:r>
           </a:p>
         </p:txBody>
@@ -8270,8 +6216,8 @@
         </p:blipFill>
         <p:spPr bwMode="auto">
           <a:xfrm>
-            <a:off x="1098550" y="1003300"/>
-            <a:ext cx="5522913" cy="4271963"/>
+            <a:off x="1370696" y="985839"/>
+            <a:ext cx="6736306" cy="5210520"/>
           </a:xfrm>
           <a:prstGeom prst="rect">
             <a:avLst/>
@@ -8330,8 +6276,8 @@
         </p:blipFill>
         <p:spPr bwMode="auto">
           <a:xfrm>
-            <a:off x="35661600" y="1027113"/>
-            <a:ext cx="5605463" cy="4090987"/>
+            <a:off x="34127618" y="1027113"/>
+            <a:ext cx="7139445" cy="5210520"/>
           </a:xfrm>
           <a:prstGeom prst="rect">
             <a:avLst/>
@@ -8383,7 +6329,7 @@
         </p:blipFill>
         <p:spPr>
           <a:xfrm>
-            <a:off x="1383742" y="25285119"/>
+            <a:off x="1498973" y="26336591"/>
             <a:ext cx="8125939" cy="2068088"/>
           </a:xfrm>
           <a:prstGeom prst="rect">
@@ -8407,7 +6353,7 @@
         </p:nvSpPr>
         <p:spPr bwMode="auto">
           <a:xfrm>
-            <a:off x="1278236" y="27929470"/>
+            <a:off x="1332831" y="28469242"/>
             <a:ext cx="4408487" cy="383083"/>
           </a:xfrm>
           <a:prstGeom prst="rect">
@@ -8420,14 +6366,14 @@
           <a:effectLst/>
           <a:extLst>
             <a:ext uri="{909E8E84-426E-40dd-AFC4-6F175D3DCCD1}">
-              <a14:hiddenFill xmlns:a14="http://schemas.microsoft.com/office/drawing/2010/main" xmlns="">
+              <a14:hiddenFill xmlns="" xmlns:a14="http://schemas.microsoft.com/office/drawing/2010/main">
                 <a:solidFill>
                   <a:schemeClr val="accent1"/>
                 </a:solidFill>
               </a14:hiddenFill>
             </a:ext>
             <a:ext uri="{91240B29-F687-4f45-9708-019B960494DF}">
-              <a14:hiddenLine xmlns:a14="http://schemas.microsoft.com/office/drawing/2010/main" xmlns="" w="9525">
+              <a14:hiddenLine xmlns="" xmlns:a14="http://schemas.microsoft.com/office/drawing/2010/main" w="9525">
                 <a:solidFill>
                   <a:schemeClr val="tx1"/>
                 </a:solidFill>
@@ -8437,7 +6383,7 @@
               </a14:hiddenLine>
             </a:ext>
             <a:ext uri="{AF507438-7753-43e0-B8FC-AC1667EBCBE1}">
-              <a14:hiddenEffects xmlns:a14="http://schemas.microsoft.com/office/drawing/2010/main" xmlns="">
+              <a14:hiddenEffects xmlns="" xmlns:a14="http://schemas.microsoft.com/office/drawing/2010/main">
                 <a:effectLst>
                   <a:outerShdw blurRad="63500" dist="38099" dir="2700000" algn="ctr" rotWithShape="0">
                     <a:schemeClr val="bg2">
@@ -8571,12 +6517,648 @@
           </a:p>
         </p:txBody>
       </p:sp>
+      <p:sp>
+        <p:nvSpPr>
+          <p:cNvPr id="39" name="Text Box 9">
+            <a:extLst>
+              <a:ext uri="{FF2B5EF4-FFF2-40B4-BE49-F238E27FC236}">
+                <a16:creationId xmlns:a16="http://schemas.microsoft.com/office/drawing/2014/main" id="{4C7CC9D7-5C8D-32DA-36D1-1B08694206CF}"/>
+              </a:ext>
+            </a:extLst>
+          </p:cNvPr>
+          <p:cNvSpPr txBox="1">
+            <a:spLocks noChangeArrowheads="1"/>
+          </p:cNvSpPr>
+          <p:nvPr/>
+        </p:nvSpPr>
+        <p:spPr bwMode="auto">
+          <a:xfrm>
+            <a:off x="11456117" y="17020982"/>
+            <a:ext cx="5658458" cy="998747"/>
+          </a:xfrm>
+          <a:prstGeom prst="rect">
+            <a:avLst/>
+          </a:prstGeom>
+          <a:noFill/>
+          <a:ln>
+            <a:noFill/>
+          </a:ln>
+          <a:effectLst/>
+          <a:extLst>
+            <a:ext uri="{909E8E84-426E-40dd-AFC4-6F175D3DCCD1}">
+              <a14:hiddenFill xmlns="" xmlns:a14="http://schemas.microsoft.com/office/drawing/2010/main">
+                <a:solidFill>
+                  <a:schemeClr val="accent1"/>
+                </a:solidFill>
+              </a14:hiddenFill>
+            </a:ext>
+            <a:ext uri="{91240B29-F687-4f45-9708-019B960494DF}">
+              <a14:hiddenLine xmlns="" xmlns:a14="http://schemas.microsoft.com/office/drawing/2010/main" w="9525">
+                <a:solidFill>
+                  <a:schemeClr val="tx1"/>
+                </a:solidFill>
+                <a:miter lim="800000"/>
+                <a:headEnd/>
+                <a:tailEnd/>
+              </a14:hiddenLine>
+            </a:ext>
+            <a:ext uri="{AF507438-7753-43e0-B8FC-AC1667EBCBE1}">
+              <a14:hiddenEffects xmlns="" xmlns:a14="http://schemas.microsoft.com/office/drawing/2010/main">
+                <a:effectLst>
+                  <a:outerShdw blurRad="63500" dist="38099" dir="2700000" algn="ctr" rotWithShape="0">
+                    <a:schemeClr val="bg2">
+                      <a:alpha val="74998"/>
+                    </a:schemeClr>
+                  </a:outerShdw>
+                </a:effectLst>
+              </a14:hiddenEffects>
+            </a:ext>
+          </a:extLst>
+        </p:spPr>
+        <p:txBody>
+          <a:bodyPr wrap="square" lIns="105168" tIns="52584" rIns="105168" bIns="52584">
+            <a:spAutoFit/>
+          </a:bodyPr>
+          <a:lstStyle>
+            <a:lvl1pPr defTabSz="885825" eaLnBrk="0" hangingPunct="0">
+              <a:defRPr sz="8200">
+                <a:solidFill>
+                  <a:schemeClr val="tx1"/>
+                </a:solidFill>
+                <a:latin typeface="Arial" panose="020B0604020202020204" pitchFamily="34" charset="0"/>
+                <a:ea typeface="MS PGothic" panose="020B0600070205080204" pitchFamily="34" charset="-128"/>
+              </a:defRPr>
+            </a:lvl1pPr>
+            <a:lvl2pPr marL="742950" indent="-285750" defTabSz="885825" eaLnBrk="0" hangingPunct="0">
+              <a:defRPr sz="8200">
+                <a:solidFill>
+                  <a:schemeClr val="tx1"/>
+                </a:solidFill>
+                <a:latin typeface="Arial" panose="020B0604020202020204" pitchFamily="34" charset="0"/>
+                <a:ea typeface="MS PGothic" panose="020B0600070205080204" pitchFamily="34" charset="-128"/>
+              </a:defRPr>
+            </a:lvl2pPr>
+            <a:lvl3pPr marL="1143000" indent="-228600" defTabSz="885825" eaLnBrk="0" hangingPunct="0">
+              <a:defRPr sz="8200">
+                <a:solidFill>
+                  <a:schemeClr val="tx1"/>
+                </a:solidFill>
+                <a:latin typeface="Arial" panose="020B0604020202020204" pitchFamily="34" charset="0"/>
+                <a:ea typeface="MS PGothic" panose="020B0600070205080204" pitchFamily="34" charset="-128"/>
+              </a:defRPr>
+            </a:lvl3pPr>
+            <a:lvl4pPr marL="1600200" indent="-228600" defTabSz="885825" eaLnBrk="0" hangingPunct="0">
+              <a:defRPr sz="8200">
+                <a:solidFill>
+                  <a:schemeClr val="tx1"/>
+                </a:solidFill>
+                <a:latin typeface="Arial" panose="020B0604020202020204" pitchFamily="34" charset="0"/>
+                <a:ea typeface="MS PGothic" panose="020B0600070205080204" pitchFamily="34" charset="-128"/>
+              </a:defRPr>
+            </a:lvl4pPr>
+            <a:lvl5pPr marL="2057400" indent="-228600" defTabSz="885825" eaLnBrk="0" hangingPunct="0">
+              <a:defRPr sz="8200">
+                <a:solidFill>
+                  <a:schemeClr val="tx1"/>
+                </a:solidFill>
+                <a:latin typeface="Arial" panose="020B0604020202020204" pitchFamily="34" charset="0"/>
+                <a:ea typeface="MS PGothic" panose="020B0600070205080204" pitchFamily="34" charset="-128"/>
+              </a:defRPr>
+            </a:lvl5pPr>
+            <a:lvl6pPr marL="2514600" indent="-228600" defTabSz="885825" eaLnBrk="0" fontAlgn="base" hangingPunct="0">
+              <a:spcBef>
+                <a:spcPct val="0"/>
+              </a:spcBef>
+              <a:spcAft>
+                <a:spcPct val="0"/>
+              </a:spcAft>
+              <a:defRPr sz="8200">
+                <a:solidFill>
+                  <a:schemeClr val="tx1"/>
+                </a:solidFill>
+                <a:latin typeface="Arial" panose="020B0604020202020204" pitchFamily="34" charset="0"/>
+                <a:ea typeface="MS PGothic" panose="020B0600070205080204" pitchFamily="34" charset="-128"/>
+              </a:defRPr>
+            </a:lvl6pPr>
+            <a:lvl7pPr marL="2971800" indent="-228600" defTabSz="885825" eaLnBrk="0" fontAlgn="base" hangingPunct="0">
+              <a:spcBef>
+                <a:spcPct val="0"/>
+              </a:spcBef>
+              <a:spcAft>
+                <a:spcPct val="0"/>
+              </a:spcAft>
+              <a:defRPr sz="8200">
+                <a:solidFill>
+                  <a:schemeClr val="tx1"/>
+                </a:solidFill>
+                <a:latin typeface="Arial" panose="020B0604020202020204" pitchFamily="34" charset="0"/>
+                <a:ea typeface="MS PGothic" panose="020B0600070205080204" pitchFamily="34" charset="-128"/>
+              </a:defRPr>
+            </a:lvl7pPr>
+            <a:lvl8pPr marL="3429000" indent="-228600" defTabSz="885825" eaLnBrk="0" fontAlgn="base" hangingPunct="0">
+              <a:spcBef>
+                <a:spcPct val="0"/>
+              </a:spcBef>
+              <a:spcAft>
+                <a:spcPct val="0"/>
+              </a:spcAft>
+              <a:defRPr sz="8200">
+                <a:solidFill>
+                  <a:schemeClr val="tx1"/>
+                </a:solidFill>
+                <a:latin typeface="Arial" panose="020B0604020202020204" pitchFamily="34" charset="0"/>
+                <a:ea typeface="MS PGothic" panose="020B0600070205080204" pitchFamily="34" charset="-128"/>
+              </a:defRPr>
+            </a:lvl8pPr>
+            <a:lvl9pPr marL="3886200" indent="-228600" defTabSz="885825" eaLnBrk="0" fontAlgn="base" hangingPunct="0">
+              <a:spcBef>
+                <a:spcPct val="0"/>
+              </a:spcBef>
+              <a:spcAft>
+                <a:spcPct val="0"/>
+              </a:spcAft>
+              <a:defRPr sz="8200">
+                <a:solidFill>
+                  <a:schemeClr val="tx1"/>
+                </a:solidFill>
+                <a:latin typeface="Arial" panose="020B0604020202020204" pitchFamily="34" charset="0"/>
+                <a:ea typeface="MS PGothic" panose="020B0600070205080204" pitchFamily="34" charset="-128"/>
+              </a:defRPr>
+            </a:lvl9pPr>
+          </a:lstStyle>
+          <a:p>
+            <a:pPr>
+              <a:spcAft>
+                <a:spcPct val="30000"/>
+              </a:spcAft>
+            </a:pPr>
+            <a:r>
+              <a:rPr lang="pt-PT" altLang="en-US" sz="5800" b="1" dirty="0">
+                <a:effectLst>
+                  <a:outerShdw blurRad="38100" dist="38100" dir="2700000" algn="tl">
+                    <a:srgbClr val="C0C0C0"/>
+                  </a:outerShdw>
+                </a:effectLst>
+              </a:rPr>
+              <a:t>Fase Formativa </a:t>
+            </a:r>
+          </a:p>
+        </p:txBody>
+      </p:sp>
+      <p:sp>
+        <p:nvSpPr>
+          <p:cNvPr id="41" name="Rectangle 13">
+            <a:extLst>
+              <a:ext uri="{FF2B5EF4-FFF2-40B4-BE49-F238E27FC236}">
+                <a16:creationId xmlns:a16="http://schemas.microsoft.com/office/drawing/2014/main" id="{D2428767-E99D-D67F-3C3C-F802785833D1}"/>
+              </a:ext>
+            </a:extLst>
+          </p:cNvPr>
+          <p:cNvSpPr>
+            <a:spLocks noChangeArrowheads="1"/>
+          </p:cNvSpPr>
+          <p:nvPr/>
+        </p:nvSpPr>
+        <p:spPr bwMode="auto">
+          <a:xfrm>
+            <a:off x="10853316" y="10258372"/>
+            <a:ext cx="11807825" cy="12878433"/>
+          </a:xfrm>
+          <a:prstGeom prst="rect">
+            <a:avLst/>
+          </a:prstGeom>
+          <a:noFill/>
+          <a:ln w="76200">
+            <a:solidFill>
+              <a:srgbClr val="326598"/>
+            </a:solidFill>
+            <a:miter lim="800000"/>
+            <a:headEnd/>
+            <a:tailEnd/>
+          </a:ln>
+          <a:effectLst/>
+          <a:extLst>
+            <a:ext uri="{909E8E84-426E-40dd-AFC4-6F175D3DCCD1}">
+              <a14:hiddenFill xmlns="" xmlns:a14="http://schemas.microsoft.com/office/drawing/2010/main">
+                <a:solidFill>
+                  <a:schemeClr val="accent1"/>
+                </a:solidFill>
+              </a14:hiddenFill>
+            </a:ext>
+            <a:ext uri="{AF507438-7753-43e0-B8FC-AC1667EBCBE1}">
+              <a14:hiddenEffects xmlns="" xmlns:a14="http://schemas.microsoft.com/office/drawing/2010/main">
+                <a:effectLst>
+                  <a:outerShdw blurRad="63500" dist="38099" dir="2700000" algn="ctr" rotWithShape="0">
+                    <a:schemeClr val="bg2">
+                      <a:alpha val="74998"/>
+                    </a:schemeClr>
+                  </a:outerShdw>
+                </a:effectLst>
+              </a14:hiddenEffects>
+            </a:ext>
+          </a:extLst>
+        </p:spPr>
+        <p:txBody>
+          <a:bodyPr wrap="none" anchor="ctr"/>
+          <a:lstStyle/>
+          <a:p>
+            <a:pPr>
+              <a:defRPr/>
+            </a:pPr>
+            <a:endParaRPr lang="en-US">
+              <a:latin typeface="Arial" charset="0"/>
+              <a:ea typeface="ＭＳ Ｐゴシック" charset="0"/>
+            </a:endParaRPr>
+          </a:p>
+        </p:txBody>
+      </p:sp>
+      <p:sp>
+        <p:nvSpPr>
+          <p:cNvPr id="42" name="Text Box 139">
+            <a:extLst>
+              <a:ext uri="{FF2B5EF4-FFF2-40B4-BE49-F238E27FC236}">
+                <a16:creationId xmlns:a16="http://schemas.microsoft.com/office/drawing/2014/main" id="{AD5D169B-0546-2683-084B-47025C9766DB}"/>
+              </a:ext>
+            </a:extLst>
+          </p:cNvPr>
+          <p:cNvSpPr txBox="1">
+            <a:spLocks noChangeArrowheads="1"/>
+          </p:cNvSpPr>
+          <p:nvPr/>
+        </p:nvSpPr>
+        <p:spPr bwMode="auto">
+          <a:xfrm>
+            <a:off x="11456118" y="16603626"/>
+            <a:ext cx="4408487" cy="383083"/>
+          </a:xfrm>
+          <a:prstGeom prst="rect">
+            <a:avLst/>
+          </a:prstGeom>
+          <a:noFill/>
+          <a:ln>
+            <a:noFill/>
+          </a:ln>
+          <a:effectLst/>
+          <a:extLst>
+            <a:ext uri="{909E8E84-426E-40dd-AFC4-6F175D3DCCD1}">
+              <a14:hiddenFill xmlns="" xmlns:a14="http://schemas.microsoft.com/office/drawing/2010/main">
+                <a:solidFill>
+                  <a:schemeClr val="accent1"/>
+                </a:solidFill>
+              </a14:hiddenFill>
+            </a:ext>
+            <a:ext uri="{91240B29-F687-4f45-9708-019B960494DF}">
+              <a14:hiddenLine xmlns="" xmlns:a14="http://schemas.microsoft.com/office/drawing/2010/main" w="9525">
+                <a:solidFill>
+                  <a:schemeClr val="tx1"/>
+                </a:solidFill>
+                <a:miter lim="800000"/>
+                <a:headEnd/>
+                <a:tailEnd/>
+              </a14:hiddenLine>
+            </a:ext>
+            <a:ext uri="{AF507438-7753-43e0-B8FC-AC1667EBCBE1}">
+              <a14:hiddenEffects xmlns="" xmlns:a14="http://schemas.microsoft.com/office/drawing/2010/main">
+                <a:effectLst>
+                  <a:outerShdw blurRad="63500" dist="38099" dir="2700000" algn="ctr" rotWithShape="0">
+                    <a:schemeClr val="bg2">
+                      <a:alpha val="74998"/>
+                    </a:schemeClr>
+                  </a:outerShdw>
+                </a:effectLst>
+              </a14:hiddenEffects>
+            </a:ext>
+          </a:extLst>
+        </p:spPr>
+        <p:txBody>
+          <a:bodyPr lIns="74578" tIns="37289" rIns="74578" bIns="37289">
+            <a:spAutoFit/>
+          </a:bodyPr>
+          <a:lstStyle>
+            <a:lvl1pPr defTabSz="746125">
+              <a:defRPr>
+                <a:solidFill>
+                  <a:schemeClr val="tx1"/>
+                </a:solidFill>
+                <a:latin typeface="Arial" charset="0"/>
+                <a:ea typeface="ＭＳ Ｐゴシック" charset="0"/>
+              </a:defRPr>
+            </a:lvl1pPr>
+            <a:lvl2pPr marL="373063" defTabSz="746125">
+              <a:defRPr>
+                <a:solidFill>
+                  <a:schemeClr val="tx1"/>
+                </a:solidFill>
+                <a:latin typeface="Arial" charset="0"/>
+                <a:ea typeface="ＭＳ Ｐゴシック" charset="0"/>
+              </a:defRPr>
+            </a:lvl2pPr>
+            <a:lvl3pPr marL="746125" defTabSz="746125">
+              <a:defRPr>
+                <a:solidFill>
+                  <a:schemeClr val="tx1"/>
+                </a:solidFill>
+                <a:latin typeface="Arial" charset="0"/>
+                <a:ea typeface="ＭＳ Ｐゴシック" charset="0"/>
+              </a:defRPr>
+            </a:lvl3pPr>
+            <a:lvl4pPr marL="1119188" defTabSz="746125">
+              <a:defRPr>
+                <a:solidFill>
+                  <a:schemeClr val="tx1"/>
+                </a:solidFill>
+                <a:latin typeface="Arial" charset="0"/>
+                <a:ea typeface="ＭＳ Ｐゴシック" charset="0"/>
+              </a:defRPr>
+            </a:lvl4pPr>
+            <a:lvl5pPr marL="1492250" defTabSz="746125">
+              <a:defRPr>
+                <a:solidFill>
+                  <a:schemeClr val="tx1"/>
+                </a:solidFill>
+                <a:latin typeface="Arial" charset="0"/>
+                <a:ea typeface="ＭＳ Ｐゴシック" charset="0"/>
+              </a:defRPr>
+            </a:lvl5pPr>
+            <a:lvl6pPr marL="1949450" defTabSz="746125" fontAlgn="base">
+              <a:spcBef>
+                <a:spcPct val="0"/>
+              </a:spcBef>
+              <a:spcAft>
+                <a:spcPct val="0"/>
+              </a:spcAft>
+              <a:defRPr>
+                <a:solidFill>
+                  <a:schemeClr val="tx1"/>
+                </a:solidFill>
+                <a:latin typeface="Arial" charset="0"/>
+                <a:ea typeface="ＭＳ Ｐゴシック" charset="0"/>
+              </a:defRPr>
+            </a:lvl6pPr>
+            <a:lvl7pPr marL="2406650" defTabSz="746125" fontAlgn="base">
+              <a:spcBef>
+                <a:spcPct val="0"/>
+              </a:spcBef>
+              <a:spcAft>
+                <a:spcPct val="0"/>
+              </a:spcAft>
+              <a:defRPr>
+                <a:solidFill>
+                  <a:schemeClr val="tx1"/>
+                </a:solidFill>
+                <a:latin typeface="Arial" charset="0"/>
+                <a:ea typeface="ＭＳ Ｐゴシック" charset="0"/>
+              </a:defRPr>
+            </a:lvl7pPr>
+            <a:lvl8pPr marL="2863850" defTabSz="746125" fontAlgn="base">
+              <a:spcBef>
+                <a:spcPct val="0"/>
+              </a:spcBef>
+              <a:spcAft>
+                <a:spcPct val="0"/>
+              </a:spcAft>
+              <a:defRPr>
+                <a:solidFill>
+                  <a:schemeClr val="tx1"/>
+                </a:solidFill>
+                <a:latin typeface="Arial" charset="0"/>
+                <a:ea typeface="ＭＳ Ｐゴシック" charset="0"/>
+              </a:defRPr>
+            </a:lvl8pPr>
+            <a:lvl9pPr marL="3321050" defTabSz="746125" fontAlgn="base">
+              <a:spcBef>
+                <a:spcPct val="0"/>
+              </a:spcBef>
+              <a:spcAft>
+                <a:spcPct val="0"/>
+              </a:spcAft>
+              <a:defRPr>
+                <a:solidFill>
+                  <a:schemeClr val="tx1"/>
+                </a:solidFill>
+                <a:latin typeface="Arial" charset="0"/>
+                <a:ea typeface="ＭＳ Ｐゴシック" charset="0"/>
+              </a:defRPr>
+            </a:lvl9pPr>
+          </a:lstStyle>
+          <a:p>
+            <a:pPr eaLnBrk="0" hangingPunct="0">
+              <a:defRPr/>
+            </a:pPr>
+            <a:r>
+              <a:rPr lang="pt-PT" sz="2000" dirty="0"/>
+              <a:t>Figura 2: Software usado no estágio</a:t>
+            </a:r>
+          </a:p>
+        </p:txBody>
+      </p:sp>
+      <p:sp>
+        <p:nvSpPr>
+          <p:cNvPr id="43" name="Text Box 423">
+            <a:extLst>
+              <a:ext uri="{FF2B5EF4-FFF2-40B4-BE49-F238E27FC236}">
+                <a16:creationId xmlns:a16="http://schemas.microsoft.com/office/drawing/2014/main" id="{7888F272-1E9B-7958-C755-38CDF51F2D5F}"/>
+              </a:ext>
+            </a:extLst>
+          </p:cNvPr>
+          <p:cNvSpPr txBox="1">
+            <a:spLocks noChangeArrowheads="1"/>
+          </p:cNvSpPr>
+          <p:nvPr/>
+        </p:nvSpPr>
+        <p:spPr bwMode="auto">
+          <a:xfrm>
+            <a:off x="11456117" y="18202082"/>
+            <a:ext cx="10630348" cy="4507289"/>
+          </a:xfrm>
+          <a:prstGeom prst="rect">
+            <a:avLst/>
+          </a:prstGeom>
+          <a:noFill/>
+          <a:ln>
+            <a:noFill/>
+          </a:ln>
+          <a:effectLst/>
+          <a:extLst>
+            <a:ext uri="{909E8E84-426E-40dd-AFC4-6F175D3DCCD1}">
+              <a14:hiddenFill xmlns="" xmlns:a14="http://schemas.microsoft.com/office/drawing/2010/main">
+                <a:solidFill>
+                  <a:schemeClr val="accent1"/>
+                </a:solidFill>
+              </a14:hiddenFill>
+            </a:ext>
+            <a:ext uri="{91240B29-F687-4f45-9708-019B960494DF}">
+              <a14:hiddenLine xmlns="" xmlns:a14="http://schemas.microsoft.com/office/drawing/2010/main" w="9525">
+                <a:solidFill>
+                  <a:schemeClr val="tx1"/>
+                </a:solidFill>
+                <a:miter lim="800000"/>
+                <a:headEnd/>
+                <a:tailEnd/>
+              </a14:hiddenLine>
+            </a:ext>
+            <a:ext uri="{AF507438-7753-43e0-B8FC-AC1667EBCBE1}">
+              <a14:hiddenEffects xmlns="" xmlns:a14="http://schemas.microsoft.com/office/drawing/2010/main">
+                <a:effectLst>
+                  <a:outerShdw blurRad="63500" dist="38099" dir="2700000" algn="ctr" rotWithShape="0">
+                    <a:schemeClr val="bg2">
+                      <a:alpha val="74998"/>
+                    </a:schemeClr>
+                  </a:outerShdw>
+                </a:effectLst>
+              </a14:hiddenEffects>
+            </a:ext>
+          </a:extLst>
+        </p:spPr>
+        <p:txBody>
+          <a:bodyPr wrap="square" lIns="74578" tIns="37289" rIns="74578" bIns="37289">
+            <a:spAutoFit/>
+          </a:bodyPr>
+          <a:lstStyle>
+            <a:lvl1pPr defTabSz="746125" eaLnBrk="0" hangingPunct="0">
+              <a:defRPr sz="8200">
+                <a:solidFill>
+                  <a:schemeClr val="tx1"/>
+                </a:solidFill>
+                <a:latin typeface="Arial" panose="020B0604020202020204" pitchFamily="34" charset="0"/>
+                <a:ea typeface="MS PGothic" panose="020B0600070205080204" pitchFamily="34" charset="-128"/>
+              </a:defRPr>
+            </a:lvl1pPr>
+            <a:lvl2pPr marL="742950" indent="-285750" defTabSz="746125" eaLnBrk="0" hangingPunct="0">
+              <a:defRPr sz="8200">
+                <a:solidFill>
+                  <a:schemeClr val="tx1"/>
+                </a:solidFill>
+                <a:latin typeface="Arial" panose="020B0604020202020204" pitchFamily="34" charset="0"/>
+                <a:ea typeface="MS PGothic" panose="020B0600070205080204" pitchFamily="34" charset="-128"/>
+              </a:defRPr>
+            </a:lvl2pPr>
+            <a:lvl3pPr marL="1143000" indent="-228600" defTabSz="746125" eaLnBrk="0" hangingPunct="0">
+              <a:defRPr sz="8200">
+                <a:solidFill>
+                  <a:schemeClr val="tx1"/>
+                </a:solidFill>
+                <a:latin typeface="Arial" panose="020B0604020202020204" pitchFamily="34" charset="0"/>
+                <a:ea typeface="MS PGothic" panose="020B0600070205080204" pitchFamily="34" charset="-128"/>
+              </a:defRPr>
+            </a:lvl3pPr>
+            <a:lvl4pPr marL="1600200" indent="-228600" defTabSz="746125" eaLnBrk="0" hangingPunct="0">
+              <a:defRPr sz="8200">
+                <a:solidFill>
+                  <a:schemeClr val="tx1"/>
+                </a:solidFill>
+                <a:latin typeface="Arial" panose="020B0604020202020204" pitchFamily="34" charset="0"/>
+                <a:ea typeface="MS PGothic" panose="020B0600070205080204" pitchFamily="34" charset="-128"/>
+              </a:defRPr>
+            </a:lvl4pPr>
+            <a:lvl5pPr marL="2057400" indent="-228600" defTabSz="746125" eaLnBrk="0" hangingPunct="0">
+              <a:defRPr sz="8200">
+                <a:solidFill>
+                  <a:schemeClr val="tx1"/>
+                </a:solidFill>
+                <a:latin typeface="Arial" panose="020B0604020202020204" pitchFamily="34" charset="0"/>
+                <a:ea typeface="MS PGothic" panose="020B0600070205080204" pitchFamily="34" charset="-128"/>
+              </a:defRPr>
+            </a:lvl5pPr>
+            <a:lvl6pPr marL="2514600" indent="-228600" defTabSz="746125" eaLnBrk="0" fontAlgn="base" hangingPunct="0">
+              <a:spcBef>
+                <a:spcPct val="0"/>
+              </a:spcBef>
+              <a:spcAft>
+                <a:spcPct val="0"/>
+              </a:spcAft>
+              <a:defRPr sz="8200">
+                <a:solidFill>
+                  <a:schemeClr val="tx1"/>
+                </a:solidFill>
+                <a:latin typeface="Arial" panose="020B0604020202020204" pitchFamily="34" charset="0"/>
+                <a:ea typeface="MS PGothic" panose="020B0600070205080204" pitchFamily="34" charset="-128"/>
+              </a:defRPr>
+            </a:lvl6pPr>
+            <a:lvl7pPr marL="2971800" indent="-228600" defTabSz="746125" eaLnBrk="0" fontAlgn="base" hangingPunct="0">
+              <a:spcBef>
+                <a:spcPct val="0"/>
+              </a:spcBef>
+              <a:spcAft>
+                <a:spcPct val="0"/>
+              </a:spcAft>
+              <a:defRPr sz="8200">
+                <a:solidFill>
+                  <a:schemeClr val="tx1"/>
+                </a:solidFill>
+                <a:latin typeface="Arial" panose="020B0604020202020204" pitchFamily="34" charset="0"/>
+                <a:ea typeface="MS PGothic" panose="020B0600070205080204" pitchFamily="34" charset="-128"/>
+              </a:defRPr>
+            </a:lvl7pPr>
+            <a:lvl8pPr marL="3429000" indent="-228600" defTabSz="746125" eaLnBrk="0" fontAlgn="base" hangingPunct="0">
+              <a:spcBef>
+                <a:spcPct val="0"/>
+              </a:spcBef>
+              <a:spcAft>
+                <a:spcPct val="0"/>
+              </a:spcAft>
+              <a:defRPr sz="8200">
+                <a:solidFill>
+                  <a:schemeClr val="tx1"/>
+                </a:solidFill>
+                <a:latin typeface="Arial" panose="020B0604020202020204" pitchFamily="34" charset="0"/>
+                <a:ea typeface="MS PGothic" panose="020B0600070205080204" pitchFamily="34" charset="-128"/>
+              </a:defRPr>
+            </a:lvl8pPr>
+            <a:lvl9pPr marL="3886200" indent="-228600" defTabSz="746125" eaLnBrk="0" fontAlgn="base" hangingPunct="0">
+              <a:spcBef>
+                <a:spcPct val="0"/>
+              </a:spcBef>
+              <a:spcAft>
+                <a:spcPct val="0"/>
+              </a:spcAft>
+              <a:defRPr sz="8200">
+                <a:solidFill>
+                  <a:schemeClr val="tx1"/>
+                </a:solidFill>
+                <a:latin typeface="Arial" panose="020B0604020202020204" pitchFamily="34" charset="0"/>
+                <a:ea typeface="MS PGothic" panose="020B0600070205080204" pitchFamily="34" charset="-128"/>
+              </a:defRPr>
+            </a:lvl9pPr>
+          </a:lstStyle>
+          <a:p>
+            <a:pPr algn="just"/>
+            <a:r>
+              <a:rPr lang="pt-BR" altLang="en-US" sz="2400" dirty="0"/>
+              <a:t>Esta fase teve uma duração base de duas semanas. Aqui foi-nos doado três cursos do Udemy, gradualmente e sequencialmente dependendo do progresso do estagiário.</a:t>
+            </a:r>
+          </a:p>
+          <a:p>
+            <a:pPr algn="just"/>
+            <a:endParaRPr lang="pt-BR" altLang="en-US" sz="2400" dirty="0"/>
+          </a:p>
+          <a:p>
+            <a:pPr algn="just"/>
+            <a:r>
+              <a:rPr lang="pt-BR" altLang="en-US" sz="2400" dirty="0"/>
+              <a:t>Estes cursos tinham como objetivo ajudar ao estagiário a desenvolver competências para o projeto que será desenvolvido, o qual reflete as competências que o estagiário deve possuir para poder trabalhar no backend da empresa que está a trabalhar.</a:t>
+            </a:r>
+          </a:p>
+          <a:p>
+            <a:pPr algn="just"/>
+            <a:endParaRPr lang="pt-BR" altLang="en-US" sz="2400" dirty="0"/>
+          </a:p>
+          <a:p>
+            <a:pPr algn="just"/>
+            <a:r>
+              <a:rPr lang="pt-BR" altLang="en-US" sz="2400" dirty="0"/>
+              <a:t>Aprendendo assim: Programação Reactiva, Containers, Backend em Java, Gradle tasking e todas as tecnologias que o permitem e estão dispostas na imagem acima.</a:t>
+            </a:r>
+            <a:endParaRPr lang="pt-PT" altLang="en-US" sz="2400" dirty="0"/>
+          </a:p>
+        </p:txBody>
+      </p:sp>
       <p:pic>
         <p:nvPicPr>
-          <p:cNvPr id="2076" name="Picture 28" descr="Creating a Rest application with Micronaut | by Daniel Dias | Daniel Dias |  Medium">
+          <p:cNvPr id="44" name="Picture 28" descr="Creating a Rest application with Micronaut | by Daniel Dias | Daniel Dias |  Medium">
             <a:extLst>
               <a:ext uri="{FF2B5EF4-FFF2-40B4-BE49-F238E27FC236}">
-                <a16:creationId xmlns:a16="http://schemas.microsoft.com/office/drawing/2014/main" id="{F84FA6E2-A546-5D86-45F8-25D4A5848271}"/>
+                <a16:creationId xmlns:a16="http://schemas.microsoft.com/office/drawing/2014/main" id="{AB6B596A-C0BB-3839-BFB3-DD1BF0A8849B}"/>
               </a:ext>
             </a:extLst>
           </p:cNvPr>
@@ -8600,7 +7182,7 @@
         </p:blipFill>
         <p:spPr bwMode="auto">
           <a:xfrm>
-            <a:off x="11051381" y="14942890"/>
+            <a:off x="11012859" y="10421637"/>
             <a:ext cx="11374018" cy="6224587"/>
           </a:xfrm>
           <a:prstGeom prst="rect">
@@ -8620,10 +7202,10 @@
       </p:pic>
       <p:pic>
         <p:nvPicPr>
-          <p:cNvPr id="2078" name="Picture 30" descr="PostgreSQL – Wikipédia, a enciclopédia livre">
+          <p:cNvPr id="45" name="Picture 30" descr="PostgreSQL – Wikipédia, a enciclopédia livre">
             <a:extLst>
               <a:ext uri="{FF2B5EF4-FFF2-40B4-BE49-F238E27FC236}">
-                <a16:creationId xmlns:a16="http://schemas.microsoft.com/office/drawing/2014/main" id="{17109263-B04E-3684-8E41-75BB7986F6B8}"/>
+                <a16:creationId xmlns:a16="http://schemas.microsoft.com/office/drawing/2014/main" id="{756BE230-CDD0-2358-3F0B-EBBD458E4C3B}"/>
               </a:ext>
             </a:extLst>
           </p:cNvPr>
@@ -8647,8 +7229,8 @@
         </p:blipFill>
         <p:spPr bwMode="auto">
           <a:xfrm>
-            <a:off x="18237088" y="18678934"/>
-            <a:ext cx="3743437" cy="3861979"/>
+            <a:off x="18198567" y="14157681"/>
+            <a:ext cx="3527214" cy="3638909"/>
           </a:xfrm>
           <a:prstGeom prst="rect">
             <a:avLst/>
@@ -8667,10 +7249,10 @@
       </p:pic>
       <p:pic>
         <p:nvPicPr>
-          <p:cNvPr id="2080" name="Picture 32" descr="Java #logo | Java programming, Top programming languages, Machine learning  projects">
+          <p:cNvPr id="46" name="Picture 32" descr="Java #logo | Java programming, Top programming languages, Machine learning  projects">
             <a:extLst>
               <a:ext uri="{FF2B5EF4-FFF2-40B4-BE49-F238E27FC236}">
-                <a16:creationId xmlns:a16="http://schemas.microsoft.com/office/drawing/2014/main" id="{8CCEECA6-3A59-F40E-D30F-6D50EBEE2580}"/>
+                <a16:creationId xmlns:a16="http://schemas.microsoft.com/office/drawing/2014/main" id="{6DF70566-E019-30EC-6E4C-E5EF320DECDE}"/>
               </a:ext>
             </a:extLst>
           </p:cNvPr>
@@ -8694,8 +7276,8 @@
         </p:blipFill>
         <p:spPr bwMode="auto">
           <a:xfrm>
-            <a:off x="14596426" y="18677148"/>
-            <a:ext cx="1620203" cy="2148530"/>
+            <a:off x="14911731" y="11693742"/>
+            <a:ext cx="1106877" cy="1467816"/>
           </a:xfrm>
           <a:prstGeom prst="rect">
             <a:avLst/>
@@ -8714,10 +7296,10 @@
       </p:pic>
       <p:pic>
         <p:nvPicPr>
-          <p:cNvPr id="2088" name="Picture 40">
+          <p:cNvPr id="47" name="Picture 40">
             <a:extLst>
               <a:ext uri="{FF2B5EF4-FFF2-40B4-BE49-F238E27FC236}">
-                <a16:creationId xmlns:a16="http://schemas.microsoft.com/office/drawing/2014/main" id="{F2892687-92E1-6691-E63A-D4718693D7B1}"/>
+                <a16:creationId xmlns:a16="http://schemas.microsoft.com/office/drawing/2014/main" id="{B1CA8753-CA1C-B968-68CA-07E847906D54}"/>
               </a:ext>
             </a:extLst>
           </p:cNvPr>
@@ -8741,7 +7323,7 @@
         </p:blipFill>
         <p:spPr bwMode="auto">
           <a:xfrm>
-            <a:off x="10687017" y="19587790"/>
+            <a:off x="11068187" y="15070926"/>
             <a:ext cx="4171949" cy="1457325"/>
           </a:xfrm>
           <a:prstGeom prst="rect">
@@ -8761,10 +7343,10 @@
       </p:pic>
       <p:pic>
         <p:nvPicPr>
-          <p:cNvPr id="2090" name="Picture 42">
+          <p:cNvPr id="48" name="Picture 42">
             <a:extLst>
               <a:ext uri="{FF2B5EF4-FFF2-40B4-BE49-F238E27FC236}">
-                <a16:creationId xmlns:a16="http://schemas.microsoft.com/office/drawing/2014/main" id="{81014FEE-F7D0-911F-B4F3-EAF26173519C}"/>
+                <a16:creationId xmlns:a16="http://schemas.microsoft.com/office/drawing/2014/main" id="{A23C4DE1-30AD-DED0-3AE8-9C70B59859A8}"/>
               </a:ext>
             </a:extLst>
           </p:cNvPr>
@@ -8788,8 +7370,8 @@
         </p:blipFill>
         <p:spPr bwMode="auto">
           <a:xfrm>
-            <a:off x="10997041" y="14973782"/>
-            <a:ext cx="5804836" cy="1380916"/>
+            <a:off x="11413257" y="10586911"/>
+            <a:ext cx="5526837" cy="1314783"/>
           </a:xfrm>
           <a:prstGeom prst="rect">
             <a:avLst/>
@@ -8808,10 +7390,10 @@
       </p:pic>
       <p:pic>
         <p:nvPicPr>
-          <p:cNvPr id="40" name="Picture 44">
+          <p:cNvPr id="49" name="Picture 44">
             <a:extLst>
               <a:ext uri="{FF2B5EF4-FFF2-40B4-BE49-F238E27FC236}">
-                <a16:creationId xmlns:a16="http://schemas.microsoft.com/office/drawing/2014/main" id="{A6679812-9697-7BB9-5BF2-4474E1769A3C}"/>
+                <a16:creationId xmlns:a16="http://schemas.microsoft.com/office/drawing/2014/main" id="{BD549DCD-6E39-61C7-7F0D-7AD932A7ACB9}"/>
               </a:ext>
             </a:extLst>
           </p:cNvPr>
@@ -8833,7 +7415,7 @@
         </p:blipFill>
         <p:spPr bwMode="auto">
           <a:xfrm>
-            <a:off x="14201663" y="16322344"/>
+            <a:off x="16040696" y="14316109"/>
             <a:ext cx="2600214" cy="1436336"/>
           </a:xfrm>
           <a:prstGeom prst="rect">
@@ -8853,10 +7435,10 @@
       </p:pic>
       <p:pic>
         <p:nvPicPr>
-          <p:cNvPr id="2094" name="Picture 46" descr="ORA-01031: insufficient privileges">
+          <p:cNvPr id="50" name="Picture 46" descr="ORA-01031: insufficient privileges">
             <a:extLst>
               <a:ext uri="{FF2B5EF4-FFF2-40B4-BE49-F238E27FC236}">
-                <a16:creationId xmlns:a16="http://schemas.microsoft.com/office/drawing/2014/main" id="{02494B70-15AD-63FA-895E-D781B05541A7}"/>
+                <a16:creationId xmlns:a16="http://schemas.microsoft.com/office/drawing/2014/main" id="{FAA7F3EA-67DA-A991-B9AB-81E25C65318E}"/>
               </a:ext>
             </a:extLst>
           </p:cNvPr>
@@ -8880,7 +7462,7 @@
         </p:blipFill>
         <p:spPr bwMode="auto">
           <a:xfrm>
-            <a:off x="16255481" y="18468129"/>
+            <a:off x="14685860" y="13736070"/>
             <a:ext cx="2148530" cy="2148530"/>
           </a:xfrm>
           <a:prstGeom prst="rect">
@@ -8900,10 +7482,10 @@
       </p:pic>
       <p:pic>
         <p:nvPicPr>
-          <p:cNvPr id="2096" name="Picture 48" descr="Reactor · GitHub">
+          <p:cNvPr id="51" name="Picture 48" descr="Reactor · GitHub">
             <a:extLst>
               <a:ext uri="{FF2B5EF4-FFF2-40B4-BE49-F238E27FC236}">
-                <a16:creationId xmlns:a16="http://schemas.microsoft.com/office/drawing/2014/main" id="{47B69139-E027-594A-0FD3-CB3499FB7D6A}"/>
+                <a16:creationId xmlns:a16="http://schemas.microsoft.com/office/drawing/2014/main" id="{3350D151-8462-4B8B-8B83-F13C9CC01CFB}"/>
               </a:ext>
             </a:extLst>
           </p:cNvPr>
@@ -8927,7 +7509,7 @@
         </p:blipFill>
         <p:spPr bwMode="auto">
           <a:xfrm>
-            <a:off x="16824289" y="15187861"/>
+            <a:off x="16785767" y="10666608"/>
             <a:ext cx="2616941" cy="2616941"/>
           </a:xfrm>
           <a:prstGeom prst="rect">
@@ -8947,10 +7529,10 @@
       </p:pic>
       <p:pic>
         <p:nvPicPr>
-          <p:cNvPr id="2098" name="Picture 50" descr="ReactiveX Logo PNG Vector (SVG) Free Download">
+          <p:cNvPr id="52" name="Picture 50" descr="ReactiveX Logo PNG Vector (SVG) Free Download">
             <a:extLst>
               <a:ext uri="{FF2B5EF4-FFF2-40B4-BE49-F238E27FC236}">
-                <a16:creationId xmlns:a16="http://schemas.microsoft.com/office/drawing/2014/main" id="{EDA7B31C-2710-F908-B4FF-D5751DAF2670}"/>
+                <a16:creationId xmlns:a16="http://schemas.microsoft.com/office/drawing/2014/main" id="{22FFA391-C533-3DA6-2F3A-D7A20BC78A88}"/>
               </a:ext>
             </a:extLst>
           </p:cNvPr>
@@ -8974,8 +7556,8 @@
         </p:blipFill>
         <p:spPr bwMode="auto">
           <a:xfrm>
-            <a:off x="20969771" y="16049927"/>
-            <a:ext cx="1303362" cy="1255572"/>
+            <a:off x="21033306" y="11392340"/>
+            <a:ext cx="1053160" cy="1014544"/>
           </a:xfrm>
           <a:prstGeom prst="rect">
             <a:avLst/>
@@ -8994,10 +7576,10 @@
       </p:pic>
       <p:pic>
         <p:nvPicPr>
-          <p:cNvPr id="2100" name="Picture 52" descr="MongoDB logo | Infinapps">
+          <p:cNvPr id="53" name="Picture 54">
             <a:extLst>
               <a:ext uri="{FF2B5EF4-FFF2-40B4-BE49-F238E27FC236}">
-                <a16:creationId xmlns:a16="http://schemas.microsoft.com/office/drawing/2014/main" id="{0AF6AA7D-5F2C-920F-5CCF-BB889507A31A}"/>
+                <a16:creationId xmlns:a16="http://schemas.microsoft.com/office/drawing/2014/main" id="{69D88858-3B7D-7804-7D8D-26A563914FA2}"/>
               </a:ext>
             </a:extLst>
           </p:cNvPr>
@@ -9021,54 +7603,7 @@
         </p:blipFill>
         <p:spPr bwMode="auto">
           <a:xfrm>
-            <a:off x="19282048" y="15784471"/>
-            <a:ext cx="1651266" cy="1935140"/>
-          </a:xfrm>
-          <a:prstGeom prst="rect">
-            <a:avLst/>
-          </a:prstGeom>
-          <a:noFill/>
-          <a:extLst>
-            <a:ext uri="{909E8E84-426E-40DD-AFC4-6F175D3DCCD1}">
-              <a14:hiddenFill xmlns:a14="http://schemas.microsoft.com/office/drawing/2010/main">
-                <a:solidFill>
-                  <a:srgbClr val="FFFFFF"/>
-                </a:solidFill>
-              </a14:hiddenFill>
-            </a:ext>
-          </a:extLst>
-        </p:spPr>
-      </p:pic>
-      <p:pic>
-        <p:nvPicPr>
-          <p:cNvPr id="2102" name="Picture 54">
-            <a:extLst>
-              <a:ext uri="{FF2B5EF4-FFF2-40B4-BE49-F238E27FC236}">
-                <a16:creationId xmlns:a16="http://schemas.microsoft.com/office/drawing/2014/main" id="{E82E8FC6-CB16-374F-56F0-3940917D80A9}"/>
-              </a:ext>
-            </a:extLst>
-          </p:cNvPr>
-          <p:cNvPicPr>
-            <a:picLocks noChangeAspect="1" noChangeArrowheads="1"/>
-          </p:cNvPicPr>
-          <p:nvPr/>
-        </p:nvPicPr>
-        <p:blipFill>
-          <a:blip r:embed="rId15">
-            <a:extLst>
-              <a:ext uri="{28A0092B-C50C-407E-A947-70E740481C1C}">
-                <a14:useLocalDpi xmlns:a14="http://schemas.microsoft.com/office/drawing/2010/main" val="0"/>
-              </a:ext>
-            </a:extLst>
-          </a:blip>
-          <a:srcRect/>
-          <a:stretch>
-            <a:fillRect/>
-          </a:stretch>
-        </p:blipFill>
-        <p:spPr bwMode="auto">
-          <a:xfrm>
-            <a:off x="19428990" y="15187861"/>
+            <a:off x="19354552" y="12428698"/>
             <a:ext cx="2585863" cy="665860"/>
           </a:xfrm>
           <a:prstGeom prst="rect">
@@ -9086,6 +7621,322 @@
           </a:extLst>
         </p:spPr>
       </p:pic>
+      <p:pic>
+        <p:nvPicPr>
+          <p:cNvPr id="54" name="Picture 52" descr="MongoDB logo | Infinapps">
+            <a:extLst>
+              <a:ext uri="{FF2B5EF4-FFF2-40B4-BE49-F238E27FC236}">
+                <a16:creationId xmlns:a16="http://schemas.microsoft.com/office/drawing/2014/main" id="{B4E83EAF-CA95-8815-CAB5-BEA11F674D64}"/>
+              </a:ext>
+            </a:extLst>
+          </p:cNvPr>
+          <p:cNvPicPr>
+            <a:picLocks noChangeAspect="1" noChangeArrowheads="1"/>
+          </p:cNvPicPr>
+          <p:nvPr/>
+        </p:nvPicPr>
+        <p:blipFill rotWithShape="1">
+          <a:blip r:embed="rId15">
+            <a:extLst>
+              <a:ext uri="{28A0092B-C50C-407E-A947-70E740481C1C}">
+                <a14:useLocalDpi xmlns:a14="http://schemas.microsoft.com/office/drawing/2010/main" val="0"/>
+              </a:ext>
+            </a:extLst>
+          </a:blip>
+          <a:srcRect l="-562" t="1250" r="562" b="27865"/>
+          <a:stretch/>
+        </p:blipFill>
+        <p:spPr bwMode="auto">
+          <a:xfrm>
+            <a:off x="19130760" y="10421637"/>
+            <a:ext cx="2188547" cy="1818070"/>
+          </a:xfrm>
+          <a:prstGeom prst="rect">
+            <a:avLst/>
+          </a:prstGeom>
+          <a:noFill/>
+          <a:extLst>
+            <a:ext uri="{909E8E84-426E-40DD-AFC4-6F175D3DCCD1}">
+              <a14:hiddenFill xmlns:a14="http://schemas.microsoft.com/office/drawing/2010/main">
+                <a:solidFill>
+                  <a:srgbClr val="FFFFFF"/>
+                </a:solidFill>
+              </a14:hiddenFill>
+            </a:ext>
+          </a:extLst>
+        </p:spPr>
+      </p:pic>
+      <p:sp>
+        <p:nvSpPr>
+          <p:cNvPr id="10" name="TextBox 9">
+            <a:extLst>
+              <a:ext uri="{FF2B5EF4-FFF2-40B4-BE49-F238E27FC236}">
+                <a16:creationId xmlns:a16="http://schemas.microsoft.com/office/drawing/2014/main" id="{F3597C09-C322-7EA8-D2F4-818CE4A4F257}"/>
+              </a:ext>
+            </a:extLst>
+          </p:cNvPr>
+          <p:cNvSpPr txBox="1"/>
+          <p:nvPr/>
+        </p:nvSpPr>
+        <p:spPr>
+          <a:xfrm>
+            <a:off x="34185176" y="19941959"/>
+            <a:ext cx="7650584" cy="1323439"/>
+          </a:xfrm>
+          <a:prstGeom prst="rect">
+            <a:avLst/>
+          </a:prstGeom>
+          <a:noFill/>
+        </p:spPr>
+        <p:txBody>
+          <a:bodyPr wrap="square" rtlCol="0">
+            <a:spAutoFit/>
+            <a:scene3d>
+              <a:camera prst="orthographicFront"/>
+              <a:lightRig rig="soft" dir="t">
+                <a:rot lat="0" lon="0" rev="15600000"/>
+              </a:lightRig>
+            </a:scene3d>
+            <a:sp3d extrusionH="57150" prstMaterial="softEdge">
+              <a:bevelT w="25400" h="38100"/>
+            </a:sp3d>
+          </a:bodyPr>
+          <a:lstStyle/>
+          <a:p>
+            <a:r>
+              <a:rPr lang="en-GB" sz="4000" dirty="0">
+                <a:ln w="0"/>
+                <a:effectLst>
+                  <a:outerShdw blurRad="38100" dist="19050" dir="2700000" algn="tl" rotWithShape="0">
+                    <a:schemeClr val="dk1">
+                      <a:alpha val="40000"/>
+                    </a:schemeClr>
+                  </a:outerShdw>
+                </a:effectLst>
+              </a:rPr>
+              <a:t>https://github.com/CatKinKitKat/MicronautJooqPostgresREST</a:t>
+            </a:r>
+          </a:p>
+        </p:txBody>
+      </p:sp>
+      <p:pic>
+        <p:nvPicPr>
+          <p:cNvPr id="12" name="Picture 11">
+            <a:extLst>
+              <a:ext uri="{FF2B5EF4-FFF2-40B4-BE49-F238E27FC236}">
+                <a16:creationId xmlns:a16="http://schemas.microsoft.com/office/drawing/2014/main" id="{BCBC1BDB-21B4-2015-7914-F7678F00B495}"/>
+              </a:ext>
+            </a:extLst>
+          </p:cNvPr>
+          <p:cNvPicPr>
+            <a:picLocks noChangeAspect="1"/>
+          </p:cNvPicPr>
+          <p:nvPr/>
+        </p:nvPicPr>
+        <p:blipFill>
+          <a:blip r:embed="rId16"/>
+          <a:stretch>
+            <a:fillRect/>
+          </a:stretch>
+        </p:blipFill>
+        <p:spPr>
+          <a:xfrm>
+            <a:off x="24064865" y="18653543"/>
+            <a:ext cx="9677400" cy="4305300"/>
+          </a:xfrm>
+          <a:prstGeom prst="rect">
+            <a:avLst/>
+          </a:prstGeom>
+        </p:spPr>
+      </p:pic>
+      <p:sp>
+        <p:nvSpPr>
+          <p:cNvPr id="72" name="Text Box 422">
+            <a:extLst>
+              <a:ext uri="{FF2B5EF4-FFF2-40B4-BE49-F238E27FC236}">
+                <a16:creationId xmlns:a16="http://schemas.microsoft.com/office/drawing/2014/main" id="{1CF7B9B9-18E0-CF1D-4B50-50F5B47744A6}"/>
+              </a:ext>
+            </a:extLst>
+          </p:cNvPr>
+          <p:cNvSpPr txBox="1">
+            <a:spLocks noChangeArrowheads="1"/>
+          </p:cNvSpPr>
+          <p:nvPr/>
+        </p:nvSpPr>
+        <p:spPr bwMode="auto">
+          <a:xfrm>
+            <a:off x="34277491" y="18749439"/>
+            <a:ext cx="5502300" cy="998747"/>
+          </a:xfrm>
+          <a:prstGeom prst="rect">
+            <a:avLst/>
+          </a:prstGeom>
+          <a:noFill/>
+          <a:ln>
+            <a:noFill/>
+          </a:ln>
+          <a:effectLst/>
+          <a:extLst>
+            <a:ext uri="{909E8E84-426E-40dd-AFC4-6F175D3DCCD1}">
+              <a14:hiddenFill xmlns="" xmlns:a14="http://schemas.microsoft.com/office/drawing/2010/main">
+                <a:solidFill>
+                  <a:schemeClr val="accent1"/>
+                </a:solidFill>
+              </a14:hiddenFill>
+            </a:ext>
+            <a:ext uri="{91240B29-F687-4f45-9708-019B960494DF}">
+              <a14:hiddenLine xmlns="" xmlns:a14="http://schemas.microsoft.com/office/drawing/2010/main" w="9525">
+                <a:solidFill>
+                  <a:schemeClr val="tx1"/>
+                </a:solidFill>
+                <a:miter lim="800000"/>
+                <a:headEnd/>
+                <a:tailEnd/>
+              </a14:hiddenLine>
+            </a:ext>
+            <a:ext uri="{AF507438-7753-43e0-B8FC-AC1667EBCBE1}">
+              <a14:hiddenEffects xmlns="" xmlns:a14="http://schemas.microsoft.com/office/drawing/2010/main">
+                <a:effectLst>
+                  <a:outerShdw blurRad="63500" dist="38099" dir="2700000" algn="ctr" rotWithShape="0">
+                    <a:schemeClr val="bg2">
+                      <a:alpha val="74998"/>
+                    </a:schemeClr>
+                  </a:outerShdw>
+                </a:effectLst>
+              </a14:hiddenEffects>
+            </a:ext>
+          </a:extLst>
+        </p:spPr>
+        <p:txBody>
+          <a:bodyPr wrap="none" lIns="105168" tIns="52584" rIns="105168" bIns="52584">
+            <a:spAutoFit/>
+          </a:bodyPr>
+          <a:lstStyle>
+            <a:lvl1pPr defTabSz="885825" eaLnBrk="0" hangingPunct="0">
+              <a:defRPr sz="8200">
+                <a:solidFill>
+                  <a:schemeClr val="tx1"/>
+                </a:solidFill>
+                <a:latin typeface="Arial" panose="020B0604020202020204" pitchFamily="34" charset="0"/>
+                <a:ea typeface="MS PGothic" panose="020B0600070205080204" pitchFamily="34" charset="-128"/>
+              </a:defRPr>
+            </a:lvl1pPr>
+            <a:lvl2pPr marL="742950" indent="-285750" defTabSz="885825" eaLnBrk="0" hangingPunct="0">
+              <a:defRPr sz="8200">
+                <a:solidFill>
+                  <a:schemeClr val="tx1"/>
+                </a:solidFill>
+                <a:latin typeface="Arial" panose="020B0604020202020204" pitchFamily="34" charset="0"/>
+                <a:ea typeface="MS PGothic" panose="020B0600070205080204" pitchFamily="34" charset="-128"/>
+              </a:defRPr>
+            </a:lvl2pPr>
+            <a:lvl3pPr marL="1143000" indent="-228600" defTabSz="885825" eaLnBrk="0" hangingPunct="0">
+              <a:defRPr sz="8200">
+                <a:solidFill>
+                  <a:schemeClr val="tx1"/>
+                </a:solidFill>
+                <a:latin typeface="Arial" panose="020B0604020202020204" pitchFamily="34" charset="0"/>
+                <a:ea typeface="MS PGothic" panose="020B0600070205080204" pitchFamily="34" charset="-128"/>
+              </a:defRPr>
+            </a:lvl3pPr>
+            <a:lvl4pPr marL="1600200" indent="-228600" defTabSz="885825" eaLnBrk="0" hangingPunct="0">
+              <a:defRPr sz="8200">
+                <a:solidFill>
+                  <a:schemeClr val="tx1"/>
+                </a:solidFill>
+                <a:latin typeface="Arial" panose="020B0604020202020204" pitchFamily="34" charset="0"/>
+                <a:ea typeface="MS PGothic" panose="020B0600070205080204" pitchFamily="34" charset="-128"/>
+              </a:defRPr>
+            </a:lvl4pPr>
+            <a:lvl5pPr marL="2057400" indent="-228600" defTabSz="885825" eaLnBrk="0" hangingPunct="0">
+              <a:defRPr sz="8200">
+                <a:solidFill>
+                  <a:schemeClr val="tx1"/>
+                </a:solidFill>
+                <a:latin typeface="Arial" panose="020B0604020202020204" pitchFamily="34" charset="0"/>
+                <a:ea typeface="MS PGothic" panose="020B0600070205080204" pitchFamily="34" charset="-128"/>
+              </a:defRPr>
+            </a:lvl5pPr>
+            <a:lvl6pPr marL="2514600" indent="-228600" defTabSz="885825" eaLnBrk="0" fontAlgn="base" hangingPunct="0">
+              <a:spcBef>
+                <a:spcPct val="0"/>
+              </a:spcBef>
+              <a:spcAft>
+                <a:spcPct val="0"/>
+              </a:spcAft>
+              <a:defRPr sz="8200">
+                <a:solidFill>
+                  <a:schemeClr val="tx1"/>
+                </a:solidFill>
+                <a:latin typeface="Arial" panose="020B0604020202020204" pitchFamily="34" charset="0"/>
+                <a:ea typeface="MS PGothic" panose="020B0600070205080204" pitchFamily="34" charset="-128"/>
+              </a:defRPr>
+            </a:lvl6pPr>
+            <a:lvl7pPr marL="2971800" indent="-228600" defTabSz="885825" eaLnBrk="0" fontAlgn="base" hangingPunct="0">
+              <a:spcBef>
+                <a:spcPct val="0"/>
+              </a:spcBef>
+              <a:spcAft>
+                <a:spcPct val="0"/>
+              </a:spcAft>
+              <a:defRPr sz="8200">
+                <a:solidFill>
+                  <a:schemeClr val="tx1"/>
+                </a:solidFill>
+                <a:latin typeface="Arial" panose="020B0604020202020204" pitchFamily="34" charset="0"/>
+                <a:ea typeface="MS PGothic" panose="020B0600070205080204" pitchFamily="34" charset="-128"/>
+              </a:defRPr>
+            </a:lvl7pPr>
+            <a:lvl8pPr marL="3429000" indent="-228600" defTabSz="885825" eaLnBrk="0" fontAlgn="base" hangingPunct="0">
+              <a:spcBef>
+                <a:spcPct val="0"/>
+              </a:spcBef>
+              <a:spcAft>
+                <a:spcPct val="0"/>
+              </a:spcAft>
+              <a:defRPr sz="8200">
+                <a:solidFill>
+                  <a:schemeClr val="tx1"/>
+                </a:solidFill>
+                <a:latin typeface="Arial" panose="020B0604020202020204" pitchFamily="34" charset="0"/>
+                <a:ea typeface="MS PGothic" panose="020B0600070205080204" pitchFamily="34" charset="-128"/>
+              </a:defRPr>
+            </a:lvl8pPr>
+            <a:lvl9pPr marL="3886200" indent="-228600" defTabSz="885825" eaLnBrk="0" fontAlgn="base" hangingPunct="0">
+              <a:spcBef>
+                <a:spcPct val="0"/>
+              </a:spcBef>
+              <a:spcAft>
+                <a:spcPct val="0"/>
+              </a:spcAft>
+              <a:defRPr sz="8200">
+                <a:solidFill>
+                  <a:schemeClr val="tx1"/>
+                </a:solidFill>
+                <a:latin typeface="Arial" panose="020B0604020202020204" pitchFamily="34" charset="0"/>
+                <a:ea typeface="MS PGothic" panose="020B0600070205080204" pitchFamily="34" charset="-128"/>
+              </a:defRPr>
+            </a:lvl9pPr>
+          </a:lstStyle>
+          <a:p>
+            <a:pPr>
+              <a:spcAft>
+                <a:spcPct val="30000"/>
+              </a:spcAft>
+            </a:pPr>
+            <a:r>
+              <a:rPr lang="pt-PT" altLang="en-US" sz="5800" b="1" dirty="0">
+                <a:effectLst>
+                  <a:outerShdw blurRad="38100" dist="38100" dir="2700000" algn="tl">
+                    <a:srgbClr val="C0C0C0"/>
+                  </a:outerShdw>
+                </a:effectLst>
+              </a:rPr>
+              <a:t>Disponível em:</a:t>
+            </a:r>
+          </a:p>
+        </p:txBody>
+      </p:sp>
     </p:spTree>
   </p:cSld>
   <p:clrMapOvr>
@@ -9340,7 +8191,7 @@
         <a:effectLst/>
         <a:extLst>
           <a:ext uri="{AF507438-7753-43e0-B8FC-AC1667EBCBE1}">
-            <a14:hiddenEffects xmlns:a14="http://schemas.microsoft.com/office/drawing/2010/main" xmlns="">
+            <a14:hiddenEffects xmlns="" xmlns:a14="http://schemas.microsoft.com/office/drawing/2010/main">
               <a:effectLst>
                 <a:outerShdw blurRad="63500" dist="38099" dir="2700000" algn="ctr" rotWithShape="0">
                   <a:schemeClr val="bg2">
@@ -9416,7 +8267,7 @@
         <a:effectLst/>
         <a:extLst>
           <a:ext uri="{AF507438-7753-43e0-B8FC-AC1667EBCBE1}">
-            <a14:hiddenEffects xmlns:a14="http://schemas.microsoft.com/office/drawing/2010/main" xmlns="">
+            <a14:hiddenEffects xmlns="" xmlns:a14="http://schemas.microsoft.com/office/drawing/2010/main">
               <a:effectLst>
                 <a:outerShdw blurRad="63500" dist="38099" dir="2700000" algn="ctr" rotWithShape="0">
                   <a:schemeClr val="bg2">

</xml_diff>